<commit_message>
Add picture to BAM/SAM
 Changes to be committed:
	modified:   Flip Presentations/NGS_Intro/03-SAM_BAM/BAM_CIGAR.pptx
</commit_message>
<xml_diff>
--- a/Flip Presentations/NGS_Intro/03-SAM_BAM/BAM_CIGAR.pptx
+++ b/Flip Presentations/NGS_Intro/03-SAM_BAM/BAM_CIGAR.pptx
@@ -13,16 +13,16 @@
     <p:sldId id="292" r:id="rId4"/>
     <p:sldId id="293" r:id="rId5"/>
     <p:sldId id="291" r:id="rId6"/>
-    <p:sldId id="258" r:id="rId7"/>
-    <p:sldId id="256" r:id="rId8"/>
-    <p:sldId id="295" r:id="rId9"/>
-    <p:sldId id="294" r:id="rId10"/>
-    <p:sldId id="298" r:id="rId11"/>
-    <p:sldId id="297" r:id="rId12"/>
-    <p:sldId id="299" r:id="rId13"/>
-    <p:sldId id="300" r:id="rId14"/>
-    <p:sldId id="301" r:id="rId15"/>
-    <p:sldId id="310" r:id="rId16"/>
+    <p:sldId id="310" r:id="rId7"/>
+    <p:sldId id="258" r:id="rId8"/>
+    <p:sldId id="256" r:id="rId9"/>
+    <p:sldId id="295" r:id="rId10"/>
+    <p:sldId id="294" r:id="rId11"/>
+    <p:sldId id="298" r:id="rId12"/>
+    <p:sldId id="297" r:id="rId13"/>
+    <p:sldId id="299" r:id="rId14"/>
+    <p:sldId id="300" r:id="rId15"/>
+    <p:sldId id="301" r:id="rId16"/>
     <p:sldId id="309" r:id="rId17"/>
     <p:sldId id="302" r:id="rId18"/>
   </p:sldIdLst>
@@ -125,7 +125,7 @@
   </p:defaultTextStyle>
   <p:extLst>
     <p:ext uri="{EFAFB233-063F-42B5-8137-9DF3F51BA10A}">
-      <p15:sldGuideLst xmlns="" xmlns:p15="http://schemas.microsoft.com/office/powerpoint/2012/main"/>
+      <p15:sldGuideLst xmlns:p15="http://schemas.microsoft.com/office/powerpoint/2012/main" xmlns=""/>
     </p:ext>
   </p:extLst>
 </p:presentation>
@@ -217,7 +217,7 @@
           <a:p>
             <a:fld id="{A1A0514D-38CC-49F5-A912-2794DAAF3AC3}" type="datetimeFigureOut">
               <a:rPr lang="en-GB" smtClean="0"/>
-              <a:t>2018-01-28</a:t>
+              <a:t>2018-03-15</a:t>
             </a:fld>
             <a:endParaRPr lang="en-GB"/>
           </a:p>
@@ -781,7 +781,7 @@
           <a:p>
             <a:fld id="{783B116A-7CF9-49FA-B73A-46949A776ECC}" type="slidenum">
               <a:rPr lang="en-GB" smtClean="0"/>
-              <a:t>5</a:t>
+              <a:t>6</a:t>
             </a:fld>
             <a:endParaRPr lang="en-GB"/>
           </a:p>
@@ -1083,7 +1083,7 @@
           <a:p>
             <a:fld id="{783B116A-7CF9-49FA-B73A-46949A776ECC}" type="slidenum">
               <a:rPr lang="en-GB" smtClean="0"/>
-              <a:t>6</a:t>
+              <a:t>7</a:t>
             </a:fld>
             <a:endParaRPr lang="en-GB"/>
           </a:p>
@@ -1124,7 +1124,7 @@
           <p:cNvPr id="2" name="Title 1">
             <a:extLst>
               <a:ext uri="{FF2B5EF4-FFF2-40B4-BE49-F238E27FC236}">
-                <a16:creationId xmlns="" xmlns:a16="http://schemas.microsoft.com/office/drawing/2014/main" id="{032A3615-1B4F-418D-B0BB-CBD54E1C819E}"/>
+                <a16:creationId xmlns:a16="http://schemas.microsoft.com/office/drawing/2014/main" xmlns="" id="{032A3615-1B4F-418D-B0BB-CBD54E1C819E}"/>
               </a:ext>
             </a:extLst>
           </p:cNvPr>
@@ -1162,7 +1162,7 @@
           <p:cNvPr id="3" name="Subtitle 2">
             <a:extLst>
               <a:ext uri="{FF2B5EF4-FFF2-40B4-BE49-F238E27FC236}">
-                <a16:creationId xmlns="" xmlns:a16="http://schemas.microsoft.com/office/drawing/2014/main" id="{5178CFA0-D280-4CD5-A213-7111D5B1C049}"/>
+                <a16:creationId xmlns:a16="http://schemas.microsoft.com/office/drawing/2014/main" xmlns="" id="{5178CFA0-D280-4CD5-A213-7111D5B1C049}"/>
               </a:ext>
             </a:extLst>
           </p:cNvPr>
@@ -1233,7 +1233,7 @@
           <p:cNvPr id="4" name="Date Placeholder 3">
             <a:extLst>
               <a:ext uri="{FF2B5EF4-FFF2-40B4-BE49-F238E27FC236}">
-                <a16:creationId xmlns="" xmlns:a16="http://schemas.microsoft.com/office/drawing/2014/main" id="{6437010A-E880-4C2E-8F4F-2C9DE975306A}"/>
+                <a16:creationId xmlns:a16="http://schemas.microsoft.com/office/drawing/2014/main" xmlns="" id="{6437010A-E880-4C2E-8F4F-2C9DE975306A}"/>
               </a:ext>
             </a:extLst>
           </p:cNvPr>
@@ -1251,7 +1251,7 @@
           <a:p>
             <a:fld id="{AEC09C50-853A-420B-8C26-7439C86401C0}" type="datetimeFigureOut">
               <a:rPr lang="en-GB" smtClean="0"/>
-              <a:t>2018-01-28</a:t>
+              <a:t>2018-03-15</a:t>
             </a:fld>
             <a:endParaRPr lang="en-GB"/>
           </a:p>
@@ -1262,7 +1262,7 @@
           <p:cNvPr id="5" name="Footer Placeholder 4">
             <a:extLst>
               <a:ext uri="{FF2B5EF4-FFF2-40B4-BE49-F238E27FC236}">
-                <a16:creationId xmlns="" xmlns:a16="http://schemas.microsoft.com/office/drawing/2014/main" id="{9F643F16-915B-4F04-8319-7D1C8C69C781}"/>
+                <a16:creationId xmlns:a16="http://schemas.microsoft.com/office/drawing/2014/main" xmlns="" id="{9F643F16-915B-4F04-8319-7D1C8C69C781}"/>
               </a:ext>
             </a:extLst>
           </p:cNvPr>
@@ -1287,7 +1287,7 @@
           <p:cNvPr id="6" name="Slide Number Placeholder 5">
             <a:extLst>
               <a:ext uri="{FF2B5EF4-FFF2-40B4-BE49-F238E27FC236}">
-                <a16:creationId xmlns="" xmlns:a16="http://schemas.microsoft.com/office/drawing/2014/main" id="{A5A1F72C-9F07-4EFA-8E45-090190D59EFA}"/>
+                <a16:creationId xmlns:a16="http://schemas.microsoft.com/office/drawing/2014/main" xmlns="" id="{A5A1F72C-9F07-4EFA-8E45-090190D59EFA}"/>
               </a:ext>
             </a:extLst>
           </p:cNvPr>
@@ -1346,7 +1346,7 @@
           <p:cNvPr id="2" name="Title 1">
             <a:extLst>
               <a:ext uri="{FF2B5EF4-FFF2-40B4-BE49-F238E27FC236}">
-                <a16:creationId xmlns="" xmlns:a16="http://schemas.microsoft.com/office/drawing/2014/main" id="{DF0ADA25-4CDF-4246-9CC9-8AE3380619F1}"/>
+                <a16:creationId xmlns:a16="http://schemas.microsoft.com/office/drawing/2014/main" xmlns="" id="{DF0ADA25-4CDF-4246-9CC9-8AE3380619F1}"/>
               </a:ext>
             </a:extLst>
           </p:cNvPr>
@@ -1375,7 +1375,7 @@
           <p:cNvPr id="3" name="Vertical Text Placeholder 2">
             <a:extLst>
               <a:ext uri="{FF2B5EF4-FFF2-40B4-BE49-F238E27FC236}">
-                <a16:creationId xmlns="" xmlns:a16="http://schemas.microsoft.com/office/drawing/2014/main" id="{A73B0C6F-4850-4D10-91DC-61668DE50E5A}"/>
+                <a16:creationId xmlns:a16="http://schemas.microsoft.com/office/drawing/2014/main" xmlns="" id="{A73B0C6F-4850-4D10-91DC-61668DE50E5A}"/>
               </a:ext>
             </a:extLst>
           </p:cNvPr>
@@ -1433,7 +1433,7 @@
           <p:cNvPr id="4" name="Date Placeholder 3">
             <a:extLst>
               <a:ext uri="{FF2B5EF4-FFF2-40B4-BE49-F238E27FC236}">
-                <a16:creationId xmlns="" xmlns:a16="http://schemas.microsoft.com/office/drawing/2014/main" id="{28816B05-7093-4142-B374-DFA2171DFDA7}"/>
+                <a16:creationId xmlns:a16="http://schemas.microsoft.com/office/drawing/2014/main" xmlns="" id="{28816B05-7093-4142-B374-DFA2171DFDA7}"/>
               </a:ext>
             </a:extLst>
           </p:cNvPr>
@@ -1451,7 +1451,7 @@
           <a:p>
             <a:fld id="{AEC09C50-853A-420B-8C26-7439C86401C0}" type="datetimeFigureOut">
               <a:rPr lang="en-GB" smtClean="0"/>
-              <a:t>2018-01-28</a:t>
+              <a:t>2018-03-15</a:t>
             </a:fld>
             <a:endParaRPr lang="en-GB"/>
           </a:p>
@@ -1462,7 +1462,7 @@
           <p:cNvPr id="5" name="Footer Placeholder 4">
             <a:extLst>
               <a:ext uri="{FF2B5EF4-FFF2-40B4-BE49-F238E27FC236}">
-                <a16:creationId xmlns="" xmlns:a16="http://schemas.microsoft.com/office/drawing/2014/main" id="{F8D052D6-AC53-4967-A0E2-E4E4AB61FF09}"/>
+                <a16:creationId xmlns:a16="http://schemas.microsoft.com/office/drawing/2014/main" xmlns="" id="{F8D052D6-AC53-4967-A0E2-E4E4AB61FF09}"/>
               </a:ext>
             </a:extLst>
           </p:cNvPr>
@@ -1487,7 +1487,7 @@
           <p:cNvPr id="6" name="Slide Number Placeholder 5">
             <a:extLst>
               <a:ext uri="{FF2B5EF4-FFF2-40B4-BE49-F238E27FC236}">
-                <a16:creationId xmlns="" xmlns:a16="http://schemas.microsoft.com/office/drawing/2014/main" id="{209C7226-9CDD-405A-B9DA-D5ED9561A32C}"/>
+                <a16:creationId xmlns:a16="http://schemas.microsoft.com/office/drawing/2014/main" xmlns="" id="{209C7226-9CDD-405A-B9DA-D5ED9561A32C}"/>
               </a:ext>
             </a:extLst>
           </p:cNvPr>
@@ -1546,7 +1546,7 @@
           <p:cNvPr id="2" name="Vertical Title 1">
             <a:extLst>
               <a:ext uri="{FF2B5EF4-FFF2-40B4-BE49-F238E27FC236}">
-                <a16:creationId xmlns="" xmlns:a16="http://schemas.microsoft.com/office/drawing/2014/main" id="{AC8F15DC-2850-4805-BE66-C8A705279A00}"/>
+                <a16:creationId xmlns:a16="http://schemas.microsoft.com/office/drawing/2014/main" xmlns="" id="{AC8F15DC-2850-4805-BE66-C8A705279A00}"/>
               </a:ext>
             </a:extLst>
           </p:cNvPr>
@@ -1580,7 +1580,7 @@
           <p:cNvPr id="3" name="Vertical Text Placeholder 2">
             <a:extLst>
               <a:ext uri="{FF2B5EF4-FFF2-40B4-BE49-F238E27FC236}">
-                <a16:creationId xmlns="" xmlns:a16="http://schemas.microsoft.com/office/drawing/2014/main" id="{C357DFB2-B690-4D71-9FB8-516ED75975FD}"/>
+                <a16:creationId xmlns:a16="http://schemas.microsoft.com/office/drawing/2014/main" xmlns="" id="{C357DFB2-B690-4D71-9FB8-516ED75975FD}"/>
               </a:ext>
             </a:extLst>
           </p:cNvPr>
@@ -1643,7 +1643,7 @@
           <p:cNvPr id="4" name="Date Placeholder 3">
             <a:extLst>
               <a:ext uri="{FF2B5EF4-FFF2-40B4-BE49-F238E27FC236}">
-                <a16:creationId xmlns="" xmlns:a16="http://schemas.microsoft.com/office/drawing/2014/main" id="{6CA1D11A-42DD-417D-AC4D-52096BB89234}"/>
+                <a16:creationId xmlns:a16="http://schemas.microsoft.com/office/drawing/2014/main" xmlns="" id="{6CA1D11A-42DD-417D-AC4D-52096BB89234}"/>
               </a:ext>
             </a:extLst>
           </p:cNvPr>
@@ -1661,7 +1661,7 @@
           <a:p>
             <a:fld id="{AEC09C50-853A-420B-8C26-7439C86401C0}" type="datetimeFigureOut">
               <a:rPr lang="en-GB" smtClean="0"/>
-              <a:t>2018-01-28</a:t>
+              <a:t>2018-03-15</a:t>
             </a:fld>
             <a:endParaRPr lang="en-GB"/>
           </a:p>
@@ -1672,7 +1672,7 @@
           <p:cNvPr id="5" name="Footer Placeholder 4">
             <a:extLst>
               <a:ext uri="{FF2B5EF4-FFF2-40B4-BE49-F238E27FC236}">
-                <a16:creationId xmlns="" xmlns:a16="http://schemas.microsoft.com/office/drawing/2014/main" id="{24E0F641-8F99-48B8-8C2B-0535E04FC772}"/>
+                <a16:creationId xmlns:a16="http://schemas.microsoft.com/office/drawing/2014/main" xmlns="" id="{24E0F641-8F99-48B8-8C2B-0535E04FC772}"/>
               </a:ext>
             </a:extLst>
           </p:cNvPr>
@@ -1697,7 +1697,7 @@
           <p:cNvPr id="6" name="Slide Number Placeholder 5">
             <a:extLst>
               <a:ext uri="{FF2B5EF4-FFF2-40B4-BE49-F238E27FC236}">
-                <a16:creationId xmlns="" xmlns:a16="http://schemas.microsoft.com/office/drawing/2014/main" id="{F5D90570-5593-43EA-ADD8-E7B87D770333}"/>
+                <a16:creationId xmlns:a16="http://schemas.microsoft.com/office/drawing/2014/main" xmlns="" id="{F5D90570-5593-43EA-ADD8-E7B87D770333}"/>
               </a:ext>
             </a:extLst>
           </p:cNvPr>
@@ -1915,7 +1915,7 @@
           <a:p>
             <a:fld id="{BB2556DB-1519-40E4-AF1C-F909855EDD97}" type="datetimeFigureOut">
               <a:rPr lang="en-GB" smtClean="0"/>
-              <a:t>2018-01-28</a:t>
+              <a:t>2018-03-15</a:t>
             </a:fld>
             <a:endParaRPr lang="en-GB"/>
           </a:p>
@@ -2085,7 +2085,7 @@
           <a:p>
             <a:fld id="{BB2556DB-1519-40E4-AF1C-F909855EDD97}" type="datetimeFigureOut">
               <a:rPr lang="en-GB" smtClean="0"/>
-              <a:t>2018-01-28</a:t>
+              <a:t>2018-03-15</a:t>
             </a:fld>
             <a:endParaRPr lang="en-GB"/>
           </a:p>
@@ -2331,7 +2331,7 @@
           <a:p>
             <a:fld id="{BB2556DB-1519-40E4-AF1C-F909855EDD97}" type="datetimeFigureOut">
               <a:rPr lang="en-GB" smtClean="0"/>
-              <a:t>2018-01-28</a:t>
+              <a:t>2018-03-15</a:t>
             </a:fld>
             <a:endParaRPr lang="en-GB"/>
           </a:p>
@@ -2619,7 +2619,7 @@
           <a:p>
             <a:fld id="{BB2556DB-1519-40E4-AF1C-F909855EDD97}" type="datetimeFigureOut">
               <a:rPr lang="en-GB" smtClean="0"/>
-              <a:t>2018-01-28</a:t>
+              <a:t>2018-03-15</a:t>
             </a:fld>
             <a:endParaRPr lang="en-GB"/>
           </a:p>
@@ -3041,7 +3041,7 @@
           <a:p>
             <a:fld id="{BB2556DB-1519-40E4-AF1C-F909855EDD97}" type="datetimeFigureOut">
               <a:rPr lang="en-GB" smtClean="0"/>
-              <a:t>2018-01-28</a:t>
+              <a:t>2018-03-15</a:t>
             </a:fld>
             <a:endParaRPr lang="en-GB"/>
           </a:p>
@@ -3159,7 +3159,7 @@
           <a:p>
             <a:fld id="{BB2556DB-1519-40E4-AF1C-F909855EDD97}" type="datetimeFigureOut">
               <a:rPr lang="en-GB" smtClean="0"/>
-              <a:t>2018-01-28</a:t>
+              <a:t>2018-03-15</a:t>
             </a:fld>
             <a:endParaRPr lang="en-GB"/>
           </a:p>
@@ -3254,7 +3254,7 @@
           <a:p>
             <a:fld id="{BB2556DB-1519-40E4-AF1C-F909855EDD97}" type="datetimeFigureOut">
               <a:rPr lang="en-GB" smtClean="0"/>
-              <a:t>2018-01-28</a:t>
+              <a:t>2018-03-15</a:t>
             </a:fld>
             <a:endParaRPr lang="en-GB"/>
           </a:p>
@@ -3531,7 +3531,7 @@
           <a:p>
             <a:fld id="{BB2556DB-1519-40E4-AF1C-F909855EDD97}" type="datetimeFigureOut">
               <a:rPr lang="en-GB" smtClean="0"/>
-              <a:t>2018-01-28</a:t>
+              <a:t>2018-03-15</a:t>
             </a:fld>
             <a:endParaRPr lang="en-GB"/>
           </a:p>
@@ -3614,7 +3614,7 @@
           <p:cNvPr id="2" name="Title 1">
             <a:extLst>
               <a:ext uri="{FF2B5EF4-FFF2-40B4-BE49-F238E27FC236}">
-                <a16:creationId xmlns="" xmlns:a16="http://schemas.microsoft.com/office/drawing/2014/main" id="{B98979EE-87BC-427F-94CA-2C281566B09A}"/>
+                <a16:creationId xmlns:a16="http://schemas.microsoft.com/office/drawing/2014/main" xmlns="" id="{B98979EE-87BC-427F-94CA-2C281566B09A}"/>
               </a:ext>
             </a:extLst>
           </p:cNvPr>
@@ -3643,7 +3643,7 @@
           <p:cNvPr id="3" name="Content Placeholder 2">
             <a:extLst>
               <a:ext uri="{FF2B5EF4-FFF2-40B4-BE49-F238E27FC236}">
-                <a16:creationId xmlns="" xmlns:a16="http://schemas.microsoft.com/office/drawing/2014/main" id="{08E844DF-4E79-432A-89FF-B27AE73F8DFC}"/>
+                <a16:creationId xmlns:a16="http://schemas.microsoft.com/office/drawing/2014/main" xmlns="" id="{08E844DF-4E79-432A-89FF-B27AE73F8DFC}"/>
               </a:ext>
             </a:extLst>
           </p:cNvPr>
@@ -3701,7 +3701,7 @@
           <p:cNvPr id="4" name="Date Placeholder 3">
             <a:extLst>
               <a:ext uri="{FF2B5EF4-FFF2-40B4-BE49-F238E27FC236}">
-                <a16:creationId xmlns="" xmlns:a16="http://schemas.microsoft.com/office/drawing/2014/main" id="{8B91852C-926C-48F7-8D30-64C8DA09313F}"/>
+                <a16:creationId xmlns:a16="http://schemas.microsoft.com/office/drawing/2014/main" xmlns="" id="{8B91852C-926C-48F7-8D30-64C8DA09313F}"/>
               </a:ext>
             </a:extLst>
           </p:cNvPr>
@@ -3719,7 +3719,7 @@
           <a:p>
             <a:fld id="{AEC09C50-853A-420B-8C26-7439C86401C0}" type="datetimeFigureOut">
               <a:rPr lang="en-GB" smtClean="0"/>
-              <a:t>2018-01-28</a:t>
+              <a:t>2018-03-15</a:t>
             </a:fld>
             <a:endParaRPr lang="en-GB"/>
           </a:p>
@@ -3730,7 +3730,7 @@
           <p:cNvPr id="5" name="Footer Placeholder 4">
             <a:extLst>
               <a:ext uri="{FF2B5EF4-FFF2-40B4-BE49-F238E27FC236}">
-                <a16:creationId xmlns="" xmlns:a16="http://schemas.microsoft.com/office/drawing/2014/main" id="{546A3794-73BB-4394-B312-0810CC8D282B}"/>
+                <a16:creationId xmlns:a16="http://schemas.microsoft.com/office/drawing/2014/main" xmlns="" id="{546A3794-73BB-4394-B312-0810CC8D282B}"/>
               </a:ext>
             </a:extLst>
           </p:cNvPr>
@@ -3755,7 +3755,7 @@
           <p:cNvPr id="6" name="Slide Number Placeholder 5">
             <a:extLst>
               <a:ext uri="{FF2B5EF4-FFF2-40B4-BE49-F238E27FC236}">
-                <a16:creationId xmlns="" xmlns:a16="http://schemas.microsoft.com/office/drawing/2014/main" id="{07786F77-2E2A-4620-93A8-BA28C7D5968E}"/>
+                <a16:creationId xmlns:a16="http://schemas.microsoft.com/office/drawing/2014/main" xmlns="" id="{07786F77-2E2A-4620-93A8-BA28C7D5968E}"/>
               </a:ext>
             </a:extLst>
           </p:cNvPr>
@@ -3984,7 +3984,7 @@
           <a:p>
             <a:fld id="{BB2556DB-1519-40E4-AF1C-F909855EDD97}" type="datetimeFigureOut">
               <a:rPr lang="en-GB" smtClean="0"/>
-              <a:t>2018-01-28</a:t>
+              <a:t>2018-03-15</a:t>
             </a:fld>
             <a:endParaRPr lang="en-GB"/>
           </a:p>
@@ -4154,7 +4154,7 @@
           <a:p>
             <a:fld id="{BB2556DB-1519-40E4-AF1C-F909855EDD97}" type="datetimeFigureOut">
               <a:rPr lang="en-GB" smtClean="0"/>
-              <a:t>2018-01-28</a:t>
+              <a:t>2018-03-15</a:t>
             </a:fld>
             <a:endParaRPr lang="en-GB"/>
           </a:p>
@@ -4334,7 +4334,7 @@
           <a:p>
             <a:fld id="{BB2556DB-1519-40E4-AF1C-F909855EDD97}" type="datetimeFigureOut">
               <a:rPr lang="en-GB" smtClean="0"/>
-              <a:t>2018-01-28</a:t>
+              <a:t>2018-03-15</a:t>
             </a:fld>
             <a:endParaRPr lang="en-GB"/>
           </a:p>
@@ -4452,7 +4452,7 @@
           <a:p>
             <a:fld id="{BB2556DB-1519-40E4-AF1C-F909855EDD97}" type="datetimeFigureOut">
               <a:rPr lang="en-GB" smtClean="0"/>
-              <a:t>2018-01-28</a:t>
+              <a:t>2018-03-15</a:t>
             </a:fld>
             <a:endParaRPr lang="en-GB"/>
           </a:p>
@@ -4535,7 +4535,7 @@
           <p:cNvPr id="2" name="Title 1">
             <a:extLst>
               <a:ext uri="{FF2B5EF4-FFF2-40B4-BE49-F238E27FC236}">
-                <a16:creationId xmlns="" xmlns:a16="http://schemas.microsoft.com/office/drawing/2014/main" id="{AAAC300C-DDCD-4815-A851-D27410C002C4}"/>
+                <a16:creationId xmlns:a16="http://schemas.microsoft.com/office/drawing/2014/main" xmlns="" id="{AAAC300C-DDCD-4815-A851-D27410C002C4}"/>
               </a:ext>
             </a:extLst>
           </p:cNvPr>
@@ -4573,7 +4573,7 @@
           <p:cNvPr id="3" name="Text Placeholder 2">
             <a:extLst>
               <a:ext uri="{FF2B5EF4-FFF2-40B4-BE49-F238E27FC236}">
-                <a16:creationId xmlns="" xmlns:a16="http://schemas.microsoft.com/office/drawing/2014/main" id="{71D70F57-38B3-443C-8310-1B6EF0186E83}"/>
+                <a16:creationId xmlns:a16="http://schemas.microsoft.com/office/drawing/2014/main" xmlns="" id="{71D70F57-38B3-443C-8310-1B6EF0186E83}"/>
               </a:ext>
             </a:extLst>
           </p:cNvPr>
@@ -4698,7 +4698,7 @@
           <p:cNvPr id="4" name="Date Placeholder 3">
             <a:extLst>
               <a:ext uri="{FF2B5EF4-FFF2-40B4-BE49-F238E27FC236}">
-                <a16:creationId xmlns="" xmlns:a16="http://schemas.microsoft.com/office/drawing/2014/main" id="{CEE46B92-1656-4AB0-B92C-41936E9B09B4}"/>
+                <a16:creationId xmlns:a16="http://schemas.microsoft.com/office/drawing/2014/main" xmlns="" id="{CEE46B92-1656-4AB0-B92C-41936E9B09B4}"/>
               </a:ext>
             </a:extLst>
           </p:cNvPr>
@@ -4716,7 +4716,7 @@
           <a:p>
             <a:fld id="{AEC09C50-853A-420B-8C26-7439C86401C0}" type="datetimeFigureOut">
               <a:rPr lang="en-GB" smtClean="0"/>
-              <a:t>2018-01-28</a:t>
+              <a:t>2018-03-15</a:t>
             </a:fld>
             <a:endParaRPr lang="en-GB"/>
           </a:p>
@@ -4727,7 +4727,7 @@
           <p:cNvPr id="5" name="Footer Placeholder 4">
             <a:extLst>
               <a:ext uri="{FF2B5EF4-FFF2-40B4-BE49-F238E27FC236}">
-                <a16:creationId xmlns="" xmlns:a16="http://schemas.microsoft.com/office/drawing/2014/main" id="{7DC8305A-64D0-4AFB-8642-6845BCEBBD8E}"/>
+                <a16:creationId xmlns:a16="http://schemas.microsoft.com/office/drawing/2014/main" xmlns="" id="{7DC8305A-64D0-4AFB-8642-6845BCEBBD8E}"/>
               </a:ext>
             </a:extLst>
           </p:cNvPr>
@@ -4752,7 +4752,7 @@
           <p:cNvPr id="6" name="Slide Number Placeholder 5">
             <a:extLst>
               <a:ext uri="{FF2B5EF4-FFF2-40B4-BE49-F238E27FC236}">
-                <a16:creationId xmlns="" xmlns:a16="http://schemas.microsoft.com/office/drawing/2014/main" id="{5CD65ACC-878F-4FFE-8CA3-4D11A4DF969D}"/>
+                <a16:creationId xmlns:a16="http://schemas.microsoft.com/office/drawing/2014/main" xmlns="" id="{5CD65ACC-878F-4FFE-8CA3-4D11A4DF969D}"/>
               </a:ext>
             </a:extLst>
           </p:cNvPr>
@@ -4811,7 +4811,7 @@
           <p:cNvPr id="2" name="Title 1">
             <a:extLst>
               <a:ext uri="{FF2B5EF4-FFF2-40B4-BE49-F238E27FC236}">
-                <a16:creationId xmlns="" xmlns:a16="http://schemas.microsoft.com/office/drawing/2014/main" id="{C22E1C61-B0A3-4D79-87F0-D3FE72B442EC}"/>
+                <a16:creationId xmlns:a16="http://schemas.microsoft.com/office/drawing/2014/main" xmlns="" id="{C22E1C61-B0A3-4D79-87F0-D3FE72B442EC}"/>
               </a:ext>
             </a:extLst>
           </p:cNvPr>
@@ -4840,7 +4840,7 @@
           <p:cNvPr id="3" name="Content Placeholder 2">
             <a:extLst>
               <a:ext uri="{FF2B5EF4-FFF2-40B4-BE49-F238E27FC236}">
-                <a16:creationId xmlns="" xmlns:a16="http://schemas.microsoft.com/office/drawing/2014/main" id="{8CF6C057-BBB5-4F28-A87E-105844231C32}"/>
+                <a16:creationId xmlns:a16="http://schemas.microsoft.com/office/drawing/2014/main" xmlns="" id="{8CF6C057-BBB5-4F28-A87E-105844231C32}"/>
               </a:ext>
             </a:extLst>
           </p:cNvPr>
@@ -4903,7 +4903,7 @@
           <p:cNvPr id="4" name="Content Placeholder 3">
             <a:extLst>
               <a:ext uri="{FF2B5EF4-FFF2-40B4-BE49-F238E27FC236}">
-                <a16:creationId xmlns="" xmlns:a16="http://schemas.microsoft.com/office/drawing/2014/main" id="{8C9AE18C-33A9-443E-928F-81EC04DF5738}"/>
+                <a16:creationId xmlns:a16="http://schemas.microsoft.com/office/drawing/2014/main" xmlns="" id="{8C9AE18C-33A9-443E-928F-81EC04DF5738}"/>
               </a:ext>
             </a:extLst>
           </p:cNvPr>
@@ -4966,7 +4966,7 @@
           <p:cNvPr id="5" name="Date Placeholder 4">
             <a:extLst>
               <a:ext uri="{FF2B5EF4-FFF2-40B4-BE49-F238E27FC236}">
-                <a16:creationId xmlns="" xmlns:a16="http://schemas.microsoft.com/office/drawing/2014/main" id="{41107389-B4BB-487C-995E-6E58CFAF6E9D}"/>
+                <a16:creationId xmlns:a16="http://schemas.microsoft.com/office/drawing/2014/main" xmlns="" id="{41107389-B4BB-487C-995E-6E58CFAF6E9D}"/>
               </a:ext>
             </a:extLst>
           </p:cNvPr>
@@ -4984,7 +4984,7 @@
           <a:p>
             <a:fld id="{AEC09C50-853A-420B-8C26-7439C86401C0}" type="datetimeFigureOut">
               <a:rPr lang="en-GB" smtClean="0"/>
-              <a:t>2018-01-28</a:t>
+              <a:t>2018-03-15</a:t>
             </a:fld>
             <a:endParaRPr lang="en-GB"/>
           </a:p>
@@ -4995,7 +4995,7 @@
           <p:cNvPr id="6" name="Footer Placeholder 5">
             <a:extLst>
               <a:ext uri="{FF2B5EF4-FFF2-40B4-BE49-F238E27FC236}">
-                <a16:creationId xmlns="" xmlns:a16="http://schemas.microsoft.com/office/drawing/2014/main" id="{3E9CD8BB-3986-4FA9-834F-317E88D998F2}"/>
+                <a16:creationId xmlns:a16="http://schemas.microsoft.com/office/drawing/2014/main" xmlns="" id="{3E9CD8BB-3986-4FA9-834F-317E88D998F2}"/>
               </a:ext>
             </a:extLst>
           </p:cNvPr>
@@ -5020,7 +5020,7 @@
           <p:cNvPr id="7" name="Slide Number Placeholder 6">
             <a:extLst>
               <a:ext uri="{FF2B5EF4-FFF2-40B4-BE49-F238E27FC236}">
-                <a16:creationId xmlns="" xmlns:a16="http://schemas.microsoft.com/office/drawing/2014/main" id="{8D5B0155-25C5-4F31-B914-54F60CD5DEBF}"/>
+                <a16:creationId xmlns:a16="http://schemas.microsoft.com/office/drawing/2014/main" xmlns="" id="{8D5B0155-25C5-4F31-B914-54F60CD5DEBF}"/>
               </a:ext>
             </a:extLst>
           </p:cNvPr>
@@ -5079,7 +5079,7 @@
           <p:cNvPr id="2" name="Title 1">
             <a:extLst>
               <a:ext uri="{FF2B5EF4-FFF2-40B4-BE49-F238E27FC236}">
-                <a16:creationId xmlns="" xmlns:a16="http://schemas.microsoft.com/office/drawing/2014/main" id="{2661A003-2765-44CA-9145-AB1528F4C2E9}"/>
+                <a16:creationId xmlns:a16="http://schemas.microsoft.com/office/drawing/2014/main" xmlns="" id="{2661A003-2765-44CA-9145-AB1528F4C2E9}"/>
               </a:ext>
             </a:extLst>
           </p:cNvPr>
@@ -5113,7 +5113,7 @@
           <p:cNvPr id="3" name="Text Placeholder 2">
             <a:extLst>
               <a:ext uri="{FF2B5EF4-FFF2-40B4-BE49-F238E27FC236}">
-                <a16:creationId xmlns="" xmlns:a16="http://schemas.microsoft.com/office/drawing/2014/main" id="{E9329458-CFA5-4FC5-83BF-8DEED1663F67}"/>
+                <a16:creationId xmlns:a16="http://schemas.microsoft.com/office/drawing/2014/main" xmlns="" id="{E9329458-CFA5-4FC5-83BF-8DEED1663F67}"/>
               </a:ext>
             </a:extLst>
           </p:cNvPr>
@@ -5184,7 +5184,7 @@
           <p:cNvPr id="4" name="Content Placeholder 3">
             <a:extLst>
               <a:ext uri="{FF2B5EF4-FFF2-40B4-BE49-F238E27FC236}">
-                <a16:creationId xmlns="" xmlns:a16="http://schemas.microsoft.com/office/drawing/2014/main" id="{00973E35-5790-4541-A9E9-6EAD8746298F}"/>
+                <a16:creationId xmlns:a16="http://schemas.microsoft.com/office/drawing/2014/main" xmlns="" id="{00973E35-5790-4541-A9E9-6EAD8746298F}"/>
               </a:ext>
             </a:extLst>
           </p:cNvPr>
@@ -5247,7 +5247,7 @@
           <p:cNvPr id="5" name="Text Placeholder 4">
             <a:extLst>
               <a:ext uri="{FF2B5EF4-FFF2-40B4-BE49-F238E27FC236}">
-                <a16:creationId xmlns="" xmlns:a16="http://schemas.microsoft.com/office/drawing/2014/main" id="{A79D0B04-D124-4DE1-8DDA-4298E11D9543}"/>
+                <a16:creationId xmlns:a16="http://schemas.microsoft.com/office/drawing/2014/main" xmlns="" id="{A79D0B04-D124-4DE1-8DDA-4298E11D9543}"/>
               </a:ext>
             </a:extLst>
           </p:cNvPr>
@@ -5318,7 +5318,7 @@
           <p:cNvPr id="6" name="Content Placeholder 5">
             <a:extLst>
               <a:ext uri="{FF2B5EF4-FFF2-40B4-BE49-F238E27FC236}">
-                <a16:creationId xmlns="" xmlns:a16="http://schemas.microsoft.com/office/drawing/2014/main" id="{B6A6F19A-1257-47E9-B4A0-44A2F7E94FF1}"/>
+                <a16:creationId xmlns:a16="http://schemas.microsoft.com/office/drawing/2014/main" xmlns="" id="{B6A6F19A-1257-47E9-B4A0-44A2F7E94FF1}"/>
               </a:ext>
             </a:extLst>
           </p:cNvPr>
@@ -5381,7 +5381,7 @@
           <p:cNvPr id="7" name="Date Placeholder 6">
             <a:extLst>
               <a:ext uri="{FF2B5EF4-FFF2-40B4-BE49-F238E27FC236}">
-                <a16:creationId xmlns="" xmlns:a16="http://schemas.microsoft.com/office/drawing/2014/main" id="{72AE3A17-5374-467D-86C2-C645B787C384}"/>
+                <a16:creationId xmlns:a16="http://schemas.microsoft.com/office/drawing/2014/main" xmlns="" id="{72AE3A17-5374-467D-86C2-C645B787C384}"/>
               </a:ext>
             </a:extLst>
           </p:cNvPr>
@@ -5399,7 +5399,7 @@
           <a:p>
             <a:fld id="{AEC09C50-853A-420B-8C26-7439C86401C0}" type="datetimeFigureOut">
               <a:rPr lang="en-GB" smtClean="0"/>
-              <a:t>2018-01-28</a:t>
+              <a:t>2018-03-15</a:t>
             </a:fld>
             <a:endParaRPr lang="en-GB"/>
           </a:p>
@@ -5410,7 +5410,7 @@
           <p:cNvPr id="8" name="Footer Placeholder 7">
             <a:extLst>
               <a:ext uri="{FF2B5EF4-FFF2-40B4-BE49-F238E27FC236}">
-                <a16:creationId xmlns="" xmlns:a16="http://schemas.microsoft.com/office/drawing/2014/main" id="{5283F0D5-8638-49FD-89DB-01F6EE922328}"/>
+                <a16:creationId xmlns:a16="http://schemas.microsoft.com/office/drawing/2014/main" xmlns="" id="{5283F0D5-8638-49FD-89DB-01F6EE922328}"/>
               </a:ext>
             </a:extLst>
           </p:cNvPr>
@@ -5435,7 +5435,7 @@
           <p:cNvPr id="9" name="Slide Number Placeholder 8">
             <a:extLst>
               <a:ext uri="{FF2B5EF4-FFF2-40B4-BE49-F238E27FC236}">
-                <a16:creationId xmlns="" xmlns:a16="http://schemas.microsoft.com/office/drawing/2014/main" id="{C0267428-4293-4A71-9B75-D565941979E2}"/>
+                <a16:creationId xmlns:a16="http://schemas.microsoft.com/office/drawing/2014/main" xmlns="" id="{C0267428-4293-4A71-9B75-D565941979E2}"/>
               </a:ext>
             </a:extLst>
           </p:cNvPr>
@@ -5494,7 +5494,7 @@
           <p:cNvPr id="2" name="Title 1">
             <a:extLst>
               <a:ext uri="{FF2B5EF4-FFF2-40B4-BE49-F238E27FC236}">
-                <a16:creationId xmlns="" xmlns:a16="http://schemas.microsoft.com/office/drawing/2014/main" id="{83526E88-76D3-4410-8E61-DDEF66B15330}"/>
+                <a16:creationId xmlns:a16="http://schemas.microsoft.com/office/drawing/2014/main" xmlns="" id="{83526E88-76D3-4410-8E61-DDEF66B15330}"/>
               </a:ext>
             </a:extLst>
           </p:cNvPr>
@@ -5523,7 +5523,7 @@
           <p:cNvPr id="3" name="Date Placeholder 2">
             <a:extLst>
               <a:ext uri="{FF2B5EF4-FFF2-40B4-BE49-F238E27FC236}">
-                <a16:creationId xmlns="" xmlns:a16="http://schemas.microsoft.com/office/drawing/2014/main" id="{EB4D1369-8B85-4E73-89D6-76C188B98E13}"/>
+                <a16:creationId xmlns:a16="http://schemas.microsoft.com/office/drawing/2014/main" xmlns="" id="{EB4D1369-8B85-4E73-89D6-76C188B98E13}"/>
               </a:ext>
             </a:extLst>
           </p:cNvPr>
@@ -5541,7 +5541,7 @@
           <a:p>
             <a:fld id="{AEC09C50-853A-420B-8C26-7439C86401C0}" type="datetimeFigureOut">
               <a:rPr lang="en-GB" smtClean="0"/>
-              <a:t>2018-01-28</a:t>
+              <a:t>2018-03-15</a:t>
             </a:fld>
             <a:endParaRPr lang="en-GB"/>
           </a:p>
@@ -5552,7 +5552,7 @@
           <p:cNvPr id="4" name="Footer Placeholder 3">
             <a:extLst>
               <a:ext uri="{FF2B5EF4-FFF2-40B4-BE49-F238E27FC236}">
-                <a16:creationId xmlns="" xmlns:a16="http://schemas.microsoft.com/office/drawing/2014/main" id="{489D4C4A-EE05-4344-A36C-6C671EE5E049}"/>
+                <a16:creationId xmlns:a16="http://schemas.microsoft.com/office/drawing/2014/main" xmlns="" id="{489D4C4A-EE05-4344-A36C-6C671EE5E049}"/>
               </a:ext>
             </a:extLst>
           </p:cNvPr>
@@ -5577,7 +5577,7 @@
           <p:cNvPr id="5" name="Slide Number Placeholder 4">
             <a:extLst>
               <a:ext uri="{FF2B5EF4-FFF2-40B4-BE49-F238E27FC236}">
-                <a16:creationId xmlns="" xmlns:a16="http://schemas.microsoft.com/office/drawing/2014/main" id="{DD1109B2-CB6D-4218-9B3E-14BAEEE90F3E}"/>
+                <a16:creationId xmlns:a16="http://schemas.microsoft.com/office/drawing/2014/main" xmlns="" id="{DD1109B2-CB6D-4218-9B3E-14BAEEE90F3E}"/>
               </a:ext>
             </a:extLst>
           </p:cNvPr>
@@ -5636,7 +5636,7 @@
           <p:cNvPr id="2" name="Date Placeholder 1">
             <a:extLst>
               <a:ext uri="{FF2B5EF4-FFF2-40B4-BE49-F238E27FC236}">
-                <a16:creationId xmlns="" xmlns:a16="http://schemas.microsoft.com/office/drawing/2014/main" id="{F2235B87-6899-48A6-999A-BC97C2BBB929}"/>
+                <a16:creationId xmlns:a16="http://schemas.microsoft.com/office/drawing/2014/main" xmlns="" id="{F2235B87-6899-48A6-999A-BC97C2BBB929}"/>
               </a:ext>
             </a:extLst>
           </p:cNvPr>
@@ -5654,7 +5654,7 @@
           <a:p>
             <a:fld id="{AEC09C50-853A-420B-8C26-7439C86401C0}" type="datetimeFigureOut">
               <a:rPr lang="en-GB" smtClean="0"/>
-              <a:t>2018-01-28</a:t>
+              <a:t>2018-03-15</a:t>
             </a:fld>
             <a:endParaRPr lang="en-GB"/>
           </a:p>
@@ -5665,7 +5665,7 @@
           <p:cNvPr id="3" name="Footer Placeholder 2">
             <a:extLst>
               <a:ext uri="{FF2B5EF4-FFF2-40B4-BE49-F238E27FC236}">
-                <a16:creationId xmlns="" xmlns:a16="http://schemas.microsoft.com/office/drawing/2014/main" id="{C8769E30-B6BB-4F0A-B22F-C95BF219412D}"/>
+                <a16:creationId xmlns:a16="http://schemas.microsoft.com/office/drawing/2014/main" xmlns="" id="{C8769E30-B6BB-4F0A-B22F-C95BF219412D}"/>
               </a:ext>
             </a:extLst>
           </p:cNvPr>
@@ -5690,7 +5690,7 @@
           <p:cNvPr id="4" name="Slide Number Placeholder 3">
             <a:extLst>
               <a:ext uri="{FF2B5EF4-FFF2-40B4-BE49-F238E27FC236}">
-                <a16:creationId xmlns="" xmlns:a16="http://schemas.microsoft.com/office/drawing/2014/main" id="{BC7650B4-2968-4449-A4B1-2C77F10005BB}"/>
+                <a16:creationId xmlns:a16="http://schemas.microsoft.com/office/drawing/2014/main" xmlns="" id="{BC7650B4-2968-4449-A4B1-2C77F10005BB}"/>
               </a:ext>
             </a:extLst>
           </p:cNvPr>
@@ -5749,7 +5749,7 @@
           <p:cNvPr id="2" name="Title 1">
             <a:extLst>
               <a:ext uri="{FF2B5EF4-FFF2-40B4-BE49-F238E27FC236}">
-                <a16:creationId xmlns="" xmlns:a16="http://schemas.microsoft.com/office/drawing/2014/main" id="{8E1ECCE6-D223-4A9C-AE1D-E9A2DFF0FC8E}"/>
+                <a16:creationId xmlns:a16="http://schemas.microsoft.com/office/drawing/2014/main" xmlns="" id="{8E1ECCE6-D223-4A9C-AE1D-E9A2DFF0FC8E}"/>
               </a:ext>
             </a:extLst>
           </p:cNvPr>
@@ -5787,7 +5787,7 @@
           <p:cNvPr id="3" name="Content Placeholder 2">
             <a:extLst>
               <a:ext uri="{FF2B5EF4-FFF2-40B4-BE49-F238E27FC236}">
-                <a16:creationId xmlns="" xmlns:a16="http://schemas.microsoft.com/office/drawing/2014/main" id="{B82EC1F7-6D9E-4A6E-83FA-3A28DA42147B}"/>
+                <a16:creationId xmlns:a16="http://schemas.microsoft.com/office/drawing/2014/main" xmlns="" id="{B82EC1F7-6D9E-4A6E-83FA-3A28DA42147B}"/>
               </a:ext>
             </a:extLst>
           </p:cNvPr>
@@ -5878,7 +5878,7 @@
           <p:cNvPr id="4" name="Text Placeholder 3">
             <a:extLst>
               <a:ext uri="{FF2B5EF4-FFF2-40B4-BE49-F238E27FC236}">
-                <a16:creationId xmlns="" xmlns:a16="http://schemas.microsoft.com/office/drawing/2014/main" id="{AF898F10-245A-48D3-9CBC-6CC749D412AA}"/>
+                <a16:creationId xmlns:a16="http://schemas.microsoft.com/office/drawing/2014/main" xmlns="" id="{AF898F10-245A-48D3-9CBC-6CC749D412AA}"/>
               </a:ext>
             </a:extLst>
           </p:cNvPr>
@@ -5949,7 +5949,7 @@
           <p:cNvPr id="5" name="Date Placeholder 4">
             <a:extLst>
               <a:ext uri="{FF2B5EF4-FFF2-40B4-BE49-F238E27FC236}">
-                <a16:creationId xmlns="" xmlns:a16="http://schemas.microsoft.com/office/drawing/2014/main" id="{32036AB4-92DA-44C3-87E4-1649313632B1}"/>
+                <a16:creationId xmlns:a16="http://schemas.microsoft.com/office/drawing/2014/main" xmlns="" id="{32036AB4-92DA-44C3-87E4-1649313632B1}"/>
               </a:ext>
             </a:extLst>
           </p:cNvPr>
@@ -5967,7 +5967,7 @@
           <a:p>
             <a:fld id="{AEC09C50-853A-420B-8C26-7439C86401C0}" type="datetimeFigureOut">
               <a:rPr lang="en-GB" smtClean="0"/>
-              <a:t>2018-01-28</a:t>
+              <a:t>2018-03-15</a:t>
             </a:fld>
             <a:endParaRPr lang="en-GB"/>
           </a:p>
@@ -5978,7 +5978,7 @@
           <p:cNvPr id="6" name="Footer Placeholder 5">
             <a:extLst>
               <a:ext uri="{FF2B5EF4-FFF2-40B4-BE49-F238E27FC236}">
-                <a16:creationId xmlns="" xmlns:a16="http://schemas.microsoft.com/office/drawing/2014/main" id="{1337DAE8-487C-4D6E-803D-F8F4FA67CA44}"/>
+                <a16:creationId xmlns:a16="http://schemas.microsoft.com/office/drawing/2014/main" xmlns="" id="{1337DAE8-487C-4D6E-803D-F8F4FA67CA44}"/>
               </a:ext>
             </a:extLst>
           </p:cNvPr>
@@ -6003,7 +6003,7 @@
           <p:cNvPr id="7" name="Slide Number Placeholder 6">
             <a:extLst>
               <a:ext uri="{FF2B5EF4-FFF2-40B4-BE49-F238E27FC236}">
-                <a16:creationId xmlns="" xmlns:a16="http://schemas.microsoft.com/office/drawing/2014/main" id="{CC449275-2FF4-4C64-ABAB-142D3BF60EAE}"/>
+                <a16:creationId xmlns:a16="http://schemas.microsoft.com/office/drawing/2014/main" xmlns="" id="{CC449275-2FF4-4C64-ABAB-142D3BF60EAE}"/>
               </a:ext>
             </a:extLst>
           </p:cNvPr>
@@ -6062,7 +6062,7 @@
           <p:cNvPr id="2" name="Title 1">
             <a:extLst>
               <a:ext uri="{FF2B5EF4-FFF2-40B4-BE49-F238E27FC236}">
-                <a16:creationId xmlns="" xmlns:a16="http://schemas.microsoft.com/office/drawing/2014/main" id="{D071AB62-177C-4054-8052-BBE8490E7381}"/>
+                <a16:creationId xmlns:a16="http://schemas.microsoft.com/office/drawing/2014/main" xmlns="" id="{D071AB62-177C-4054-8052-BBE8490E7381}"/>
               </a:ext>
             </a:extLst>
           </p:cNvPr>
@@ -6100,7 +6100,7 @@
           <p:cNvPr id="3" name="Picture Placeholder 2">
             <a:extLst>
               <a:ext uri="{FF2B5EF4-FFF2-40B4-BE49-F238E27FC236}">
-                <a16:creationId xmlns="" xmlns:a16="http://schemas.microsoft.com/office/drawing/2014/main" id="{A0D50678-0335-4865-AE73-1BCBF41E616A}"/>
+                <a16:creationId xmlns:a16="http://schemas.microsoft.com/office/drawing/2014/main" xmlns="" id="{A0D50678-0335-4865-AE73-1BCBF41E616A}"/>
               </a:ext>
             </a:extLst>
           </p:cNvPr>
@@ -6167,7 +6167,7 @@
           <p:cNvPr id="4" name="Text Placeholder 3">
             <a:extLst>
               <a:ext uri="{FF2B5EF4-FFF2-40B4-BE49-F238E27FC236}">
-                <a16:creationId xmlns="" xmlns:a16="http://schemas.microsoft.com/office/drawing/2014/main" id="{73ED4DA1-0F6A-4A5D-B369-9469EF35B96D}"/>
+                <a16:creationId xmlns:a16="http://schemas.microsoft.com/office/drawing/2014/main" xmlns="" id="{73ED4DA1-0F6A-4A5D-B369-9469EF35B96D}"/>
               </a:ext>
             </a:extLst>
           </p:cNvPr>
@@ -6238,7 +6238,7 @@
           <p:cNvPr id="5" name="Date Placeholder 4">
             <a:extLst>
               <a:ext uri="{FF2B5EF4-FFF2-40B4-BE49-F238E27FC236}">
-                <a16:creationId xmlns="" xmlns:a16="http://schemas.microsoft.com/office/drawing/2014/main" id="{092FC3AE-ADA3-4288-A99B-E5F02A2E42C8}"/>
+                <a16:creationId xmlns:a16="http://schemas.microsoft.com/office/drawing/2014/main" xmlns="" id="{092FC3AE-ADA3-4288-A99B-E5F02A2E42C8}"/>
               </a:ext>
             </a:extLst>
           </p:cNvPr>
@@ -6256,7 +6256,7 @@
           <a:p>
             <a:fld id="{AEC09C50-853A-420B-8C26-7439C86401C0}" type="datetimeFigureOut">
               <a:rPr lang="en-GB" smtClean="0"/>
-              <a:t>2018-01-28</a:t>
+              <a:t>2018-03-15</a:t>
             </a:fld>
             <a:endParaRPr lang="en-GB"/>
           </a:p>
@@ -6267,7 +6267,7 @@
           <p:cNvPr id="6" name="Footer Placeholder 5">
             <a:extLst>
               <a:ext uri="{FF2B5EF4-FFF2-40B4-BE49-F238E27FC236}">
-                <a16:creationId xmlns="" xmlns:a16="http://schemas.microsoft.com/office/drawing/2014/main" id="{2893494B-FAB4-440E-AAEB-FFBDB092E663}"/>
+                <a16:creationId xmlns:a16="http://schemas.microsoft.com/office/drawing/2014/main" xmlns="" id="{2893494B-FAB4-440E-AAEB-FFBDB092E663}"/>
               </a:ext>
             </a:extLst>
           </p:cNvPr>
@@ -6292,7 +6292,7 @@
           <p:cNvPr id="7" name="Slide Number Placeholder 6">
             <a:extLst>
               <a:ext uri="{FF2B5EF4-FFF2-40B4-BE49-F238E27FC236}">
-                <a16:creationId xmlns="" xmlns:a16="http://schemas.microsoft.com/office/drawing/2014/main" id="{073F7F22-A5C8-498A-800E-37E463DFAE16}"/>
+                <a16:creationId xmlns:a16="http://schemas.microsoft.com/office/drawing/2014/main" xmlns="" id="{073F7F22-A5C8-498A-800E-37E463DFAE16}"/>
               </a:ext>
             </a:extLst>
           </p:cNvPr>
@@ -6356,7 +6356,7 @@
           <p:cNvPr id="2" name="Title Placeholder 1">
             <a:extLst>
               <a:ext uri="{FF2B5EF4-FFF2-40B4-BE49-F238E27FC236}">
-                <a16:creationId xmlns="" xmlns:a16="http://schemas.microsoft.com/office/drawing/2014/main" id="{F0BB2809-085E-4223-9992-2BB5FBC08E6E}"/>
+                <a16:creationId xmlns:a16="http://schemas.microsoft.com/office/drawing/2014/main" xmlns="" id="{F0BB2809-085E-4223-9992-2BB5FBC08E6E}"/>
               </a:ext>
             </a:extLst>
           </p:cNvPr>
@@ -6395,7 +6395,7 @@
           <p:cNvPr id="3" name="Text Placeholder 2">
             <a:extLst>
               <a:ext uri="{FF2B5EF4-FFF2-40B4-BE49-F238E27FC236}">
-                <a16:creationId xmlns="" xmlns:a16="http://schemas.microsoft.com/office/drawing/2014/main" id="{FEC23C1B-CC61-40EA-905D-95DABCC0D1B8}"/>
+                <a16:creationId xmlns:a16="http://schemas.microsoft.com/office/drawing/2014/main" xmlns="" id="{FEC23C1B-CC61-40EA-905D-95DABCC0D1B8}"/>
               </a:ext>
             </a:extLst>
           </p:cNvPr>
@@ -6463,7 +6463,7 @@
           <p:cNvPr id="4" name="Date Placeholder 3">
             <a:extLst>
               <a:ext uri="{FF2B5EF4-FFF2-40B4-BE49-F238E27FC236}">
-                <a16:creationId xmlns="" xmlns:a16="http://schemas.microsoft.com/office/drawing/2014/main" id="{129CB7B1-CB51-4ACA-B179-C824284E8378}"/>
+                <a16:creationId xmlns:a16="http://schemas.microsoft.com/office/drawing/2014/main" xmlns="" id="{129CB7B1-CB51-4ACA-B179-C824284E8378}"/>
               </a:ext>
             </a:extLst>
           </p:cNvPr>
@@ -6499,7 +6499,7 @@
           <a:p>
             <a:fld id="{AEC09C50-853A-420B-8C26-7439C86401C0}" type="datetimeFigureOut">
               <a:rPr lang="en-GB" smtClean="0"/>
-              <a:t>2018-01-28</a:t>
+              <a:t>2018-03-15</a:t>
             </a:fld>
             <a:endParaRPr lang="en-GB"/>
           </a:p>
@@ -6510,7 +6510,7 @@
           <p:cNvPr id="5" name="Footer Placeholder 4">
             <a:extLst>
               <a:ext uri="{FF2B5EF4-FFF2-40B4-BE49-F238E27FC236}">
-                <a16:creationId xmlns="" xmlns:a16="http://schemas.microsoft.com/office/drawing/2014/main" id="{06C0286E-4114-4920-A399-1E3F7F913343}"/>
+                <a16:creationId xmlns:a16="http://schemas.microsoft.com/office/drawing/2014/main" xmlns="" id="{06C0286E-4114-4920-A399-1E3F7F913343}"/>
               </a:ext>
             </a:extLst>
           </p:cNvPr>
@@ -6553,7 +6553,7 @@
           <p:cNvPr id="6" name="Slide Number Placeholder 5">
             <a:extLst>
               <a:ext uri="{FF2B5EF4-FFF2-40B4-BE49-F238E27FC236}">
-                <a16:creationId xmlns="" xmlns:a16="http://schemas.microsoft.com/office/drawing/2014/main" id="{496FAA64-61A7-4E2F-B9B4-DB069A6171DB}"/>
+                <a16:creationId xmlns:a16="http://schemas.microsoft.com/office/drawing/2014/main" xmlns="" id="{496FAA64-61A7-4E2F-B9B4-DB069A6171DB}"/>
               </a:ext>
             </a:extLst>
           </p:cNvPr>
@@ -7051,7 +7051,7 @@
           <a:p>
             <a:fld id="{BB2556DB-1519-40E4-AF1C-F909855EDD97}" type="datetimeFigureOut">
               <a:rPr lang="en-GB" smtClean="0"/>
-              <a:t>2018-01-28</a:t>
+              <a:t>2018-03-15</a:t>
             </a:fld>
             <a:endParaRPr lang="en-GB"/>
           </a:p>
@@ -7535,7 +7535,7 @@
           <p:cNvPr id="2" name="TextBox 1">
             <a:extLst>
               <a:ext uri="{FF2B5EF4-FFF2-40B4-BE49-F238E27FC236}">
-                <a16:creationId xmlns="" xmlns:a16="http://schemas.microsoft.com/office/drawing/2014/main" id="{6F77B270-35F1-4A5B-875A-9BFD13BC898E}"/>
+                <a16:creationId xmlns:a16="http://schemas.microsoft.com/office/drawing/2014/main" xmlns="" id="{6F77B270-35F1-4A5B-875A-9BFD13BC898E}"/>
               </a:ext>
             </a:extLst>
           </p:cNvPr>
@@ -8860,7 +8860,7 @@
           <p:cNvPr id="2" name="TextBox 1">
             <a:extLst>
               <a:ext uri="{FF2B5EF4-FFF2-40B4-BE49-F238E27FC236}">
-                <a16:creationId xmlns="" xmlns:a16="http://schemas.microsoft.com/office/drawing/2014/main" id="{6F77B270-35F1-4A5B-875A-9BFD13BC898E}"/>
+                <a16:creationId xmlns:a16="http://schemas.microsoft.com/office/drawing/2014/main" xmlns="" id="{6F77B270-35F1-4A5B-875A-9BFD13BC898E}"/>
               </a:ext>
             </a:extLst>
           </p:cNvPr>
@@ -10185,7 +10185,7 @@
           <p:cNvPr id="2" name="TextBox 1">
             <a:extLst>
               <a:ext uri="{FF2B5EF4-FFF2-40B4-BE49-F238E27FC236}">
-                <a16:creationId xmlns="" xmlns:a16="http://schemas.microsoft.com/office/drawing/2014/main" id="{6F77B270-35F1-4A5B-875A-9BFD13BC898E}"/>
+                <a16:creationId xmlns:a16="http://schemas.microsoft.com/office/drawing/2014/main" xmlns="" id="{6F77B270-35F1-4A5B-875A-9BFD13BC898E}"/>
               </a:ext>
             </a:extLst>
           </p:cNvPr>
@@ -11510,7 +11510,7 @@
           <p:cNvPr id="2" name="TextBox 1">
             <a:extLst>
               <a:ext uri="{FF2B5EF4-FFF2-40B4-BE49-F238E27FC236}">
-                <a16:creationId xmlns="" xmlns:a16="http://schemas.microsoft.com/office/drawing/2014/main" id="{6F77B270-35F1-4A5B-875A-9BFD13BC898E}"/>
+                <a16:creationId xmlns:a16="http://schemas.microsoft.com/office/drawing/2014/main" xmlns="" id="{6F77B270-35F1-4A5B-875A-9BFD13BC898E}"/>
               </a:ext>
             </a:extLst>
           </p:cNvPr>
@@ -12830,16 +12830,1311 @@
           <a:chExt cx="0" cy="0"/>
         </a:xfrm>
       </p:grpSpPr>
+      <p:sp>
+        <p:nvSpPr>
+          <p:cNvPr id="2" name="TextBox 1">
+            <a:extLst>
+              <a:ext uri="{FF2B5EF4-FFF2-40B4-BE49-F238E27FC236}">
+                <a16:creationId xmlns:a16="http://schemas.microsoft.com/office/drawing/2014/main" xmlns="" id="{6F77B270-35F1-4A5B-875A-9BFD13BC898E}"/>
+              </a:ext>
+            </a:extLst>
+          </p:cNvPr>
+          <p:cNvSpPr txBox="1"/>
+          <p:nvPr/>
+        </p:nvSpPr>
+        <p:spPr>
+          <a:xfrm>
+            <a:off x="3779500" y="-6111"/>
+            <a:ext cx="4633001" cy="646331"/>
+          </a:xfrm>
+          <a:prstGeom prst="rect">
+            <a:avLst/>
+          </a:prstGeom>
+          <a:noFill/>
+        </p:spPr>
+        <p:txBody>
+          <a:bodyPr wrap="square" rtlCol="0">
+            <a:spAutoFit/>
+          </a:bodyPr>
+          <a:lstStyle/>
+          <a:p>
+            <a:r>
+              <a:rPr lang="en-GB" sz="3600" b="1" u="sng" dirty="0" smtClean="0">
+                <a:solidFill>
+                  <a:srgbClr val="FF0000"/>
+                </a:solidFill>
+                <a:highlight>
+                  <a:srgbClr val="00FFFF"/>
+                </a:highlight>
+                <a:latin typeface="Courier New" panose="02070309020205020404" pitchFamily="49" charset="0"/>
+                <a:cs typeface="Courier New" panose="02070309020205020404" pitchFamily="49" charset="0"/>
+                <a:hlinkClick r:id="rId2"/>
+              </a:rPr>
+              <a:t>SAM (BAM) Format</a:t>
+            </a:r>
+            <a:endParaRPr lang="en-GB" sz="3600" b="1" u="sng" dirty="0">
+              <a:solidFill>
+                <a:srgbClr val="FF0000"/>
+              </a:solidFill>
+              <a:highlight>
+                <a:srgbClr val="00FFFF"/>
+              </a:highlight>
+              <a:latin typeface="Courier New" panose="02070309020205020404" pitchFamily="49" charset="0"/>
+              <a:cs typeface="Courier New" panose="02070309020205020404" pitchFamily="49" charset="0"/>
+            </a:endParaRPr>
+          </a:p>
+        </p:txBody>
+      </p:sp>
+      <p:sp>
+        <p:nvSpPr>
+          <p:cNvPr id="7" name="TextBox 6"/>
+          <p:cNvSpPr txBox="1"/>
+          <p:nvPr/>
+        </p:nvSpPr>
+        <p:spPr>
+          <a:xfrm>
+            <a:off x="-4" y="1043461"/>
+            <a:ext cx="12192000" cy="1754326"/>
+          </a:xfrm>
+          <a:prstGeom prst="rect">
+            <a:avLst/>
+          </a:prstGeom>
+          <a:solidFill>
+            <a:schemeClr val="accent5">
+              <a:lumMod val="40000"/>
+              <a:lumOff val="60000"/>
+            </a:schemeClr>
+          </a:solidFill>
+        </p:spPr>
+        <p:txBody>
+          <a:bodyPr wrap="square" rtlCol="0">
+            <a:spAutoFit/>
+          </a:bodyPr>
+          <a:lstStyle/>
+          <a:p>
+            <a:r>
+              <a:rPr lang="en-GB" sz="1200" b="1" dirty="0" smtClean="0">
+                <a:latin typeface="Courier New" panose="02070309020205020404" pitchFamily="49" charset="0"/>
+                <a:cs typeface="Courier New" panose="02070309020205020404" pitchFamily="49" charset="0"/>
+              </a:rPr>
+              <a:t>HWI:2201:3405:87192</a:t>
+            </a:r>
+            <a:r>
+              <a:rPr lang="en-GB" sz="1200" b="1" dirty="0">
+                <a:latin typeface="Courier New" panose="02070309020205020404" pitchFamily="49" charset="0"/>
+                <a:cs typeface="Courier New" panose="02070309020205020404" pitchFamily="49" charset="0"/>
+              </a:rPr>
+              <a:t> </a:t>
+            </a:r>
+            <a:r>
+              <a:rPr lang="en-GB" sz="1200" b="1" dirty="0" smtClean="0">
+                <a:latin typeface="Courier New" panose="02070309020205020404" pitchFamily="49" charset="0"/>
+                <a:cs typeface="Courier New" panose="02070309020205020404" pitchFamily="49" charset="0"/>
+              </a:rPr>
+              <a:t>    99     </a:t>
+            </a:r>
+            <a:r>
+              <a:rPr lang="en-GB" sz="1200" b="1" dirty="0" err="1" smtClean="0">
+                <a:latin typeface="Courier New" panose="02070309020205020404" pitchFamily="49" charset="0"/>
+                <a:cs typeface="Courier New" panose="02070309020205020404" pitchFamily="49" charset="0"/>
+              </a:rPr>
+              <a:t>dmel_mito</a:t>
+            </a:r>
+            <a:r>
+              <a:rPr lang="en-GB" sz="1200" b="1" dirty="0" smtClean="0">
+                <a:latin typeface="Courier New" panose="02070309020205020404" pitchFamily="49" charset="0"/>
+                <a:cs typeface="Courier New" panose="02070309020205020404" pitchFamily="49" charset="0"/>
+              </a:rPr>
+              <a:t>   12782       0     126M        =    12861      205     </a:t>
+            </a:r>
+          </a:p>
+          <a:p>
+            <a:r>
+              <a:rPr lang="en-GB" sz="1200" b="1" dirty="0" smtClean="0">
+                <a:latin typeface="Courier New" panose="02070309020205020404" pitchFamily="49" charset="0"/>
+                <a:cs typeface="Courier New" panose="02070309020205020404" pitchFamily="49" charset="0"/>
+              </a:rPr>
+              <a:t>HWI:2201:3405:87192     147    </a:t>
+            </a:r>
+            <a:r>
+              <a:rPr lang="en-GB" sz="1200" b="1" dirty="0" err="1" smtClean="0">
+                <a:latin typeface="Courier New" panose="02070309020205020404" pitchFamily="49" charset="0"/>
+                <a:cs typeface="Courier New" panose="02070309020205020404" pitchFamily="49" charset="0"/>
+              </a:rPr>
+              <a:t>dmel_mito</a:t>
+            </a:r>
+            <a:r>
+              <a:rPr lang="en-GB" sz="1200" b="1" dirty="0" smtClean="0">
+                <a:latin typeface="Courier New" panose="02070309020205020404" pitchFamily="49" charset="0"/>
+                <a:cs typeface="Courier New" panose="02070309020205020404" pitchFamily="49" charset="0"/>
+              </a:rPr>
+              <a:t>   12861       0     126M        =    12782      -205    </a:t>
+            </a:r>
+          </a:p>
+          <a:p>
+            <a:r>
+              <a:rPr lang="en-GB" sz="1200" b="1" dirty="0" smtClean="0">
+                <a:latin typeface="Courier New" panose="02070309020205020404" pitchFamily="49" charset="0"/>
+                <a:cs typeface="Courier New" panose="02070309020205020404" pitchFamily="49" charset="0"/>
+              </a:rPr>
+              <a:t>HWI:2103:18194:76364    163    3L          12800822    60    109M17S     =    12800832   109     </a:t>
+            </a:r>
+          </a:p>
+          <a:p>
+            <a:r>
+              <a:rPr lang="en-GB" sz="1200" b="1" dirty="0" smtClean="0">
+                <a:latin typeface="Courier New" panose="02070309020205020404" pitchFamily="49" charset="0"/>
+                <a:cs typeface="Courier New" panose="02070309020205020404" pitchFamily="49" charset="0"/>
+              </a:rPr>
+              <a:t>HWI:2212:20688:12158    99     3L          11742128    60    118M8S      =    11742129   117     </a:t>
+            </a:r>
+          </a:p>
+          <a:p>
+            <a:r>
+              <a:rPr lang="en-GB" sz="1200" b="1" dirty="0" smtClean="0">
+                <a:latin typeface="Courier New" panose="02070309020205020404" pitchFamily="49" charset="0"/>
+                <a:cs typeface="Courier New" panose="02070309020205020404" pitchFamily="49" charset="0"/>
+              </a:rPr>
+              <a:t>HWI:2212:20688:12158    147    3L          11742129    60    10S116M     =    11742128   -117    </a:t>
+            </a:r>
+          </a:p>
+          <a:p>
+            <a:r>
+              <a:rPr lang="en-GB" sz="1200" b="1" dirty="0" smtClean="0">
+                <a:latin typeface="Courier New" panose="02070309020205020404" pitchFamily="49" charset="0"/>
+                <a:cs typeface="Courier New" panose="02070309020205020404" pitchFamily="49" charset="0"/>
+              </a:rPr>
+              <a:t>HWI:2212:7490:18212     99     2L          18475464    60    24M6D102M   =    18475585   247     </a:t>
+            </a:r>
+          </a:p>
+          <a:p>
+            <a:r>
+              <a:rPr lang="en-GB" sz="1200" b="1" dirty="0" smtClean="0">
+                <a:latin typeface="Courier New" panose="02070309020205020404" pitchFamily="49" charset="0"/>
+                <a:cs typeface="Courier New" panose="02070309020205020404" pitchFamily="49" charset="0"/>
+              </a:rPr>
+              <a:t>HWI:2212:7490:18212     147    2L          18475585    60    126M        =    18475464   -247    </a:t>
+            </a:r>
+          </a:p>
+          <a:p>
+            <a:r>
+              <a:rPr lang="en-GB" sz="1200" b="1" dirty="0" smtClean="0">
+                <a:latin typeface="Courier New" panose="02070309020205020404" pitchFamily="49" charset="0"/>
+                <a:cs typeface="Courier New" panose="02070309020205020404" pitchFamily="49" charset="0"/>
+              </a:rPr>
+              <a:t>HWI:1204:13239:91066    99     3L          20938388    60    115M11S     =    20938388   114     </a:t>
+            </a:r>
+          </a:p>
+          <a:p>
+            <a:r>
+              <a:rPr lang="en-GB" sz="1200" b="1" dirty="0" smtClean="0">
+                <a:latin typeface="Courier New" panose="02070309020205020404" pitchFamily="49" charset="0"/>
+                <a:cs typeface="Courier New" panose="02070309020205020404" pitchFamily="49" charset="0"/>
+              </a:rPr>
+              <a:t>HWI:1204:13239:91066    147    3L          20938388    60    12S114M     =    20938388   -114    </a:t>
+            </a:r>
+          </a:p>
+        </p:txBody>
+      </p:sp>
+      <p:sp>
+        <p:nvSpPr>
+          <p:cNvPr id="8" name="TextBox 7"/>
+          <p:cNvSpPr txBox="1"/>
+          <p:nvPr/>
+        </p:nvSpPr>
+        <p:spPr>
+          <a:xfrm>
+            <a:off x="-4" y="1048285"/>
+            <a:ext cx="12192000" cy="1754326"/>
+          </a:xfrm>
+          <a:prstGeom prst="rect">
+            <a:avLst/>
+          </a:prstGeom>
+          <a:solidFill>
+            <a:schemeClr val="accent5">
+              <a:lumMod val="40000"/>
+              <a:lumOff val="60000"/>
+            </a:schemeClr>
+          </a:solidFill>
+        </p:spPr>
+        <p:txBody>
+          <a:bodyPr wrap="square" rtlCol="0">
+            <a:spAutoFit/>
+          </a:bodyPr>
+          <a:lstStyle/>
+          <a:p>
+            <a:r>
+              <a:rPr lang="en-GB" sz="1200" b="1" dirty="0" smtClean="0">
+                <a:latin typeface="Courier New" panose="02070309020205020404" pitchFamily="49" charset="0"/>
+                <a:cs typeface="Courier New" panose="02070309020205020404" pitchFamily="49" charset="0"/>
+              </a:rPr>
+              <a:t>GTCCTTTCGTACTAAAATATCATAATTTTTTAAAGATAGAAACCAACCTGGCTTACACCGGTTTGAACTCAGATCATGTAAGAATTTAAAAGTCGAACAGACTTAAAATTTGAACGGCTACACCCA</a:t>
+            </a:r>
+          </a:p>
+          <a:p>
+            <a:r>
+              <a:rPr lang="en-GB" sz="1200" b="1" dirty="0" smtClean="0">
+                <a:latin typeface="Courier New" panose="02070309020205020404" pitchFamily="49" charset="0"/>
+                <a:cs typeface="Courier New" panose="02070309020205020404" pitchFamily="49" charset="0"/>
+              </a:rPr>
+              <a:t>AAGAATTTAAAAGTCGAACAGACTTAAAATTTGAACGGCTACACCCAAAATTATATCTTAATCCAACATCGAGGTCGCAATCTTTTTTATCGATATGAACTCTCCAAAAAAATTACGCTGTTATCC</a:t>
+            </a:r>
+          </a:p>
+          <a:p>
+            <a:r>
+              <a:rPr lang="en-GB" sz="1200" b="1" dirty="0" smtClean="0">
+                <a:latin typeface="Courier New" panose="02070309020205020404" pitchFamily="49" charset="0"/>
+                <a:cs typeface="Courier New" panose="02070309020205020404" pitchFamily="49" charset="0"/>
+              </a:rPr>
+              <a:t>GTGCAACTGATCCGAACCATTCATCAGCCGCGCCAGCGAATTATAACGACATCCGCGGGAGTTTCGAATGCCAGTGTAGTGACCACTACTCCAGTGCAGGCGCCAACAGCTCTTTCCGTTTCCGCC</a:t>
+            </a:r>
+            <a:endParaRPr lang="en-GB" sz="1200" b="1" dirty="0">
+              <a:latin typeface="Courier New" panose="02070309020205020404" pitchFamily="49" charset="0"/>
+              <a:cs typeface="Courier New" panose="02070309020205020404" pitchFamily="49" charset="0"/>
+            </a:endParaRPr>
+          </a:p>
+          <a:p>
+            <a:r>
+              <a:rPr lang="en-GB" sz="1200" b="1" dirty="0" smtClean="0">
+                <a:latin typeface="Courier New" panose="02070309020205020404" pitchFamily="49" charset="0"/>
+                <a:cs typeface="Courier New" panose="02070309020205020404" pitchFamily="49" charset="0"/>
+              </a:rPr>
+              <a:t>GCAAATATAGAATATAGAAGCTAGGTGCTTTGAAGGCGAAGAATTATTATATTCGTTGACACGAGTAAACAAGAGAGTTTCAGCTAACACATTTCCCAATGGATATTCCCAAGGATAAGATCGGAA</a:t>
+            </a:r>
+            <a:endParaRPr lang="en-GB" sz="1200" b="1" dirty="0">
+              <a:latin typeface="Courier New" panose="02070309020205020404" pitchFamily="49" charset="0"/>
+              <a:cs typeface="Courier New" panose="02070309020205020404" pitchFamily="49" charset="0"/>
+            </a:endParaRPr>
+          </a:p>
+          <a:p>
+            <a:r>
+              <a:rPr lang="en-GB" sz="1200" b="1" dirty="0" smtClean="0">
+                <a:latin typeface="Courier New" panose="02070309020205020404" pitchFamily="49" charset="0"/>
+                <a:cs typeface="Courier New" panose="02070309020205020404" pitchFamily="49" charset="0"/>
+              </a:rPr>
+              <a:t>TTCCGATCTGCAAATATAGAATATAGAAGCTAGGTGCTTTGAAGGCGAAGAATTATTATATTCGTTGACACGAGTAAACAAGAGAGTTTCAGCTAACACATTTCCCAATGGATATTCCCAAGGATA</a:t>
+            </a:r>
+            <a:endParaRPr lang="en-GB" sz="1200" b="1" dirty="0">
+              <a:latin typeface="Courier New" panose="02070309020205020404" pitchFamily="49" charset="0"/>
+              <a:cs typeface="Courier New" panose="02070309020205020404" pitchFamily="49" charset="0"/>
+            </a:endParaRPr>
+          </a:p>
+          <a:p>
+            <a:r>
+              <a:rPr lang="en-GB" sz="1200" b="1" dirty="0" smtClean="0">
+                <a:latin typeface="Courier New" panose="02070309020205020404" pitchFamily="49" charset="0"/>
+                <a:cs typeface="Courier New" panose="02070309020205020404" pitchFamily="49" charset="0"/>
+              </a:rPr>
+              <a:t>GCATGTGTCTCTCAGCTGCCTTGGCCGATCCCGATCCCGATACAGATCCAGATCCCAATCCCGATACAGATCCCAAACCAAAATTGCCCACAAGTTGTCCGTATTTCTCGGGTGACAATTTCTGAA</a:t>
+            </a:r>
+            <a:endParaRPr lang="en-GB" sz="1200" b="1" dirty="0">
+              <a:latin typeface="Courier New" panose="02070309020205020404" pitchFamily="49" charset="0"/>
+              <a:cs typeface="Courier New" panose="02070309020205020404" pitchFamily="49" charset="0"/>
+            </a:endParaRPr>
+          </a:p>
+          <a:p>
+            <a:r>
+              <a:rPr lang="en-GB" sz="1200" b="1" dirty="0" smtClean="0">
+                <a:latin typeface="Courier New" panose="02070309020205020404" pitchFamily="49" charset="0"/>
+                <a:cs typeface="Courier New" panose="02070309020205020404" pitchFamily="49" charset="0"/>
+              </a:rPr>
+              <a:t>CAATTTCTGAAATTTCGGTTCGGTTCTTAGGAGATTTTCGTGTGACGGGGAGCGTTGTTTCTGGAGTGATGTTGCAGCTGCATCGACAACGCTGGCCGATGTTGCTGTCGCGCTCGTGGCAGCGAT</a:t>
+            </a:r>
+            <a:endParaRPr lang="en-GB" sz="1200" b="1" dirty="0">
+              <a:latin typeface="Courier New" panose="02070309020205020404" pitchFamily="49" charset="0"/>
+              <a:cs typeface="Courier New" panose="02070309020205020404" pitchFamily="49" charset="0"/>
+            </a:endParaRPr>
+          </a:p>
+          <a:p>
+            <a:r>
+              <a:rPr lang="en-GB" sz="1200" b="1" dirty="0" smtClean="0">
+                <a:latin typeface="Courier New" panose="02070309020205020404" pitchFamily="49" charset="0"/>
+                <a:cs typeface="Courier New" panose="02070309020205020404" pitchFamily="49" charset="0"/>
+              </a:rPr>
+              <a:t>CTCTTTCAATTAAGCGGGTTCCGTAAATTCAAGGTTTGGATCGGATTAGAATGTGCGCCAGTTTTCCAATCCCCGACATGATGCAAGTGGCTTAACCGTACAAGTATGCAAATCAGATCGGAAGAG</a:t>
+            </a:r>
+            <a:endParaRPr lang="en-GB" sz="1200" b="1" dirty="0">
+              <a:latin typeface="Courier New" panose="02070309020205020404" pitchFamily="49" charset="0"/>
+              <a:cs typeface="Courier New" panose="02070309020205020404" pitchFamily="49" charset="0"/>
+            </a:endParaRPr>
+          </a:p>
+          <a:p>
+            <a:r>
+              <a:rPr lang="en-GB" sz="1200" b="1" dirty="0" smtClean="0">
+                <a:latin typeface="Courier New" panose="02070309020205020404" pitchFamily="49" charset="0"/>
+                <a:cs typeface="Courier New" panose="02070309020205020404" pitchFamily="49" charset="0"/>
+              </a:rPr>
+              <a:t>CTCTTCCGATCTCTCTTTCAATTAAGCGGGTTCCGTAAATTCAAGGTTTGGATCGGATTAGAATGTGCGCCAGTTTTCCAATCCCCGACATGATGCAAGTGGCTTAACCGTACAAGTATGCAAATC</a:t>
+            </a:r>
+            <a:endParaRPr lang="en-GB" sz="1200" b="1" dirty="0">
+              <a:latin typeface="Courier New" panose="02070309020205020404" pitchFamily="49" charset="0"/>
+              <a:cs typeface="Courier New" panose="02070309020205020404" pitchFamily="49" charset="0"/>
+            </a:endParaRPr>
+          </a:p>
+        </p:txBody>
+      </p:sp>
+      <p:sp>
+        <p:nvSpPr>
+          <p:cNvPr id="9" name="TextBox 8"/>
+          <p:cNvSpPr txBox="1"/>
+          <p:nvPr/>
+        </p:nvSpPr>
+        <p:spPr>
+          <a:xfrm>
+            <a:off x="-4" y="1045873"/>
+            <a:ext cx="12192000" cy="1754326"/>
+          </a:xfrm>
+          <a:prstGeom prst="rect">
+            <a:avLst/>
+          </a:prstGeom>
+          <a:solidFill>
+            <a:schemeClr val="accent5">
+              <a:lumMod val="40000"/>
+              <a:lumOff val="60000"/>
+            </a:schemeClr>
+          </a:solidFill>
+        </p:spPr>
+        <p:txBody>
+          <a:bodyPr wrap="square" rtlCol="0">
+            <a:spAutoFit/>
+          </a:bodyPr>
+          <a:lstStyle/>
+          <a:p>
+            <a:r>
+              <a:rPr lang="en-GB" sz="1200" b="1" dirty="0" smtClean="0">
+                <a:latin typeface="Courier New" panose="02070309020205020404" pitchFamily="49" charset="0"/>
+                <a:cs typeface="Courier New" panose="02070309020205020404" pitchFamily="49" charset="0"/>
+              </a:rPr>
+              <a:t>CCBCCGGGGGGGGGGFDGGGGGGGGGGGGGGGGFGGGGGGGGGGGGGGGGGGGGGGGGGGGGGGG11CFEEGCGCGE&gt;GGGGGGG0FCGGGGGGG&gt;DGGGGGGGGGGGGGGGEGGGGDGGGE@C6@</a:t>
+            </a:r>
+            <a:endParaRPr lang="en-GB" sz="1200" b="1" dirty="0">
+              <a:latin typeface="Courier New" panose="02070309020205020404" pitchFamily="49" charset="0"/>
+              <a:cs typeface="Courier New" panose="02070309020205020404" pitchFamily="49" charset="0"/>
+            </a:endParaRPr>
+          </a:p>
+          <a:p>
+            <a:r>
+              <a:rPr lang="en-GB" sz="1200" b="1" dirty="0" smtClean="0">
+                <a:latin typeface="Courier New" panose="02070309020205020404" pitchFamily="49" charset="0"/>
+                <a:cs typeface="Courier New" panose="02070309020205020404" pitchFamily="49" charset="0"/>
+              </a:rPr>
+              <a:t>GGBGGGGGGGGGGGBGGGGGFGGGGGGGGGGGGGFGGGGGGGGGFGGGGGGGGGGGGGGGGGGGGGGGGGGGGGGGGGGGGGGGGGGGGGGGGGGGGGGGGGGGGGGGGGGGGGGGGGGGGCCCCC</a:t>
+            </a:r>
+          </a:p>
+          <a:p>
+            <a:r>
+              <a:rPr lang="en-GB" sz="1200" b="1" dirty="0" smtClean="0">
+                <a:latin typeface="Courier New" panose="02070309020205020404" pitchFamily="49" charset="0"/>
+                <a:cs typeface="Courier New" panose="02070309020205020404" pitchFamily="49" charset="0"/>
+              </a:rPr>
+              <a:t>BBB@BGEGGGGGGGGGGGGGCGGGGGEGGGFGGGGGGGG</a:t>
+            </a:r>
+            <a:r>
+              <a:rPr lang="en-GB" sz="1200" b="1" dirty="0">
+                <a:latin typeface="Courier New" panose="02070309020205020404" pitchFamily="49" charset="0"/>
+                <a:cs typeface="Courier New" panose="02070309020205020404" pitchFamily="49" charset="0"/>
+              </a:rPr>
+              <a:t>/&gt;FGEGGGDGG&lt;CGGGGGGGGGE&gt;DGGDGGGEGGGGEGGGFGGG@=GGGEGEG=GGGGGGGGDGGGDGGGG==6BCGGGCG=GEGG</a:t>
+            </a:r>
+            <a:r>
+              <a:rPr lang="en-GB" sz="1200" b="1" dirty="0" smtClean="0">
+                <a:latin typeface="Courier New" panose="02070309020205020404" pitchFamily="49" charset="0"/>
+                <a:cs typeface="Courier New" panose="02070309020205020404" pitchFamily="49" charset="0"/>
+              </a:rPr>
+              <a:t>#</a:t>
+            </a:r>
+            <a:endParaRPr lang="en-GB" sz="1200" b="1" dirty="0">
+              <a:latin typeface="Courier New" panose="02070309020205020404" pitchFamily="49" charset="0"/>
+              <a:cs typeface="Courier New" panose="02070309020205020404" pitchFamily="49" charset="0"/>
+            </a:endParaRPr>
+          </a:p>
+          <a:p>
+            <a:r>
+              <a:rPr lang="en-GB" sz="1200" b="1" dirty="0" smtClean="0">
+                <a:latin typeface="Courier New" panose="02070309020205020404" pitchFamily="49" charset="0"/>
+                <a:cs typeface="Courier New" panose="02070309020205020404" pitchFamily="49" charset="0"/>
+              </a:rPr>
+              <a:t>CCCCCGGGGGGGFGGGGGGGGGGFGGEGGGGGGGGGGGGGBGGGGGGGGGGGC</a:t>
+            </a:r>
+            <a:r>
+              <a:rPr lang="en-GB" sz="1200" b="1" dirty="0">
+                <a:latin typeface="Courier New" panose="02070309020205020404" pitchFamily="49" charset="0"/>
+                <a:cs typeface="Courier New" panose="02070309020205020404" pitchFamily="49" charset="0"/>
+              </a:rPr>
+              <a:t>@&gt;CB@DGEGGGGGGGG@DGGGGGG00;FFCGEGGEGEFGEFDEDGFBB@@</a:t>
+            </a:r>
+            <a:r>
+              <a:rPr lang="en-GB" sz="1200" b="1" dirty="0" smtClean="0">
+                <a:latin typeface="Courier New" panose="02070309020205020404" pitchFamily="49" charset="0"/>
+                <a:cs typeface="Courier New" panose="02070309020205020404" pitchFamily="49" charset="0"/>
+              </a:rPr>
+              <a:t>0CC0880CG&gt;0F&gt;FGGGE@D;FF</a:t>
+            </a:r>
+            <a:endParaRPr lang="en-GB" sz="1200" b="1" dirty="0">
+              <a:latin typeface="Courier New" panose="02070309020205020404" pitchFamily="49" charset="0"/>
+              <a:cs typeface="Courier New" panose="02070309020205020404" pitchFamily="49" charset="0"/>
+            </a:endParaRPr>
+          </a:p>
+          <a:p>
+            <a:r>
+              <a:rPr lang="en-GB" sz="1200" b="1" dirty="0" smtClean="0">
+                <a:latin typeface="Courier New" panose="02070309020205020404" pitchFamily="49" charset="0"/>
+                <a:cs typeface="Courier New" panose="02070309020205020404" pitchFamily="49" charset="0"/>
+              </a:rPr>
+              <a:t>####F?C&gt;FCGGGGGGGGEEGGGGGF?GGCGFGGGGGGGGGGGGGGGFGGGGGGGGGGGGGGGGGGGGGGGGGGGGGGGGGGGGGGGGGGGGGGGGGGGGGGGGGGGGGGGGGGGGGGEGGCCCCC</a:t>
+            </a:r>
+            <a:endParaRPr lang="en-GB" sz="1200" b="1" dirty="0">
+              <a:latin typeface="Courier New" panose="02070309020205020404" pitchFamily="49" charset="0"/>
+              <a:cs typeface="Courier New" panose="02070309020205020404" pitchFamily="49" charset="0"/>
+            </a:endParaRPr>
+          </a:p>
+          <a:p>
+            <a:r>
+              <a:rPr lang="en-GB" sz="1200" b="1" dirty="0" smtClean="0">
+                <a:latin typeface="Courier New" panose="02070309020205020404" pitchFamily="49" charset="0"/>
+                <a:cs typeface="Courier New" panose="02070309020205020404" pitchFamily="49" charset="0"/>
+              </a:rPr>
+              <a:t>BBBBCGGGGGGGGGGGGEGGGGGGGGGGGGGGGGGDGBGGGGGGCEGGGGGCGGEGGGGGGGGGGGGGEFGCGGGGGGGGFGGG&gt;0CCFGGD08=C0000</a:t>
+            </a:r>
+            <a:r>
+              <a:rPr lang="en-GB" sz="1200" b="1" dirty="0">
+                <a:latin typeface="Courier New" panose="02070309020205020404" pitchFamily="49" charset="0"/>
+                <a:cs typeface="Courier New" panose="02070309020205020404" pitchFamily="49" charset="0"/>
+              </a:rPr>
+              <a:t>.&lt;@CF@GGGGGGGDGGGG@@</a:t>
+            </a:r>
+            <a:r>
+              <a:rPr lang="en-GB" sz="1200" b="1" dirty="0" smtClean="0">
+                <a:latin typeface="Courier New" panose="02070309020205020404" pitchFamily="49" charset="0"/>
+                <a:cs typeface="Courier New" panose="02070309020205020404" pitchFamily="49" charset="0"/>
+              </a:rPr>
+              <a:t>CE=EBG</a:t>
+            </a:r>
+            <a:endParaRPr lang="en-GB" sz="1200" b="1" dirty="0">
+              <a:latin typeface="Courier New" panose="02070309020205020404" pitchFamily="49" charset="0"/>
+              <a:cs typeface="Courier New" panose="02070309020205020404" pitchFamily="49" charset="0"/>
+            </a:endParaRPr>
+          </a:p>
+          <a:p>
+            <a:r>
+              <a:rPr lang="en-GB" sz="1200" b="1" dirty="0" smtClean="0">
+                <a:latin typeface="Courier New" panose="02070309020205020404" pitchFamily="49" charset="0"/>
+                <a:cs typeface="Courier New" panose="02070309020205020404" pitchFamily="49" charset="0"/>
+              </a:rPr>
+              <a:t>#</a:t>
+            </a:r>
+            <a:r>
+              <a:rPr lang="en-GB" sz="1200" b="1" dirty="0">
+                <a:latin typeface="Courier New" panose="02070309020205020404" pitchFamily="49" charset="0"/>
+                <a:cs typeface="Courier New" panose="02070309020205020404" pitchFamily="49" charset="0"/>
+              </a:rPr>
+              <a:t>BBG@..@.G@?,@73,3,GGGGGC.BB=GBEE@D;GGDF=&lt;&gt;</a:t>
+            </a:r>
+            <a:r>
+              <a:rPr lang="en-GB" sz="1200" b="1" dirty="0" smtClean="0">
+                <a:latin typeface="Courier New" panose="02070309020205020404" pitchFamily="49" charset="0"/>
+                <a:cs typeface="Courier New" panose="02070309020205020404" pitchFamily="49" charset="0"/>
+              </a:rPr>
+              <a:t>GGGGGDBGGGGG&gt;GGGGFF&gt;GCGGGGGGGCCGGGGEGGGGGGGDBFGGGGGGGGGGGGGGGGAGGGGGGGGGGGBGGGCBCCB</a:t>
+            </a:r>
+            <a:endParaRPr lang="en-GB" sz="1200" b="1" dirty="0">
+              <a:latin typeface="Courier New" panose="02070309020205020404" pitchFamily="49" charset="0"/>
+              <a:cs typeface="Courier New" panose="02070309020205020404" pitchFamily="49" charset="0"/>
+            </a:endParaRPr>
+          </a:p>
+          <a:p>
+            <a:r>
+              <a:rPr lang="en-GB" sz="1200" b="1" dirty="0" smtClean="0">
+                <a:latin typeface="Courier New" panose="02070309020205020404" pitchFamily="49" charset="0"/>
+                <a:cs typeface="Courier New" panose="02070309020205020404" pitchFamily="49" charset="0"/>
+              </a:rPr>
+              <a:t>BCCC</a:t>
+            </a:r>
+            <a:r>
+              <a:rPr lang="en-GB" sz="1200" b="1" dirty="0">
+                <a:latin typeface="Courier New" panose="02070309020205020404" pitchFamily="49" charset="0"/>
+                <a:cs typeface="Courier New" panose="02070309020205020404" pitchFamily="49" charset="0"/>
+              </a:rPr>
+              <a:t>?@</a:t>
+            </a:r>
+            <a:r>
+              <a:rPr lang="en-GB" sz="1200" b="1" dirty="0" smtClean="0">
+                <a:latin typeface="Courier New" panose="02070309020205020404" pitchFamily="49" charset="0"/>
+                <a:cs typeface="Courier New" panose="02070309020205020404" pitchFamily="49" charset="0"/>
+              </a:rPr>
+              <a:t>FF&gt;FGGGGCGDG9EFEGGGGGGGGGGGGGGGGFGGGGGGGGGECFFGGGGGGG&lt;G1=GGDDGGGGGGGGG@GGGG&gt;GCGCFFGGGF08FECAGGGFGGEFFCGGGCGGGGGEGDGGBGGG</a:t>
+            </a:r>
+            <a:endParaRPr lang="en-GB" sz="1200" b="1" dirty="0">
+              <a:latin typeface="Courier New" panose="02070309020205020404" pitchFamily="49" charset="0"/>
+              <a:cs typeface="Courier New" panose="02070309020205020404" pitchFamily="49" charset="0"/>
+            </a:endParaRPr>
+          </a:p>
+          <a:p>
+            <a:r>
+              <a:rPr lang="en-GB" sz="1200" b="1" dirty="0" smtClean="0">
+                <a:latin typeface="Courier New" panose="02070309020205020404" pitchFamily="49" charset="0"/>
+                <a:cs typeface="Courier New" panose="02070309020205020404" pitchFamily="49" charset="0"/>
+              </a:rPr>
+              <a:t>#</a:t>
+            </a:r>
+            <a:r>
+              <a:rPr lang="en-GB" sz="1200" b="1" dirty="0">
+                <a:latin typeface="Courier New" panose="02070309020205020404" pitchFamily="49" charset="0"/>
+                <a:cs typeface="Courier New" panose="02070309020205020404" pitchFamily="49" charset="0"/>
+              </a:rPr>
+              <a:t>BGG?B&gt;7.3;BGGGEGGGA9=A4.,&gt;.GAGGBBGF@9&lt;90&gt;&lt;</a:t>
+            </a:r>
+            <a:r>
+              <a:rPr lang="en-GB" sz="1200" b="1" dirty="0" smtClean="0">
+                <a:latin typeface="Courier New" panose="02070309020205020404" pitchFamily="49" charset="0"/>
+                <a:cs typeface="Courier New" panose="02070309020205020404" pitchFamily="49" charset="0"/>
+              </a:rPr>
+              <a:t>0:GGGGF&gt;EGDGGGGEGFGEFGGGGGGGGGEGFCF@BBDGGGEGG&gt;GGCFDGD&gt;DGFGGGGGGGGGGEGGGGFCGGEGBBBBB</a:t>
+            </a:r>
+            <a:endParaRPr lang="en-GB" sz="1200" b="1" dirty="0">
+              <a:latin typeface="Courier New" panose="02070309020205020404" pitchFamily="49" charset="0"/>
+              <a:cs typeface="Courier New" panose="02070309020205020404" pitchFamily="49" charset="0"/>
+            </a:endParaRPr>
+          </a:p>
+        </p:txBody>
+      </p:sp>
+      <p:sp>
+        <p:nvSpPr>
+          <p:cNvPr id="10" name="TextBox 9"/>
+          <p:cNvSpPr txBox="1"/>
+          <p:nvPr/>
+        </p:nvSpPr>
+        <p:spPr>
+          <a:xfrm>
+            <a:off x="-4" y="1050698"/>
+            <a:ext cx="12192003" cy="1754326"/>
+          </a:xfrm>
+          <a:prstGeom prst="rect">
+            <a:avLst/>
+          </a:prstGeom>
+          <a:solidFill>
+            <a:schemeClr val="accent5">
+              <a:lumMod val="40000"/>
+              <a:lumOff val="60000"/>
+            </a:schemeClr>
+          </a:solidFill>
+        </p:spPr>
+        <p:txBody>
+          <a:bodyPr wrap="square" rtlCol="0">
+            <a:spAutoFit/>
+          </a:bodyPr>
+          <a:lstStyle/>
+          <a:p>
+            <a:r>
+              <a:rPr lang="en-GB" sz="1200" b="1" dirty="0" smtClean="0">
+                <a:latin typeface="Courier New" panose="02070309020205020404" pitchFamily="49" charset="0"/>
+                <a:cs typeface="Courier New" panose="02070309020205020404" pitchFamily="49" charset="0"/>
+              </a:rPr>
+              <a:t>NM:i:0     MD:Z:126                      AS:i:126       XS:i:126</a:t>
+            </a:r>
+            <a:endParaRPr lang="en-GB" sz="1200" b="1" dirty="0">
+              <a:latin typeface="Courier New" panose="02070309020205020404" pitchFamily="49" charset="0"/>
+              <a:cs typeface="Courier New" panose="02070309020205020404" pitchFamily="49" charset="0"/>
+            </a:endParaRPr>
+          </a:p>
+          <a:p>
+            <a:r>
+              <a:rPr lang="en-GB" sz="1200" b="1" dirty="0" smtClean="0">
+                <a:latin typeface="Courier New" panose="02070309020205020404" pitchFamily="49" charset="0"/>
+                <a:cs typeface="Courier New" panose="02070309020205020404" pitchFamily="49" charset="0"/>
+              </a:rPr>
+              <a:t>NM:i:0     MD:Z:126                      AS:i:126       XS:i:126</a:t>
+            </a:r>
+          </a:p>
+          <a:p>
+            <a:r>
+              <a:rPr lang="en-GB" sz="1200" b="1" dirty="0" smtClean="0">
+                <a:latin typeface="Courier New" panose="02070309020205020404" pitchFamily="49" charset="0"/>
+                <a:cs typeface="Courier New" panose="02070309020205020404" pitchFamily="49" charset="0"/>
+              </a:rPr>
+              <a:t>NM:i:1     MD:Z:59G49                    AS:i:104       XS:i:0</a:t>
+            </a:r>
+            <a:endParaRPr lang="en-GB" sz="1200" b="1" dirty="0">
+              <a:latin typeface="Courier New" panose="02070309020205020404" pitchFamily="49" charset="0"/>
+              <a:cs typeface="Courier New" panose="02070309020205020404" pitchFamily="49" charset="0"/>
+            </a:endParaRPr>
+          </a:p>
+          <a:p>
+            <a:r>
+              <a:rPr lang="en-GB" sz="1200" b="1" dirty="0" smtClean="0">
+                <a:latin typeface="Courier New" panose="02070309020205020404" pitchFamily="49" charset="0"/>
+                <a:cs typeface="Courier New" panose="02070309020205020404" pitchFamily="49" charset="0"/>
+              </a:rPr>
+              <a:t>NM:i:1     MD:Z:0A117                    AS:i:117       XS:i:0</a:t>
+            </a:r>
+            <a:endParaRPr lang="en-GB" sz="1200" b="1" dirty="0">
+              <a:latin typeface="Courier New" panose="02070309020205020404" pitchFamily="49" charset="0"/>
+              <a:cs typeface="Courier New" panose="02070309020205020404" pitchFamily="49" charset="0"/>
+            </a:endParaRPr>
+          </a:p>
+          <a:p>
+            <a:r>
+              <a:rPr lang="en-GB" sz="1200" b="1" dirty="0" smtClean="0">
+                <a:latin typeface="Courier New" panose="02070309020205020404" pitchFamily="49" charset="0"/>
+                <a:cs typeface="Courier New" panose="02070309020205020404" pitchFamily="49" charset="0"/>
+              </a:rPr>
+              <a:t>NM:i:0     MD:Z:116                      AS:i:116       XS:i:0</a:t>
+            </a:r>
+            <a:endParaRPr lang="en-GB" sz="1200" b="1" dirty="0">
+              <a:latin typeface="Courier New" panose="02070309020205020404" pitchFamily="49" charset="0"/>
+              <a:cs typeface="Courier New" panose="02070309020205020404" pitchFamily="49" charset="0"/>
+            </a:endParaRPr>
+          </a:p>
+          <a:p>
+            <a:r>
+              <a:rPr lang="en-GB" sz="1200" b="1" dirty="0" smtClean="0">
+                <a:latin typeface="Courier New" panose="02070309020205020404" pitchFamily="49" charset="0"/>
+                <a:cs typeface="Courier New" panose="02070309020205020404" pitchFamily="49" charset="0"/>
+              </a:rPr>
+              <a:t>NM:i:9</a:t>
+            </a:r>
+            <a:r>
+              <a:rPr lang="en-GB" sz="1200" b="1" dirty="0">
+                <a:latin typeface="Courier New" panose="02070309020205020404" pitchFamily="49" charset="0"/>
+                <a:cs typeface="Courier New" panose="02070309020205020404" pitchFamily="49" charset="0"/>
+              </a:rPr>
+              <a:t> </a:t>
+            </a:r>
+            <a:r>
+              <a:rPr lang="en-GB" sz="1200" b="1" dirty="0" smtClean="0">
+                <a:latin typeface="Courier New" panose="02070309020205020404" pitchFamily="49" charset="0"/>
+                <a:cs typeface="Courier New" panose="02070309020205020404" pitchFamily="49" charset="0"/>
+              </a:rPr>
+              <a:t>    MD:Z:24^CCGATC55G17A0T27      AS:i:99        XS:i:0</a:t>
+            </a:r>
+            <a:endParaRPr lang="en-GB" sz="1200" b="1" dirty="0">
+              <a:latin typeface="Courier New" panose="02070309020205020404" pitchFamily="49" charset="0"/>
+              <a:cs typeface="Courier New" panose="02070309020205020404" pitchFamily="49" charset="0"/>
+            </a:endParaRPr>
+          </a:p>
+          <a:p>
+            <a:r>
+              <a:rPr lang="en-GB" sz="1200" b="1" dirty="0" smtClean="0">
+                <a:latin typeface="Courier New" panose="02070309020205020404" pitchFamily="49" charset="0"/>
+                <a:cs typeface="Courier New" panose="02070309020205020404" pitchFamily="49" charset="0"/>
+              </a:rPr>
+              <a:t>NM:i:0</a:t>
+            </a:r>
+            <a:r>
+              <a:rPr lang="en-GB" sz="1200" b="1" dirty="0">
+                <a:latin typeface="Courier New" panose="02070309020205020404" pitchFamily="49" charset="0"/>
+                <a:cs typeface="Courier New" panose="02070309020205020404" pitchFamily="49" charset="0"/>
+              </a:rPr>
+              <a:t> </a:t>
+            </a:r>
+            <a:r>
+              <a:rPr lang="en-GB" sz="1200" b="1" dirty="0" smtClean="0">
+                <a:latin typeface="Courier New" panose="02070309020205020404" pitchFamily="49" charset="0"/>
+                <a:cs typeface="Courier New" panose="02070309020205020404" pitchFamily="49" charset="0"/>
+              </a:rPr>
+              <a:t>    MD:Z:126                      AS:i:126       XS:i:0</a:t>
+            </a:r>
+            <a:endParaRPr lang="en-GB" sz="1200" b="1" dirty="0">
+              <a:latin typeface="Courier New" panose="02070309020205020404" pitchFamily="49" charset="0"/>
+              <a:cs typeface="Courier New" panose="02070309020205020404" pitchFamily="49" charset="0"/>
+            </a:endParaRPr>
+          </a:p>
+          <a:p>
+            <a:r>
+              <a:rPr lang="en-GB" sz="1200" b="1" dirty="0" smtClean="0">
+                <a:latin typeface="Courier New" panose="02070309020205020404" pitchFamily="49" charset="0"/>
+                <a:cs typeface="Courier New" panose="02070309020205020404" pitchFamily="49" charset="0"/>
+              </a:rPr>
+              <a:t>NM:i:0</a:t>
+            </a:r>
+            <a:r>
+              <a:rPr lang="en-GB" sz="1200" b="1" dirty="0">
+                <a:latin typeface="Courier New" panose="02070309020205020404" pitchFamily="49" charset="0"/>
+                <a:cs typeface="Courier New" panose="02070309020205020404" pitchFamily="49" charset="0"/>
+              </a:rPr>
+              <a:t> </a:t>
+            </a:r>
+            <a:r>
+              <a:rPr lang="en-GB" sz="1200" b="1" dirty="0" smtClean="0">
+                <a:latin typeface="Courier New" panose="02070309020205020404" pitchFamily="49" charset="0"/>
+                <a:cs typeface="Courier New" panose="02070309020205020404" pitchFamily="49" charset="0"/>
+              </a:rPr>
+              <a:t>    MD:Z:115                      AS:i:115       XS:i:0</a:t>
+            </a:r>
+            <a:endParaRPr lang="en-GB" sz="1200" b="1" dirty="0">
+              <a:latin typeface="Courier New" panose="02070309020205020404" pitchFamily="49" charset="0"/>
+              <a:cs typeface="Courier New" panose="02070309020205020404" pitchFamily="49" charset="0"/>
+            </a:endParaRPr>
+          </a:p>
+          <a:p>
+            <a:r>
+              <a:rPr lang="en-GB" sz="1200" b="1" dirty="0" smtClean="0">
+                <a:latin typeface="Courier New" panose="02070309020205020404" pitchFamily="49" charset="0"/>
+                <a:cs typeface="Courier New" panose="02070309020205020404" pitchFamily="49" charset="0"/>
+              </a:rPr>
+              <a:t>NM:i:0</a:t>
+            </a:r>
+            <a:r>
+              <a:rPr lang="en-GB" sz="1200" b="1" dirty="0">
+                <a:latin typeface="Courier New" panose="02070309020205020404" pitchFamily="49" charset="0"/>
+                <a:cs typeface="Courier New" panose="02070309020205020404" pitchFamily="49" charset="0"/>
+              </a:rPr>
+              <a:t> </a:t>
+            </a:r>
+            <a:r>
+              <a:rPr lang="en-GB" sz="1200" b="1" dirty="0" smtClean="0">
+                <a:latin typeface="Courier New" panose="02070309020205020404" pitchFamily="49" charset="0"/>
+                <a:cs typeface="Courier New" panose="02070309020205020404" pitchFamily="49" charset="0"/>
+              </a:rPr>
+              <a:t>    MD:Z:114                      AS:i:114       XS:i:0</a:t>
+            </a:r>
+            <a:endParaRPr lang="en-GB" sz="1200" b="1" dirty="0">
+              <a:latin typeface="Courier New" panose="02070309020205020404" pitchFamily="49" charset="0"/>
+              <a:cs typeface="Courier New" panose="02070309020205020404" pitchFamily="49" charset="0"/>
+            </a:endParaRPr>
+          </a:p>
+        </p:txBody>
+      </p:sp>
     </p:spTree>
     <p:extLst>
       <p:ext uri="{BB962C8B-B14F-4D97-AF65-F5344CB8AC3E}">
-        <p14:creationId xmlns:p14="http://schemas.microsoft.com/office/powerpoint/2010/main" val="1786371380"/>
+        <p14:creationId xmlns:p14="http://schemas.microsoft.com/office/powerpoint/2010/main" val="3709082585"/>
       </p:ext>
     </p:extLst>
   </p:cSld>
   <p:clrMapOvr>
     <a:masterClrMapping/>
   </p:clrMapOvr>
+  <p:timing>
+    <p:tnLst>
+      <p:par>
+        <p:cTn id="1" dur="indefinite" restart="never" nodeType="tmRoot">
+          <p:childTnLst>
+            <p:seq concurrent="1" nextAc="seek">
+              <p:cTn id="2" dur="indefinite" nodeType="mainSeq">
+                <p:childTnLst>
+                  <p:par>
+                    <p:cTn id="3" fill="hold">
+                      <p:stCondLst>
+                        <p:cond delay="indefinite"/>
+                      </p:stCondLst>
+                      <p:childTnLst>
+                        <p:par>
+                          <p:cTn id="4" fill="hold">
+                            <p:stCondLst>
+                              <p:cond delay="0"/>
+                            </p:stCondLst>
+                            <p:childTnLst>
+                              <p:par>
+                                <p:cTn id="5" presetID="2" presetClass="exit" presetSubtype="8" fill="hold" grpId="0" nodeType="clickEffect">
+                                  <p:stCondLst>
+                                    <p:cond delay="900"/>
+                                  </p:stCondLst>
+                                  <p:childTnLst>
+                                    <p:anim calcmode="lin" valueType="num">
+                                      <p:cBhvr additive="base">
+                                        <p:cTn id="6" dur="3000"/>
+                                        <p:tgtEl>
+                                          <p:spTgt spid="7"/>
+                                        </p:tgtEl>
+                                        <p:attrNameLst>
+                                          <p:attrName>ppt_x</p:attrName>
+                                        </p:attrNameLst>
+                                      </p:cBhvr>
+                                      <p:tavLst>
+                                        <p:tav tm="0">
+                                          <p:val>
+                                            <p:strVal val="ppt_x"/>
+                                          </p:val>
+                                        </p:tav>
+                                        <p:tav tm="100000">
+                                          <p:val>
+                                            <p:strVal val="0-ppt_w/2"/>
+                                          </p:val>
+                                        </p:tav>
+                                      </p:tavLst>
+                                    </p:anim>
+                                    <p:anim calcmode="lin" valueType="num">
+                                      <p:cBhvr additive="base">
+                                        <p:cTn id="7" dur="3000"/>
+                                        <p:tgtEl>
+                                          <p:spTgt spid="7"/>
+                                        </p:tgtEl>
+                                        <p:attrNameLst>
+                                          <p:attrName>ppt_y</p:attrName>
+                                        </p:attrNameLst>
+                                      </p:cBhvr>
+                                      <p:tavLst>
+                                        <p:tav tm="0">
+                                          <p:val>
+                                            <p:strVal val="ppt_y"/>
+                                          </p:val>
+                                        </p:tav>
+                                        <p:tav tm="100000">
+                                          <p:val>
+                                            <p:strVal val="ppt_y"/>
+                                          </p:val>
+                                        </p:tav>
+                                      </p:tavLst>
+                                    </p:anim>
+                                    <p:set>
+                                      <p:cBhvr>
+                                        <p:cTn id="8" dur="1" fill="hold">
+                                          <p:stCondLst>
+                                            <p:cond delay="2999"/>
+                                          </p:stCondLst>
+                                        </p:cTn>
+                                        <p:tgtEl>
+                                          <p:spTgt spid="7"/>
+                                        </p:tgtEl>
+                                        <p:attrNameLst>
+                                          <p:attrName>style.visibility</p:attrName>
+                                        </p:attrNameLst>
+                                      </p:cBhvr>
+                                      <p:to>
+                                        <p:strVal val="hidden"/>
+                                      </p:to>
+                                    </p:set>
+                                  </p:childTnLst>
+                                </p:cTn>
+                              </p:par>
+                              <p:par>
+                                <p:cTn id="9" presetID="2" presetClass="entr" presetSubtype="2" fill="hold" grpId="0" nodeType="withEffect">
+                                  <p:stCondLst>
+                                    <p:cond delay="0"/>
+                                  </p:stCondLst>
+                                  <p:childTnLst>
+                                    <p:set>
+                                      <p:cBhvr>
+                                        <p:cTn id="10" dur="1" fill="hold">
+                                          <p:stCondLst>
+                                            <p:cond delay="0"/>
+                                          </p:stCondLst>
+                                        </p:cTn>
+                                        <p:tgtEl>
+                                          <p:spTgt spid="8"/>
+                                        </p:tgtEl>
+                                        <p:attrNameLst>
+                                          <p:attrName>style.visibility</p:attrName>
+                                        </p:attrNameLst>
+                                      </p:cBhvr>
+                                      <p:to>
+                                        <p:strVal val="visible"/>
+                                      </p:to>
+                                    </p:set>
+                                    <p:anim calcmode="lin" valueType="num">
+                                      <p:cBhvr additive="base">
+                                        <p:cTn id="11" dur="3000" fill="hold"/>
+                                        <p:tgtEl>
+                                          <p:spTgt spid="8"/>
+                                        </p:tgtEl>
+                                        <p:attrNameLst>
+                                          <p:attrName>ppt_x</p:attrName>
+                                        </p:attrNameLst>
+                                      </p:cBhvr>
+                                      <p:tavLst>
+                                        <p:tav tm="0">
+                                          <p:val>
+                                            <p:strVal val="1+#ppt_w/2"/>
+                                          </p:val>
+                                        </p:tav>
+                                        <p:tav tm="100000">
+                                          <p:val>
+                                            <p:strVal val="#ppt_x"/>
+                                          </p:val>
+                                        </p:tav>
+                                      </p:tavLst>
+                                    </p:anim>
+                                    <p:anim calcmode="lin" valueType="num">
+                                      <p:cBhvr additive="base">
+                                        <p:cTn id="12" dur="3000" fill="hold"/>
+                                        <p:tgtEl>
+                                          <p:spTgt spid="8"/>
+                                        </p:tgtEl>
+                                        <p:attrNameLst>
+                                          <p:attrName>ppt_y</p:attrName>
+                                        </p:attrNameLst>
+                                      </p:cBhvr>
+                                      <p:tavLst>
+                                        <p:tav tm="0">
+                                          <p:val>
+                                            <p:strVal val="#ppt_y"/>
+                                          </p:val>
+                                        </p:tav>
+                                        <p:tav tm="100000">
+                                          <p:val>
+                                            <p:strVal val="#ppt_y"/>
+                                          </p:val>
+                                        </p:tav>
+                                      </p:tavLst>
+                                    </p:anim>
+                                  </p:childTnLst>
+                                </p:cTn>
+                              </p:par>
+                            </p:childTnLst>
+                          </p:cTn>
+                        </p:par>
+                      </p:childTnLst>
+                    </p:cTn>
+                  </p:par>
+                  <p:par>
+                    <p:cTn id="13" fill="hold">
+                      <p:stCondLst>
+                        <p:cond delay="indefinite"/>
+                      </p:stCondLst>
+                      <p:childTnLst>
+                        <p:par>
+                          <p:cTn id="14" fill="hold">
+                            <p:stCondLst>
+                              <p:cond delay="0"/>
+                            </p:stCondLst>
+                            <p:childTnLst>
+                              <p:par>
+                                <p:cTn id="15" presetID="2" presetClass="exit" presetSubtype="8" fill="hold" grpId="1" nodeType="clickEffect">
+                                  <p:stCondLst>
+                                    <p:cond delay="100"/>
+                                  </p:stCondLst>
+                                  <p:childTnLst>
+                                    <p:anim calcmode="lin" valueType="num">
+                                      <p:cBhvr additive="base">
+                                        <p:cTn id="16" dur="3000"/>
+                                        <p:tgtEl>
+                                          <p:spTgt spid="8"/>
+                                        </p:tgtEl>
+                                        <p:attrNameLst>
+                                          <p:attrName>ppt_x</p:attrName>
+                                        </p:attrNameLst>
+                                      </p:cBhvr>
+                                      <p:tavLst>
+                                        <p:tav tm="0">
+                                          <p:val>
+                                            <p:strVal val="ppt_x"/>
+                                          </p:val>
+                                        </p:tav>
+                                        <p:tav tm="100000">
+                                          <p:val>
+                                            <p:strVal val="0-ppt_w/2"/>
+                                          </p:val>
+                                        </p:tav>
+                                      </p:tavLst>
+                                    </p:anim>
+                                    <p:anim calcmode="lin" valueType="num">
+                                      <p:cBhvr additive="base">
+                                        <p:cTn id="17" dur="3000"/>
+                                        <p:tgtEl>
+                                          <p:spTgt spid="8"/>
+                                        </p:tgtEl>
+                                        <p:attrNameLst>
+                                          <p:attrName>ppt_y</p:attrName>
+                                        </p:attrNameLst>
+                                      </p:cBhvr>
+                                      <p:tavLst>
+                                        <p:tav tm="0">
+                                          <p:val>
+                                            <p:strVal val="ppt_y"/>
+                                          </p:val>
+                                        </p:tav>
+                                        <p:tav tm="100000">
+                                          <p:val>
+                                            <p:strVal val="ppt_y"/>
+                                          </p:val>
+                                        </p:tav>
+                                      </p:tavLst>
+                                    </p:anim>
+                                    <p:set>
+                                      <p:cBhvr>
+                                        <p:cTn id="18" dur="1" fill="hold">
+                                          <p:stCondLst>
+                                            <p:cond delay="2999"/>
+                                          </p:stCondLst>
+                                        </p:cTn>
+                                        <p:tgtEl>
+                                          <p:spTgt spid="8"/>
+                                        </p:tgtEl>
+                                        <p:attrNameLst>
+                                          <p:attrName>style.visibility</p:attrName>
+                                        </p:attrNameLst>
+                                      </p:cBhvr>
+                                      <p:to>
+                                        <p:strVal val="hidden"/>
+                                      </p:to>
+                                    </p:set>
+                                  </p:childTnLst>
+                                </p:cTn>
+                              </p:par>
+                              <p:par>
+                                <p:cTn id="19" presetID="2" presetClass="entr" presetSubtype="2" fill="hold" grpId="0" nodeType="withEffect">
+                                  <p:stCondLst>
+                                    <p:cond delay="0"/>
+                                  </p:stCondLst>
+                                  <p:childTnLst>
+                                    <p:set>
+                                      <p:cBhvr>
+                                        <p:cTn id="20" dur="1" fill="hold">
+                                          <p:stCondLst>
+                                            <p:cond delay="0"/>
+                                          </p:stCondLst>
+                                        </p:cTn>
+                                        <p:tgtEl>
+                                          <p:spTgt spid="9"/>
+                                        </p:tgtEl>
+                                        <p:attrNameLst>
+                                          <p:attrName>style.visibility</p:attrName>
+                                        </p:attrNameLst>
+                                      </p:cBhvr>
+                                      <p:to>
+                                        <p:strVal val="visible"/>
+                                      </p:to>
+                                    </p:set>
+                                    <p:anim calcmode="lin" valueType="num">
+                                      <p:cBhvr additive="base">
+                                        <p:cTn id="21" dur="3000" fill="hold"/>
+                                        <p:tgtEl>
+                                          <p:spTgt spid="9"/>
+                                        </p:tgtEl>
+                                        <p:attrNameLst>
+                                          <p:attrName>ppt_x</p:attrName>
+                                        </p:attrNameLst>
+                                      </p:cBhvr>
+                                      <p:tavLst>
+                                        <p:tav tm="0">
+                                          <p:val>
+                                            <p:strVal val="1+#ppt_w/2"/>
+                                          </p:val>
+                                        </p:tav>
+                                        <p:tav tm="100000">
+                                          <p:val>
+                                            <p:strVal val="#ppt_x"/>
+                                          </p:val>
+                                        </p:tav>
+                                      </p:tavLst>
+                                    </p:anim>
+                                    <p:anim calcmode="lin" valueType="num">
+                                      <p:cBhvr additive="base">
+                                        <p:cTn id="22" dur="3000" fill="hold"/>
+                                        <p:tgtEl>
+                                          <p:spTgt spid="9"/>
+                                        </p:tgtEl>
+                                        <p:attrNameLst>
+                                          <p:attrName>ppt_y</p:attrName>
+                                        </p:attrNameLst>
+                                      </p:cBhvr>
+                                      <p:tavLst>
+                                        <p:tav tm="0">
+                                          <p:val>
+                                            <p:strVal val="#ppt_y"/>
+                                          </p:val>
+                                        </p:tav>
+                                        <p:tav tm="100000">
+                                          <p:val>
+                                            <p:strVal val="#ppt_y"/>
+                                          </p:val>
+                                        </p:tav>
+                                      </p:tavLst>
+                                    </p:anim>
+                                  </p:childTnLst>
+                                </p:cTn>
+                              </p:par>
+                            </p:childTnLst>
+                          </p:cTn>
+                        </p:par>
+                      </p:childTnLst>
+                    </p:cTn>
+                  </p:par>
+                  <p:par>
+                    <p:cTn id="23" fill="hold">
+                      <p:stCondLst>
+                        <p:cond delay="indefinite"/>
+                      </p:stCondLst>
+                      <p:childTnLst>
+                        <p:par>
+                          <p:cTn id="24" fill="hold">
+                            <p:stCondLst>
+                              <p:cond delay="0"/>
+                            </p:stCondLst>
+                            <p:childTnLst>
+                              <p:par>
+                                <p:cTn id="25" presetID="2" presetClass="exit" presetSubtype="8" fill="hold" grpId="1" nodeType="clickEffect">
+                                  <p:stCondLst>
+                                    <p:cond delay="100"/>
+                                  </p:stCondLst>
+                                  <p:childTnLst>
+                                    <p:anim calcmode="lin" valueType="num">
+                                      <p:cBhvr additive="base">
+                                        <p:cTn id="26" dur="3000"/>
+                                        <p:tgtEl>
+                                          <p:spTgt spid="9"/>
+                                        </p:tgtEl>
+                                        <p:attrNameLst>
+                                          <p:attrName>ppt_x</p:attrName>
+                                        </p:attrNameLst>
+                                      </p:cBhvr>
+                                      <p:tavLst>
+                                        <p:tav tm="0">
+                                          <p:val>
+                                            <p:strVal val="ppt_x"/>
+                                          </p:val>
+                                        </p:tav>
+                                        <p:tav tm="100000">
+                                          <p:val>
+                                            <p:strVal val="0-ppt_w/2"/>
+                                          </p:val>
+                                        </p:tav>
+                                      </p:tavLst>
+                                    </p:anim>
+                                    <p:anim calcmode="lin" valueType="num">
+                                      <p:cBhvr additive="base">
+                                        <p:cTn id="27" dur="3000"/>
+                                        <p:tgtEl>
+                                          <p:spTgt spid="9"/>
+                                        </p:tgtEl>
+                                        <p:attrNameLst>
+                                          <p:attrName>ppt_y</p:attrName>
+                                        </p:attrNameLst>
+                                      </p:cBhvr>
+                                      <p:tavLst>
+                                        <p:tav tm="0">
+                                          <p:val>
+                                            <p:strVal val="ppt_y"/>
+                                          </p:val>
+                                        </p:tav>
+                                        <p:tav tm="100000">
+                                          <p:val>
+                                            <p:strVal val="ppt_y"/>
+                                          </p:val>
+                                        </p:tav>
+                                      </p:tavLst>
+                                    </p:anim>
+                                    <p:set>
+                                      <p:cBhvr>
+                                        <p:cTn id="28" dur="1" fill="hold">
+                                          <p:stCondLst>
+                                            <p:cond delay="2999"/>
+                                          </p:stCondLst>
+                                        </p:cTn>
+                                        <p:tgtEl>
+                                          <p:spTgt spid="9"/>
+                                        </p:tgtEl>
+                                        <p:attrNameLst>
+                                          <p:attrName>style.visibility</p:attrName>
+                                        </p:attrNameLst>
+                                      </p:cBhvr>
+                                      <p:to>
+                                        <p:strVal val="hidden"/>
+                                      </p:to>
+                                    </p:set>
+                                  </p:childTnLst>
+                                </p:cTn>
+                              </p:par>
+                              <p:par>
+                                <p:cTn id="29" presetID="2" presetClass="entr" presetSubtype="2" fill="hold" grpId="0" nodeType="withEffect">
+                                  <p:stCondLst>
+                                    <p:cond delay="0"/>
+                                  </p:stCondLst>
+                                  <p:childTnLst>
+                                    <p:set>
+                                      <p:cBhvr>
+                                        <p:cTn id="30" dur="1" fill="hold">
+                                          <p:stCondLst>
+                                            <p:cond delay="0"/>
+                                          </p:stCondLst>
+                                        </p:cTn>
+                                        <p:tgtEl>
+                                          <p:spTgt spid="10"/>
+                                        </p:tgtEl>
+                                        <p:attrNameLst>
+                                          <p:attrName>style.visibility</p:attrName>
+                                        </p:attrNameLst>
+                                      </p:cBhvr>
+                                      <p:to>
+                                        <p:strVal val="visible"/>
+                                      </p:to>
+                                    </p:set>
+                                    <p:anim calcmode="lin" valueType="num">
+                                      <p:cBhvr additive="base">
+                                        <p:cTn id="31" dur="3000" fill="hold"/>
+                                        <p:tgtEl>
+                                          <p:spTgt spid="10"/>
+                                        </p:tgtEl>
+                                        <p:attrNameLst>
+                                          <p:attrName>ppt_x</p:attrName>
+                                        </p:attrNameLst>
+                                      </p:cBhvr>
+                                      <p:tavLst>
+                                        <p:tav tm="0">
+                                          <p:val>
+                                            <p:strVal val="1+#ppt_w/2"/>
+                                          </p:val>
+                                        </p:tav>
+                                        <p:tav tm="100000">
+                                          <p:val>
+                                            <p:strVal val="#ppt_x"/>
+                                          </p:val>
+                                        </p:tav>
+                                      </p:tavLst>
+                                    </p:anim>
+                                    <p:anim calcmode="lin" valueType="num">
+                                      <p:cBhvr additive="base">
+                                        <p:cTn id="32" dur="3000" fill="hold"/>
+                                        <p:tgtEl>
+                                          <p:spTgt spid="10"/>
+                                        </p:tgtEl>
+                                        <p:attrNameLst>
+                                          <p:attrName>ppt_y</p:attrName>
+                                        </p:attrNameLst>
+                                      </p:cBhvr>
+                                      <p:tavLst>
+                                        <p:tav tm="0">
+                                          <p:val>
+                                            <p:strVal val="#ppt_y"/>
+                                          </p:val>
+                                        </p:tav>
+                                        <p:tav tm="100000">
+                                          <p:val>
+                                            <p:strVal val="#ppt_y"/>
+                                          </p:val>
+                                        </p:tav>
+                                      </p:tavLst>
+                                    </p:anim>
+                                  </p:childTnLst>
+                                </p:cTn>
+                              </p:par>
+                            </p:childTnLst>
+                          </p:cTn>
+                        </p:par>
+                      </p:childTnLst>
+                    </p:cTn>
+                  </p:par>
+                </p:childTnLst>
+              </p:cTn>
+              <p:prevCondLst>
+                <p:cond evt="onPrev" delay="0">
+                  <p:tgtEl>
+                    <p:sldTgt/>
+                  </p:tgtEl>
+                </p:cond>
+              </p:prevCondLst>
+              <p:nextCondLst>
+                <p:cond evt="onNext" delay="0">
+                  <p:tgtEl>
+                    <p:sldTgt/>
+                  </p:tgtEl>
+                </p:cond>
+              </p:nextCondLst>
+            </p:seq>
+          </p:childTnLst>
+        </p:cTn>
+      </p:par>
+    </p:tnLst>
+    <p:bldLst>
+      <p:bldP spid="7" grpId="0" animBg="1"/>
+      <p:bldP spid="8" grpId="0" animBg="1"/>
+      <p:bldP spid="8" grpId="1" animBg="1"/>
+      <p:bldP spid="9" grpId="0" animBg="1"/>
+      <p:bldP spid="9" grpId="1" animBg="1"/>
+      <p:bldP spid="10" grpId="0" animBg="1"/>
+    </p:bldLst>
+  </p:timing>
 </p:sld>
 </file>
 
@@ -13044,19 +14339,11 @@
             </a:r>
             <a:r>
               <a:rPr lang="en-GB" sz="2400" b="1" dirty="0" smtClean="0"/>
-              <a:t>Sequencing Reads </a:t>
-            </a:r>
-            <a:r>
-              <a:rPr lang="en-GB" sz="2400" b="1" dirty="0" smtClean="0"/>
-              <a:t>and their alignment</a:t>
+              <a:t>Sequencing Reads and their alignment</a:t>
             </a:r>
             <a:r>
               <a:rPr lang="en-GB" sz="2400" dirty="0" smtClean="0"/>
-              <a:t> </a:t>
-            </a:r>
-            <a:r>
-              <a:rPr lang="en-GB" sz="2400" dirty="0" smtClean="0"/>
-              <a:t>to </a:t>
+              <a:t> to </a:t>
             </a:r>
             <a:r>
               <a:rPr lang="en-GB" sz="2400" b="1" dirty="0" smtClean="0"/>
@@ -13139,7 +14426,7 @@
           <p:cNvPr id="8" name="TextBox 7">
             <a:extLst>
               <a:ext uri="{FF2B5EF4-FFF2-40B4-BE49-F238E27FC236}">
-                <a16:creationId xmlns="" xmlns:a16="http://schemas.microsoft.com/office/drawing/2014/main" id="{6F77B270-35F1-4A5B-875A-9BFD13BC898E}"/>
+                <a16:creationId xmlns:a16="http://schemas.microsoft.com/office/drawing/2014/main" xmlns="" id="{6F77B270-35F1-4A5B-875A-9BFD13BC898E}"/>
               </a:ext>
             </a:extLst>
           </p:cNvPr>
@@ -14383,7 +15670,7 @@
           <p:cNvPr id="8" name="TextBox 7">
             <a:extLst>
               <a:ext uri="{FF2B5EF4-FFF2-40B4-BE49-F238E27FC236}">
-                <a16:creationId xmlns="" xmlns:a16="http://schemas.microsoft.com/office/drawing/2014/main" id="{6F77B270-35F1-4A5B-875A-9BFD13BC898E}"/>
+                <a16:creationId xmlns:a16="http://schemas.microsoft.com/office/drawing/2014/main" xmlns="" id="{6F77B270-35F1-4A5B-875A-9BFD13BC898E}"/>
               </a:ext>
             </a:extLst>
           </p:cNvPr>
@@ -16288,7 +17575,7 @@
           <p:cNvPr id="7" name="TextBox 6">
             <a:extLst>
               <a:ext uri="{FF2B5EF4-FFF2-40B4-BE49-F238E27FC236}">
-                <a16:creationId xmlns="" xmlns:a16="http://schemas.microsoft.com/office/drawing/2014/main" id="{6F77B270-35F1-4A5B-875A-9BFD13BC898E}"/>
+                <a16:creationId xmlns:a16="http://schemas.microsoft.com/office/drawing/2014/main" xmlns="" id="{6F77B270-35F1-4A5B-875A-9BFD13BC898E}"/>
               </a:ext>
             </a:extLst>
           </p:cNvPr>
@@ -16973,12 +18260,72 @@
           <a:chExt cx="0" cy="0"/>
         </a:xfrm>
       </p:grpSpPr>
+      <p:pic>
+        <p:nvPicPr>
+          <p:cNvPr id="2" name="Picture 1"/>
+          <p:cNvPicPr>
+            <a:picLocks noChangeAspect="1"/>
+          </p:cNvPicPr>
+          <p:nvPr/>
+        </p:nvPicPr>
+        <p:blipFill>
+          <a:blip r:embed="rId2">
+            <a:extLst>
+              <a:ext uri="{28A0092B-C50C-407E-A947-70E740481C1C}">
+                <a14:useLocalDpi xmlns:a14="http://schemas.microsoft.com/office/drawing/2010/main" val="0"/>
+              </a:ext>
+            </a:extLst>
+          </a:blip>
+          <a:stretch>
+            <a:fillRect/>
+          </a:stretch>
+        </p:blipFill>
+        <p:spPr>
+          <a:xfrm>
+            <a:off x="1666875" y="776287"/>
+            <a:ext cx="8858250" cy="5305425"/>
+          </a:xfrm>
+          <a:prstGeom prst="rect">
+            <a:avLst/>
+          </a:prstGeom>
+        </p:spPr>
+      </p:pic>
+    </p:spTree>
+    <p:extLst>
+      <p:ext uri="{BB962C8B-B14F-4D97-AF65-F5344CB8AC3E}">
+        <p14:creationId xmlns:p14="http://schemas.microsoft.com/office/powerpoint/2010/main" val="1786371380"/>
+      </p:ext>
+    </p:extLst>
+  </p:cSld>
+  <p:clrMapOvr>
+    <a:masterClrMapping/>
+  </p:clrMapOvr>
+</p:sld>
+</file>
+
+<file path=ppt/slides/slide6.xml><?xml version="1.0" encoding="utf-8"?>
+<p:sld xmlns:a="http://schemas.openxmlformats.org/drawingml/2006/main" xmlns:r="http://schemas.openxmlformats.org/officeDocument/2006/relationships" xmlns:p="http://schemas.openxmlformats.org/presentationml/2006/main">
+  <p:cSld>
+    <p:spTree>
+      <p:nvGrpSpPr>
+        <p:cNvPr id="1" name=""/>
+        <p:cNvGrpSpPr/>
+        <p:nvPr/>
+      </p:nvGrpSpPr>
+      <p:grpSpPr>
+        <a:xfrm>
+          <a:off x="0" y="0"/>
+          <a:ext cx="0" cy="0"/>
+          <a:chOff x="0" y="0"/>
+          <a:chExt cx="0" cy="0"/>
+        </a:xfrm>
+      </p:grpSpPr>
       <p:sp>
         <p:nvSpPr>
           <p:cNvPr id="25" name="TextBox 24">
             <a:extLst>
               <a:ext uri="{FF2B5EF4-FFF2-40B4-BE49-F238E27FC236}">
-                <a16:creationId xmlns="" xmlns:a16="http://schemas.microsoft.com/office/drawing/2014/main" id="{6F77B270-35F1-4A5B-875A-9BFD13BC898E}"/>
+                <a16:creationId xmlns:a16="http://schemas.microsoft.com/office/drawing/2014/main" xmlns="" id="{6F77B270-35F1-4A5B-875A-9BFD13BC898E}"/>
               </a:ext>
             </a:extLst>
           </p:cNvPr>
@@ -18589,7 +19936,7 @@
 </p:sld>
 </file>
 
-<file path=ppt/slides/slide6.xml><?xml version="1.0" encoding="utf-8"?>
+<file path=ppt/slides/slide7.xml><?xml version="1.0" encoding="utf-8"?>
 <p:sld xmlns:a="http://schemas.openxmlformats.org/drawingml/2006/main" xmlns:r="http://schemas.openxmlformats.org/officeDocument/2006/relationships" xmlns:p="http://schemas.openxmlformats.org/presentationml/2006/main">
   <p:cSld>
     <p:spTree>
@@ -18611,7 +19958,7 @@
           <p:cNvPr id="63" name="TextBox 62">
             <a:extLst>
               <a:ext uri="{FF2B5EF4-FFF2-40B4-BE49-F238E27FC236}">
-                <a16:creationId xmlns="" xmlns:a16="http://schemas.microsoft.com/office/drawing/2014/main" id="{6F77B270-35F1-4A5B-875A-9BFD13BC898E}"/>
+                <a16:creationId xmlns:a16="http://schemas.microsoft.com/office/drawing/2014/main" xmlns="" id="{6F77B270-35F1-4A5B-875A-9BFD13BC898E}"/>
               </a:ext>
             </a:extLst>
           </p:cNvPr>
@@ -18944,7 +20291,7 @@
 </p:sld>
 </file>
 
-<file path=ppt/slides/slide7.xml><?xml version="1.0" encoding="utf-8"?>
+<file path=ppt/slides/slide8.xml><?xml version="1.0" encoding="utf-8"?>
 <p:sld xmlns:a="http://schemas.openxmlformats.org/drawingml/2006/main" xmlns:r="http://schemas.openxmlformats.org/officeDocument/2006/relationships" xmlns:p="http://schemas.openxmlformats.org/presentationml/2006/main">
   <p:cSld>
     <p:spTree>
@@ -18966,7 +20313,7 @@
           <p:cNvPr id="2" name="TextBox 1">
             <a:extLst>
               <a:ext uri="{FF2B5EF4-FFF2-40B4-BE49-F238E27FC236}">
-                <a16:creationId xmlns="" xmlns:a16="http://schemas.microsoft.com/office/drawing/2014/main" id="{6F77B270-35F1-4A5B-875A-9BFD13BC898E}"/>
+                <a16:creationId xmlns:a16="http://schemas.microsoft.com/office/drawing/2014/main" xmlns="" id="{6F77B270-35F1-4A5B-875A-9BFD13BC898E}"/>
               </a:ext>
             </a:extLst>
           </p:cNvPr>
@@ -20269,7 +21616,7 @@
 </p:sld>
 </file>
 
-<file path=ppt/slides/slide8.xml><?xml version="1.0" encoding="utf-8"?>
+<file path=ppt/slides/slide9.xml><?xml version="1.0" encoding="utf-8"?>
 <p:sld xmlns:a="http://schemas.openxmlformats.org/drawingml/2006/main" xmlns:r="http://schemas.openxmlformats.org/officeDocument/2006/relationships" xmlns:p="http://schemas.openxmlformats.org/presentationml/2006/main">
   <p:cSld>
     <p:spTree>
@@ -20291,7 +21638,7 @@
           <p:cNvPr id="2" name="TextBox 1">
             <a:extLst>
               <a:ext uri="{FF2B5EF4-FFF2-40B4-BE49-F238E27FC236}">
-                <a16:creationId xmlns="" xmlns:a16="http://schemas.microsoft.com/office/drawing/2014/main" id="{6F77B270-35F1-4A5B-875A-9BFD13BC898E}"/>
+                <a16:creationId xmlns:a16="http://schemas.microsoft.com/office/drawing/2014/main" xmlns="" id="{6F77B270-35F1-4A5B-875A-9BFD13BC898E}"/>
               </a:ext>
             </a:extLst>
           </p:cNvPr>
@@ -21055,1331 +22402,6 @@
     <p:extLst>
       <p:ext uri="{BB962C8B-B14F-4D97-AF65-F5344CB8AC3E}">
         <p14:creationId xmlns:p14="http://schemas.microsoft.com/office/powerpoint/2010/main" val="3927560197"/>
-      </p:ext>
-    </p:extLst>
-  </p:cSld>
-  <p:clrMapOvr>
-    <a:masterClrMapping/>
-  </p:clrMapOvr>
-  <p:timing>
-    <p:tnLst>
-      <p:par>
-        <p:cTn id="1" dur="indefinite" restart="never" nodeType="tmRoot">
-          <p:childTnLst>
-            <p:seq concurrent="1" nextAc="seek">
-              <p:cTn id="2" dur="indefinite" nodeType="mainSeq">
-                <p:childTnLst>
-                  <p:par>
-                    <p:cTn id="3" fill="hold">
-                      <p:stCondLst>
-                        <p:cond delay="indefinite"/>
-                      </p:stCondLst>
-                      <p:childTnLst>
-                        <p:par>
-                          <p:cTn id="4" fill="hold">
-                            <p:stCondLst>
-                              <p:cond delay="0"/>
-                            </p:stCondLst>
-                            <p:childTnLst>
-                              <p:par>
-                                <p:cTn id="5" presetID="2" presetClass="exit" presetSubtype="8" fill="hold" grpId="0" nodeType="clickEffect">
-                                  <p:stCondLst>
-                                    <p:cond delay="900"/>
-                                  </p:stCondLst>
-                                  <p:childTnLst>
-                                    <p:anim calcmode="lin" valueType="num">
-                                      <p:cBhvr additive="base">
-                                        <p:cTn id="6" dur="3000"/>
-                                        <p:tgtEl>
-                                          <p:spTgt spid="7"/>
-                                        </p:tgtEl>
-                                        <p:attrNameLst>
-                                          <p:attrName>ppt_x</p:attrName>
-                                        </p:attrNameLst>
-                                      </p:cBhvr>
-                                      <p:tavLst>
-                                        <p:tav tm="0">
-                                          <p:val>
-                                            <p:strVal val="ppt_x"/>
-                                          </p:val>
-                                        </p:tav>
-                                        <p:tav tm="100000">
-                                          <p:val>
-                                            <p:strVal val="0-ppt_w/2"/>
-                                          </p:val>
-                                        </p:tav>
-                                      </p:tavLst>
-                                    </p:anim>
-                                    <p:anim calcmode="lin" valueType="num">
-                                      <p:cBhvr additive="base">
-                                        <p:cTn id="7" dur="3000"/>
-                                        <p:tgtEl>
-                                          <p:spTgt spid="7"/>
-                                        </p:tgtEl>
-                                        <p:attrNameLst>
-                                          <p:attrName>ppt_y</p:attrName>
-                                        </p:attrNameLst>
-                                      </p:cBhvr>
-                                      <p:tavLst>
-                                        <p:tav tm="0">
-                                          <p:val>
-                                            <p:strVal val="ppt_y"/>
-                                          </p:val>
-                                        </p:tav>
-                                        <p:tav tm="100000">
-                                          <p:val>
-                                            <p:strVal val="ppt_y"/>
-                                          </p:val>
-                                        </p:tav>
-                                      </p:tavLst>
-                                    </p:anim>
-                                    <p:set>
-                                      <p:cBhvr>
-                                        <p:cTn id="8" dur="1" fill="hold">
-                                          <p:stCondLst>
-                                            <p:cond delay="2999"/>
-                                          </p:stCondLst>
-                                        </p:cTn>
-                                        <p:tgtEl>
-                                          <p:spTgt spid="7"/>
-                                        </p:tgtEl>
-                                        <p:attrNameLst>
-                                          <p:attrName>style.visibility</p:attrName>
-                                        </p:attrNameLst>
-                                      </p:cBhvr>
-                                      <p:to>
-                                        <p:strVal val="hidden"/>
-                                      </p:to>
-                                    </p:set>
-                                  </p:childTnLst>
-                                </p:cTn>
-                              </p:par>
-                              <p:par>
-                                <p:cTn id="9" presetID="2" presetClass="entr" presetSubtype="2" fill="hold" grpId="0" nodeType="withEffect">
-                                  <p:stCondLst>
-                                    <p:cond delay="0"/>
-                                  </p:stCondLst>
-                                  <p:childTnLst>
-                                    <p:set>
-                                      <p:cBhvr>
-                                        <p:cTn id="10" dur="1" fill="hold">
-                                          <p:stCondLst>
-                                            <p:cond delay="0"/>
-                                          </p:stCondLst>
-                                        </p:cTn>
-                                        <p:tgtEl>
-                                          <p:spTgt spid="8"/>
-                                        </p:tgtEl>
-                                        <p:attrNameLst>
-                                          <p:attrName>style.visibility</p:attrName>
-                                        </p:attrNameLst>
-                                      </p:cBhvr>
-                                      <p:to>
-                                        <p:strVal val="visible"/>
-                                      </p:to>
-                                    </p:set>
-                                    <p:anim calcmode="lin" valueType="num">
-                                      <p:cBhvr additive="base">
-                                        <p:cTn id="11" dur="3000" fill="hold"/>
-                                        <p:tgtEl>
-                                          <p:spTgt spid="8"/>
-                                        </p:tgtEl>
-                                        <p:attrNameLst>
-                                          <p:attrName>ppt_x</p:attrName>
-                                        </p:attrNameLst>
-                                      </p:cBhvr>
-                                      <p:tavLst>
-                                        <p:tav tm="0">
-                                          <p:val>
-                                            <p:strVal val="1+#ppt_w/2"/>
-                                          </p:val>
-                                        </p:tav>
-                                        <p:tav tm="100000">
-                                          <p:val>
-                                            <p:strVal val="#ppt_x"/>
-                                          </p:val>
-                                        </p:tav>
-                                      </p:tavLst>
-                                    </p:anim>
-                                    <p:anim calcmode="lin" valueType="num">
-                                      <p:cBhvr additive="base">
-                                        <p:cTn id="12" dur="3000" fill="hold"/>
-                                        <p:tgtEl>
-                                          <p:spTgt spid="8"/>
-                                        </p:tgtEl>
-                                        <p:attrNameLst>
-                                          <p:attrName>ppt_y</p:attrName>
-                                        </p:attrNameLst>
-                                      </p:cBhvr>
-                                      <p:tavLst>
-                                        <p:tav tm="0">
-                                          <p:val>
-                                            <p:strVal val="#ppt_y"/>
-                                          </p:val>
-                                        </p:tav>
-                                        <p:tav tm="100000">
-                                          <p:val>
-                                            <p:strVal val="#ppt_y"/>
-                                          </p:val>
-                                        </p:tav>
-                                      </p:tavLst>
-                                    </p:anim>
-                                  </p:childTnLst>
-                                </p:cTn>
-                              </p:par>
-                            </p:childTnLst>
-                          </p:cTn>
-                        </p:par>
-                      </p:childTnLst>
-                    </p:cTn>
-                  </p:par>
-                  <p:par>
-                    <p:cTn id="13" fill="hold">
-                      <p:stCondLst>
-                        <p:cond delay="indefinite"/>
-                      </p:stCondLst>
-                      <p:childTnLst>
-                        <p:par>
-                          <p:cTn id="14" fill="hold">
-                            <p:stCondLst>
-                              <p:cond delay="0"/>
-                            </p:stCondLst>
-                            <p:childTnLst>
-                              <p:par>
-                                <p:cTn id="15" presetID="2" presetClass="exit" presetSubtype="8" fill="hold" grpId="1" nodeType="clickEffect">
-                                  <p:stCondLst>
-                                    <p:cond delay="100"/>
-                                  </p:stCondLst>
-                                  <p:childTnLst>
-                                    <p:anim calcmode="lin" valueType="num">
-                                      <p:cBhvr additive="base">
-                                        <p:cTn id="16" dur="3000"/>
-                                        <p:tgtEl>
-                                          <p:spTgt spid="8"/>
-                                        </p:tgtEl>
-                                        <p:attrNameLst>
-                                          <p:attrName>ppt_x</p:attrName>
-                                        </p:attrNameLst>
-                                      </p:cBhvr>
-                                      <p:tavLst>
-                                        <p:tav tm="0">
-                                          <p:val>
-                                            <p:strVal val="ppt_x"/>
-                                          </p:val>
-                                        </p:tav>
-                                        <p:tav tm="100000">
-                                          <p:val>
-                                            <p:strVal val="0-ppt_w/2"/>
-                                          </p:val>
-                                        </p:tav>
-                                      </p:tavLst>
-                                    </p:anim>
-                                    <p:anim calcmode="lin" valueType="num">
-                                      <p:cBhvr additive="base">
-                                        <p:cTn id="17" dur="3000"/>
-                                        <p:tgtEl>
-                                          <p:spTgt spid="8"/>
-                                        </p:tgtEl>
-                                        <p:attrNameLst>
-                                          <p:attrName>ppt_y</p:attrName>
-                                        </p:attrNameLst>
-                                      </p:cBhvr>
-                                      <p:tavLst>
-                                        <p:tav tm="0">
-                                          <p:val>
-                                            <p:strVal val="ppt_y"/>
-                                          </p:val>
-                                        </p:tav>
-                                        <p:tav tm="100000">
-                                          <p:val>
-                                            <p:strVal val="ppt_y"/>
-                                          </p:val>
-                                        </p:tav>
-                                      </p:tavLst>
-                                    </p:anim>
-                                    <p:set>
-                                      <p:cBhvr>
-                                        <p:cTn id="18" dur="1" fill="hold">
-                                          <p:stCondLst>
-                                            <p:cond delay="2999"/>
-                                          </p:stCondLst>
-                                        </p:cTn>
-                                        <p:tgtEl>
-                                          <p:spTgt spid="8"/>
-                                        </p:tgtEl>
-                                        <p:attrNameLst>
-                                          <p:attrName>style.visibility</p:attrName>
-                                        </p:attrNameLst>
-                                      </p:cBhvr>
-                                      <p:to>
-                                        <p:strVal val="hidden"/>
-                                      </p:to>
-                                    </p:set>
-                                  </p:childTnLst>
-                                </p:cTn>
-                              </p:par>
-                              <p:par>
-                                <p:cTn id="19" presetID="2" presetClass="entr" presetSubtype="2" fill="hold" grpId="0" nodeType="withEffect">
-                                  <p:stCondLst>
-                                    <p:cond delay="0"/>
-                                  </p:stCondLst>
-                                  <p:childTnLst>
-                                    <p:set>
-                                      <p:cBhvr>
-                                        <p:cTn id="20" dur="1" fill="hold">
-                                          <p:stCondLst>
-                                            <p:cond delay="0"/>
-                                          </p:stCondLst>
-                                        </p:cTn>
-                                        <p:tgtEl>
-                                          <p:spTgt spid="9"/>
-                                        </p:tgtEl>
-                                        <p:attrNameLst>
-                                          <p:attrName>style.visibility</p:attrName>
-                                        </p:attrNameLst>
-                                      </p:cBhvr>
-                                      <p:to>
-                                        <p:strVal val="visible"/>
-                                      </p:to>
-                                    </p:set>
-                                    <p:anim calcmode="lin" valueType="num">
-                                      <p:cBhvr additive="base">
-                                        <p:cTn id="21" dur="3000" fill="hold"/>
-                                        <p:tgtEl>
-                                          <p:spTgt spid="9"/>
-                                        </p:tgtEl>
-                                        <p:attrNameLst>
-                                          <p:attrName>ppt_x</p:attrName>
-                                        </p:attrNameLst>
-                                      </p:cBhvr>
-                                      <p:tavLst>
-                                        <p:tav tm="0">
-                                          <p:val>
-                                            <p:strVal val="1+#ppt_w/2"/>
-                                          </p:val>
-                                        </p:tav>
-                                        <p:tav tm="100000">
-                                          <p:val>
-                                            <p:strVal val="#ppt_x"/>
-                                          </p:val>
-                                        </p:tav>
-                                      </p:tavLst>
-                                    </p:anim>
-                                    <p:anim calcmode="lin" valueType="num">
-                                      <p:cBhvr additive="base">
-                                        <p:cTn id="22" dur="3000" fill="hold"/>
-                                        <p:tgtEl>
-                                          <p:spTgt spid="9"/>
-                                        </p:tgtEl>
-                                        <p:attrNameLst>
-                                          <p:attrName>ppt_y</p:attrName>
-                                        </p:attrNameLst>
-                                      </p:cBhvr>
-                                      <p:tavLst>
-                                        <p:tav tm="0">
-                                          <p:val>
-                                            <p:strVal val="#ppt_y"/>
-                                          </p:val>
-                                        </p:tav>
-                                        <p:tav tm="100000">
-                                          <p:val>
-                                            <p:strVal val="#ppt_y"/>
-                                          </p:val>
-                                        </p:tav>
-                                      </p:tavLst>
-                                    </p:anim>
-                                  </p:childTnLst>
-                                </p:cTn>
-                              </p:par>
-                            </p:childTnLst>
-                          </p:cTn>
-                        </p:par>
-                      </p:childTnLst>
-                    </p:cTn>
-                  </p:par>
-                  <p:par>
-                    <p:cTn id="23" fill="hold">
-                      <p:stCondLst>
-                        <p:cond delay="indefinite"/>
-                      </p:stCondLst>
-                      <p:childTnLst>
-                        <p:par>
-                          <p:cTn id="24" fill="hold">
-                            <p:stCondLst>
-                              <p:cond delay="0"/>
-                            </p:stCondLst>
-                            <p:childTnLst>
-                              <p:par>
-                                <p:cTn id="25" presetID="2" presetClass="exit" presetSubtype="8" fill="hold" grpId="1" nodeType="clickEffect">
-                                  <p:stCondLst>
-                                    <p:cond delay="100"/>
-                                  </p:stCondLst>
-                                  <p:childTnLst>
-                                    <p:anim calcmode="lin" valueType="num">
-                                      <p:cBhvr additive="base">
-                                        <p:cTn id="26" dur="3000"/>
-                                        <p:tgtEl>
-                                          <p:spTgt spid="9"/>
-                                        </p:tgtEl>
-                                        <p:attrNameLst>
-                                          <p:attrName>ppt_x</p:attrName>
-                                        </p:attrNameLst>
-                                      </p:cBhvr>
-                                      <p:tavLst>
-                                        <p:tav tm="0">
-                                          <p:val>
-                                            <p:strVal val="ppt_x"/>
-                                          </p:val>
-                                        </p:tav>
-                                        <p:tav tm="100000">
-                                          <p:val>
-                                            <p:strVal val="0-ppt_w/2"/>
-                                          </p:val>
-                                        </p:tav>
-                                      </p:tavLst>
-                                    </p:anim>
-                                    <p:anim calcmode="lin" valueType="num">
-                                      <p:cBhvr additive="base">
-                                        <p:cTn id="27" dur="3000"/>
-                                        <p:tgtEl>
-                                          <p:spTgt spid="9"/>
-                                        </p:tgtEl>
-                                        <p:attrNameLst>
-                                          <p:attrName>ppt_y</p:attrName>
-                                        </p:attrNameLst>
-                                      </p:cBhvr>
-                                      <p:tavLst>
-                                        <p:tav tm="0">
-                                          <p:val>
-                                            <p:strVal val="ppt_y"/>
-                                          </p:val>
-                                        </p:tav>
-                                        <p:tav tm="100000">
-                                          <p:val>
-                                            <p:strVal val="ppt_y"/>
-                                          </p:val>
-                                        </p:tav>
-                                      </p:tavLst>
-                                    </p:anim>
-                                    <p:set>
-                                      <p:cBhvr>
-                                        <p:cTn id="28" dur="1" fill="hold">
-                                          <p:stCondLst>
-                                            <p:cond delay="2999"/>
-                                          </p:stCondLst>
-                                        </p:cTn>
-                                        <p:tgtEl>
-                                          <p:spTgt spid="9"/>
-                                        </p:tgtEl>
-                                        <p:attrNameLst>
-                                          <p:attrName>style.visibility</p:attrName>
-                                        </p:attrNameLst>
-                                      </p:cBhvr>
-                                      <p:to>
-                                        <p:strVal val="hidden"/>
-                                      </p:to>
-                                    </p:set>
-                                  </p:childTnLst>
-                                </p:cTn>
-                              </p:par>
-                              <p:par>
-                                <p:cTn id="29" presetID="2" presetClass="entr" presetSubtype="2" fill="hold" grpId="0" nodeType="withEffect">
-                                  <p:stCondLst>
-                                    <p:cond delay="0"/>
-                                  </p:stCondLst>
-                                  <p:childTnLst>
-                                    <p:set>
-                                      <p:cBhvr>
-                                        <p:cTn id="30" dur="1" fill="hold">
-                                          <p:stCondLst>
-                                            <p:cond delay="0"/>
-                                          </p:stCondLst>
-                                        </p:cTn>
-                                        <p:tgtEl>
-                                          <p:spTgt spid="10"/>
-                                        </p:tgtEl>
-                                        <p:attrNameLst>
-                                          <p:attrName>style.visibility</p:attrName>
-                                        </p:attrNameLst>
-                                      </p:cBhvr>
-                                      <p:to>
-                                        <p:strVal val="visible"/>
-                                      </p:to>
-                                    </p:set>
-                                    <p:anim calcmode="lin" valueType="num">
-                                      <p:cBhvr additive="base">
-                                        <p:cTn id="31" dur="3000" fill="hold"/>
-                                        <p:tgtEl>
-                                          <p:spTgt spid="10"/>
-                                        </p:tgtEl>
-                                        <p:attrNameLst>
-                                          <p:attrName>ppt_x</p:attrName>
-                                        </p:attrNameLst>
-                                      </p:cBhvr>
-                                      <p:tavLst>
-                                        <p:tav tm="0">
-                                          <p:val>
-                                            <p:strVal val="1+#ppt_w/2"/>
-                                          </p:val>
-                                        </p:tav>
-                                        <p:tav tm="100000">
-                                          <p:val>
-                                            <p:strVal val="#ppt_x"/>
-                                          </p:val>
-                                        </p:tav>
-                                      </p:tavLst>
-                                    </p:anim>
-                                    <p:anim calcmode="lin" valueType="num">
-                                      <p:cBhvr additive="base">
-                                        <p:cTn id="32" dur="3000" fill="hold"/>
-                                        <p:tgtEl>
-                                          <p:spTgt spid="10"/>
-                                        </p:tgtEl>
-                                        <p:attrNameLst>
-                                          <p:attrName>ppt_y</p:attrName>
-                                        </p:attrNameLst>
-                                      </p:cBhvr>
-                                      <p:tavLst>
-                                        <p:tav tm="0">
-                                          <p:val>
-                                            <p:strVal val="#ppt_y"/>
-                                          </p:val>
-                                        </p:tav>
-                                        <p:tav tm="100000">
-                                          <p:val>
-                                            <p:strVal val="#ppt_y"/>
-                                          </p:val>
-                                        </p:tav>
-                                      </p:tavLst>
-                                    </p:anim>
-                                  </p:childTnLst>
-                                </p:cTn>
-                              </p:par>
-                            </p:childTnLst>
-                          </p:cTn>
-                        </p:par>
-                      </p:childTnLst>
-                    </p:cTn>
-                  </p:par>
-                </p:childTnLst>
-              </p:cTn>
-              <p:prevCondLst>
-                <p:cond evt="onPrev" delay="0">
-                  <p:tgtEl>
-                    <p:sldTgt/>
-                  </p:tgtEl>
-                </p:cond>
-              </p:prevCondLst>
-              <p:nextCondLst>
-                <p:cond evt="onNext" delay="0">
-                  <p:tgtEl>
-                    <p:sldTgt/>
-                  </p:tgtEl>
-                </p:cond>
-              </p:nextCondLst>
-            </p:seq>
-          </p:childTnLst>
-        </p:cTn>
-      </p:par>
-    </p:tnLst>
-    <p:bldLst>
-      <p:bldP spid="7" grpId="0" animBg="1"/>
-      <p:bldP spid="8" grpId="0" animBg="1"/>
-      <p:bldP spid="8" grpId="1" animBg="1"/>
-      <p:bldP spid="9" grpId="0" animBg="1"/>
-      <p:bldP spid="9" grpId="1" animBg="1"/>
-      <p:bldP spid="10" grpId="0" animBg="1"/>
-    </p:bldLst>
-  </p:timing>
-</p:sld>
-</file>
-
-<file path=ppt/slides/slide9.xml><?xml version="1.0" encoding="utf-8"?>
-<p:sld xmlns:a="http://schemas.openxmlformats.org/drawingml/2006/main" xmlns:r="http://schemas.openxmlformats.org/officeDocument/2006/relationships" xmlns:p="http://schemas.openxmlformats.org/presentationml/2006/main">
-  <p:cSld>
-    <p:spTree>
-      <p:nvGrpSpPr>
-        <p:cNvPr id="1" name=""/>
-        <p:cNvGrpSpPr/>
-        <p:nvPr/>
-      </p:nvGrpSpPr>
-      <p:grpSpPr>
-        <a:xfrm>
-          <a:off x="0" y="0"/>
-          <a:ext cx="0" cy="0"/>
-          <a:chOff x="0" y="0"/>
-          <a:chExt cx="0" cy="0"/>
-        </a:xfrm>
-      </p:grpSpPr>
-      <p:sp>
-        <p:nvSpPr>
-          <p:cNvPr id="2" name="TextBox 1">
-            <a:extLst>
-              <a:ext uri="{FF2B5EF4-FFF2-40B4-BE49-F238E27FC236}">
-                <a16:creationId xmlns="" xmlns:a16="http://schemas.microsoft.com/office/drawing/2014/main" id="{6F77B270-35F1-4A5B-875A-9BFD13BC898E}"/>
-              </a:ext>
-            </a:extLst>
-          </p:cNvPr>
-          <p:cNvSpPr txBox="1"/>
-          <p:nvPr/>
-        </p:nvSpPr>
-        <p:spPr>
-          <a:xfrm>
-            <a:off x="3779500" y="-6111"/>
-            <a:ext cx="4633001" cy="646331"/>
-          </a:xfrm>
-          <a:prstGeom prst="rect">
-            <a:avLst/>
-          </a:prstGeom>
-          <a:noFill/>
-        </p:spPr>
-        <p:txBody>
-          <a:bodyPr wrap="square" rtlCol="0">
-            <a:spAutoFit/>
-          </a:bodyPr>
-          <a:lstStyle/>
-          <a:p>
-            <a:r>
-              <a:rPr lang="en-GB" sz="3600" b="1" u="sng" dirty="0" smtClean="0">
-                <a:solidFill>
-                  <a:srgbClr val="FF0000"/>
-                </a:solidFill>
-                <a:highlight>
-                  <a:srgbClr val="00FFFF"/>
-                </a:highlight>
-                <a:latin typeface="Courier New" panose="02070309020205020404" pitchFamily="49" charset="0"/>
-                <a:cs typeface="Courier New" panose="02070309020205020404" pitchFamily="49" charset="0"/>
-                <a:hlinkClick r:id="rId2"/>
-              </a:rPr>
-              <a:t>SAM (BAM) Format</a:t>
-            </a:r>
-            <a:endParaRPr lang="en-GB" sz="3600" b="1" u="sng" dirty="0">
-              <a:solidFill>
-                <a:srgbClr val="FF0000"/>
-              </a:solidFill>
-              <a:highlight>
-                <a:srgbClr val="00FFFF"/>
-              </a:highlight>
-              <a:latin typeface="Courier New" panose="02070309020205020404" pitchFamily="49" charset="0"/>
-              <a:cs typeface="Courier New" panose="02070309020205020404" pitchFamily="49" charset="0"/>
-            </a:endParaRPr>
-          </a:p>
-        </p:txBody>
-      </p:sp>
-      <p:sp>
-        <p:nvSpPr>
-          <p:cNvPr id="7" name="TextBox 6"/>
-          <p:cNvSpPr txBox="1"/>
-          <p:nvPr/>
-        </p:nvSpPr>
-        <p:spPr>
-          <a:xfrm>
-            <a:off x="-4" y="1043461"/>
-            <a:ext cx="12192000" cy="1754326"/>
-          </a:xfrm>
-          <a:prstGeom prst="rect">
-            <a:avLst/>
-          </a:prstGeom>
-          <a:solidFill>
-            <a:schemeClr val="accent5">
-              <a:lumMod val="40000"/>
-              <a:lumOff val="60000"/>
-            </a:schemeClr>
-          </a:solidFill>
-        </p:spPr>
-        <p:txBody>
-          <a:bodyPr wrap="square" rtlCol="0">
-            <a:spAutoFit/>
-          </a:bodyPr>
-          <a:lstStyle/>
-          <a:p>
-            <a:r>
-              <a:rPr lang="en-GB" sz="1200" b="1" dirty="0" smtClean="0">
-                <a:latin typeface="Courier New" panose="02070309020205020404" pitchFamily="49" charset="0"/>
-                <a:cs typeface="Courier New" panose="02070309020205020404" pitchFamily="49" charset="0"/>
-              </a:rPr>
-              <a:t>HWI:2201:3405:87192</a:t>
-            </a:r>
-            <a:r>
-              <a:rPr lang="en-GB" sz="1200" b="1" dirty="0">
-                <a:latin typeface="Courier New" panose="02070309020205020404" pitchFamily="49" charset="0"/>
-                <a:cs typeface="Courier New" panose="02070309020205020404" pitchFamily="49" charset="0"/>
-              </a:rPr>
-              <a:t> </a:t>
-            </a:r>
-            <a:r>
-              <a:rPr lang="en-GB" sz="1200" b="1" dirty="0" smtClean="0">
-                <a:latin typeface="Courier New" panose="02070309020205020404" pitchFamily="49" charset="0"/>
-                <a:cs typeface="Courier New" panose="02070309020205020404" pitchFamily="49" charset="0"/>
-              </a:rPr>
-              <a:t>    99     </a:t>
-            </a:r>
-            <a:r>
-              <a:rPr lang="en-GB" sz="1200" b="1" dirty="0" err="1" smtClean="0">
-                <a:latin typeface="Courier New" panose="02070309020205020404" pitchFamily="49" charset="0"/>
-                <a:cs typeface="Courier New" panose="02070309020205020404" pitchFamily="49" charset="0"/>
-              </a:rPr>
-              <a:t>dmel_mito</a:t>
-            </a:r>
-            <a:r>
-              <a:rPr lang="en-GB" sz="1200" b="1" dirty="0" smtClean="0">
-                <a:latin typeface="Courier New" panose="02070309020205020404" pitchFamily="49" charset="0"/>
-                <a:cs typeface="Courier New" panose="02070309020205020404" pitchFamily="49" charset="0"/>
-              </a:rPr>
-              <a:t>   12782       0     126M        =    12861      205     </a:t>
-            </a:r>
-          </a:p>
-          <a:p>
-            <a:r>
-              <a:rPr lang="en-GB" sz="1200" b="1" dirty="0" smtClean="0">
-                <a:latin typeface="Courier New" panose="02070309020205020404" pitchFamily="49" charset="0"/>
-                <a:cs typeface="Courier New" panose="02070309020205020404" pitchFamily="49" charset="0"/>
-              </a:rPr>
-              <a:t>HWI:2201:3405:87192     147    </a:t>
-            </a:r>
-            <a:r>
-              <a:rPr lang="en-GB" sz="1200" b="1" dirty="0" err="1" smtClean="0">
-                <a:latin typeface="Courier New" panose="02070309020205020404" pitchFamily="49" charset="0"/>
-                <a:cs typeface="Courier New" panose="02070309020205020404" pitchFamily="49" charset="0"/>
-              </a:rPr>
-              <a:t>dmel_mito</a:t>
-            </a:r>
-            <a:r>
-              <a:rPr lang="en-GB" sz="1200" b="1" dirty="0" smtClean="0">
-                <a:latin typeface="Courier New" panose="02070309020205020404" pitchFamily="49" charset="0"/>
-                <a:cs typeface="Courier New" panose="02070309020205020404" pitchFamily="49" charset="0"/>
-              </a:rPr>
-              <a:t>   12861       0     126M        =    12782      -205    </a:t>
-            </a:r>
-          </a:p>
-          <a:p>
-            <a:r>
-              <a:rPr lang="en-GB" sz="1200" b="1" dirty="0" smtClean="0">
-                <a:latin typeface="Courier New" panose="02070309020205020404" pitchFamily="49" charset="0"/>
-                <a:cs typeface="Courier New" panose="02070309020205020404" pitchFamily="49" charset="0"/>
-              </a:rPr>
-              <a:t>HWI:2103:18194:76364    163    3L          12800822    60    109M17S     =    12800832   109     </a:t>
-            </a:r>
-          </a:p>
-          <a:p>
-            <a:r>
-              <a:rPr lang="en-GB" sz="1200" b="1" dirty="0" smtClean="0">
-                <a:latin typeface="Courier New" panose="02070309020205020404" pitchFamily="49" charset="0"/>
-                <a:cs typeface="Courier New" panose="02070309020205020404" pitchFamily="49" charset="0"/>
-              </a:rPr>
-              <a:t>HWI:2212:20688:12158    99     3L          11742128    60    118M8S      =    11742129   117     </a:t>
-            </a:r>
-          </a:p>
-          <a:p>
-            <a:r>
-              <a:rPr lang="en-GB" sz="1200" b="1" dirty="0" smtClean="0">
-                <a:latin typeface="Courier New" panose="02070309020205020404" pitchFamily="49" charset="0"/>
-                <a:cs typeface="Courier New" panose="02070309020205020404" pitchFamily="49" charset="0"/>
-              </a:rPr>
-              <a:t>HWI:2212:20688:12158    147    3L          11742129    60    10S116M     =    11742128   -117    </a:t>
-            </a:r>
-          </a:p>
-          <a:p>
-            <a:r>
-              <a:rPr lang="en-GB" sz="1200" b="1" dirty="0" smtClean="0">
-                <a:latin typeface="Courier New" panose="02070309020205020404" pitchFamily="49" charset="0"/>
-                <a:cs typeface="Courier New" panose="02070309020205020404" pitchFamily="49" charset="0"/>
-              </a:rPr>
-              <a:t>HWI:2212:7490:18212     99     2L          18475464    60    24M6D102M   =    18475585   247     </a:t>
-            </a:r>
-          </a:p>
-          <a:p>
-            <a:r>
-              <a:rPr lang="en-GB" sz="1200" b="1" dirty="0" smtClean="0">
-                <a:latin typeface="Courier New" panose="02070309020205020404" pitchFamily="49" charset="0"/>
-                <a:cs typeface="Courier New" panose="02070309020205020404" pitchFamily="49" charset="0"/>
-              </a:rPr>
-              <a:t>HWI:2212:7490:18212     147    2L          18475585    60    126M        =    18475464   -247    </a:t>
-            </a:r>
-          </a:p>
-          <a:p>
-            <a:r>
-              <a:rPr lang="en-GB" sz="1200" b="1" dirty="0" smtClean="0">
-                <a:latin typeface="Courier New" panose="02070309020205020404" pitchFamily="49" charset="0"/>
-                <a:cs typeface="Courier New" panose="02070309020205020404" pitchFamily="49" charset="0"/>
-              </a:rPr>
-              <a:t>HWI:1204:13239:91066    99     3L          20938388    60    115M11S     =    20938388   114     </a:t>
-            </a:r>
-          </a:p>
-          <a:p>
-            <a:r>
-              <a:rPr lang="en-GB" sz="1200" b="1" dirty="0" smtClean="0">
-                <a:latin typeface="Courier New" panose="02070309020205020404" pitchFamily="49" charset="0"/>
-                <a:cs typeface="Courier New" panose="02070309020205020404" pitchFamily="49" charset="0"/>
-              </a:rPr>
-              <a:t>HWI:1204:13239:91066    147    3L          20938388    60    12S114M     =    20938388   -114    </a:t>
-            </a:r>
-          </a:p>
-        </p:txBody>
-      </p:sp>
-      <p:sp>
-        <p:nvSpPr>
-          <p:cNvPr id="8" name="TextBox 7"/>
-          <p:cNvSpPr txBox="1"/>
-          <p:nvPr/>
-        </p:nvSpPr>
-        <p:spPr>
-          <a:xfrm>
-            <a:off x="-4" y="1048285"/>
-            <a:ext cx="12192000" cy="1754326"/>
-          </a:xfrm>
-          <a:prstGeom prst="rect">
-            <a:avLst/>
-          </a:prstGeom>
-          <a:solidFill>
-            <a:schemeClr val="accent5">
-              <a:lumMod val="40000"/>
-              <a:lumOff val="60000"/>
-            </a:schemeClr>
-          </a:solidFill>
-        </p:spPr>
-        <p:txBody>
-          <a:bodyPr wrap="square" rtlCol="0">
-            <a:spAutoFit/>
-          </a:bodyPr>
-          <a:lstStyle/>
-          <a:p>
-            <a:r>
-              <a:rPr lang="en-GB" sz="1200" b="1" dirty="0" smtClean="0">
-                <a:latin typeface="Courier New" panose="02070309020205020404" pitchFamily="49" charset="0"/>
-                <a:cs typeface="Courier New" panose="02070309020205020404" pitchFamily="49" charset="0"/>
-              </a:rPr>
-              <a:t>GTCCTTTCGTACTAAAATATCATAATTTTTTAAAGATAGAAACCAACCTGGCTTACACCGGTTTGAACTCAGATCATGTAAGAATTTAAAAGTCGAACAGACTTAAAATTTGAACGGCTACACCCA</a:t>
-            </a:r>
-          </a:p>
-          <a:p>
-            <a:r>
-              <a:rPr lang="en-GB" sz="1200" b="1" dirty="0" smtClean="0">
-                <a:latin typeface="Courier New" panose="02070309020205020404" pitchFamily="49" charset="0"/>
-                <a:cs typeface="Courier New" panose="02070309020205020404" pitchFamily="49" charset="0"/>
-              </a:rPr>
-              <a:t>AAGAATTTAAAAGTCGAACAGACTTAAAATTTGAACGGCTACACCCAAAATTATATCTTAATCCAACATCGAGGTCGCAATCTTTTTTATCGATATGAACTCTCCAAAAAAATTACGCTGTTATCC</a:t>
-            </a:r>
-          </a:p>
-          <a:p>
-            <a:r>
-              <a:rPr lang="en-GB" sz="1200" b="1" dirty="0" smtClean="0">
-                <a:latin typeface="Courier New" panose="02070309020205020404" pitchFamily="49" charset="0"/>
-                <a:cs typeface="Courier New" panose="02070309020205020404" pitchFamily="49" charset="0"/>
-              </a:rPr>
-              <a:t>GTGCAACTGATCCGAACCATTCATCAGCCGCGCCAGCGAATTATAACGACATCCGCGGGAGTTTCGAATGCCAGTGTAGTGACCACTACTCCAGTGCAGGCGCCAACAGCTCTTTCCGTTTCCGCC</a:t>
-            </a:r>
-            <a:endParaRPr lang="en-GB" sz="1200" b="1" dirty="0">
-              <a:latin typeface="Courier New" panose="02070309020205020404" pitchFamily="49" charset="0"/>
-              <a:cs typeface="Courier New" panose="02070309020205020404" pitchFamily="49" charset="0"/>
-            </a:endParaRPr>
-          </a:p>
-          <a:p>
-            <a:r>
-              <a:rPr lang="en-GB" sz="1200" b="1" dirty="0" smtClean="0">
-                <a:latin typeface="Courier New" panose="02070309020205020404" pitchFamily="49" charset="0"/>
-                <a:cs typeface="Courier New" panose="02070309020205020404" pitchFamily="49" charset="0"/>
-              </a:rPr>
-              <a:t>GCAAATATAGAATATAGAAGCTAGGTGCTTTGAAGGCGAAGAATTATTATATTCGTTGACACGAGTAAACAAGAGAGTTTCAGCTAACACATTTCCCAATGGATATTCCCAAGGATAAGATCGGAA</a:t>
-            </a:r>
-            <a:endParaRPr lang="en-GB" sz="1200" b="1" dirty="0">
-              <a:latin typeface="Courier New" panose="02070309020205020404" pitchFamily="49" charset="0"/>
-              <a:cs typeface="Courier New" panose="02070309020205020404" pitchFamily="49" charset="0"/>
-            </a:endParaRPr>
-          </a:p>
-          <a:p>
-            <a:r>
-              <a:rPr lang="en-GB" sz="1200" b="1" dirty="0" smtClean="0">
-                <a:latin typeface="Courier New" panose="02070309020205020404" pitchFamily="49" charset="0"/>
-                <a:cs typeface="Courier New" panose="02070309020205020404" pitchFamily="49" charset="0"/>
-              </a:rPr>
-              <a:t>TTCCGATCTGCAAATATAGAATATAGAAGCTAGGTGCTTTGAAGGCGAAGAATTATTATATTCGTTGACACGAGTAAACAAGAGAGTTTCAGCTAACACATTTCCCAATGGATATTCCCAAGGATA</a:t>
-            </a:r>
-            <a:endParaRPr lang="en-GB" sz="1200" b="1" dirty="0">
-              <a:latin typeface="Courier New" panose="02070309020205020404" pitchFamily="49" charset="0"/>
-              <a:cs typeface="Courier New" panose="02070309020205020404" pitchFamily="49" charset="0"/>
-            </a:endParaRPr>
-          </a:p>
-          <a:p>
-            <a:r>
-              <a:rPr lang="en-GB" sz="1200" b="1" dirty="0" smtClean="0">
-                <a:latin typeface="Courier New" panose="02070309020205020404" pitchFamily="49" charset="0"/>
-                <a:cs typeface="Courier New" panose="02070309020205020404" pitchFamily="49" charset="0"/>
-              </a:rPr>
-              <a:t>GCATGTGTCTCTCAGCTGCCTTGGCCGATCCCGATCCCGATACAGATCCAGATCCCAATCCCGATACAGATCCCAAACCAAAATTGCCCACAAGTTGTCCGTATTTCTCGGGTGACAATTTCTGAA</a:t>
-            </a:r>
-            <a:endParaRPr lang="en-GB" sz="1200" b="1" dirty="0">
-              <a:latin typeface="Courier New" panose="02070309020205020404" pitchFamily="49" charset="0"/>
-              <a:cs typeface="Courier New" panose="02070309020205020404" pitchFamily="49" charset="0"/>
-            </a:endParaRPr>
-          </a:p>
-          <a:p>
-            <a:r>
-              <a:rPr lang="en-GB" sz="1200" b="1" dirty="0" smtClean="0">
-                <a:latin typeface="Courier New" panose="02070309020205020404" pitchFamily="49" charset="0"/>
-                <a:cs typeface="Courier New" panose="02070309020205020404" pitchFamily="49" charset="0"/>
-              </a:rPr>
-              <a:t>CAATTTCTGAAATTTCGGTTCGGTTCTTAGGAGATTTTCGTGTGACGGGGAGCGTTGTTTCTGGAGTGATGTTGCAGCTGCATCGACAACGCTGGCCGATGTTGCTGTCGCGCTCGTGGCAGCGAT</a:t>
-            </a:r>
-            <a:endParaRPr lang="en-GB" sz="1200" b="1" dirty="0">
-              <a:latin typeface="Courier New" panose="02070309020205020404" pitchFamily="49" charset="0"/>
-              <a:cs typeface="Courier New" panose="02070309020205020404" pitchFamily="49" charset="0"/>
-            </a:endParaRPr>
-          </a:p>
-          <a:p>
-            <a:r>
-              <a:rPr lang="en-GB" sz="1200" b="1" dirty="0" smtClean="0">
-                <a:latin typeface="Courier New" panose="02070309020205020404" pitchFamily="49" charset="0"/>
-                <a:cs typeface="Courier New" panose="02070309020205020404" pitchFamily="49" charset="0"/>
-              </a:rPr>
-              <a:t>CTCTTTCAATTAAGCGGGTTCCGTAAATTCAAGGTTTGGATCGGATTAGAATGTGCGCCAGTTTTCCAATCCCCGACATGATGCAAGTGGCTTAACCGTACAAGTATGCAAATCAGATCGGAAGAG</a:t>
-            </a:r>
-            <a:endParaRPr lang="en-GB" sz="1200" b="1" dirty="0">
-              <a:latin typeface="Courier New" panose="02070309020205020404" pitchFamily="49" charset="0"/>
-              <a:cs typeface="Courier New" panose="02070309020205020404" pitchFamily="49" charset="0"/>
-            </a:endParaRPr>
-          </a:p>
-          <a:p>
-            <a:r>
-              <a:rPr lang="en-GB" sz="1200" b="1" dirty="0" smtClean="0">
-                <a:latin typeface="Courier New" panose="02070309020205020404" pitchFamily="49" charset="0"/>
-                <a:cs typeface="Courier New" panose="02070309020205020404" pitchFamily="49" charset="0"/>
-              </a:rPr>
-              <a:t>CTCTTCCGATCTCTCTTTCAATTAAGCGGGTTCCGTAAATTCAAGGTTTGGATCGGATTAGAATGTGCGCCAGTTTTCCAATCCCCGACATGATGCAAGTGGCTTAACCGTACAAGTATGCAAATC</a:t>
-            </a:r>
-            <a:endParaRPr lang="en-GB" sz="1200" b="1" dirty="0">
-              <a:latin typeface="Courier New" panose="02070309020205020404" pitchFamily="49" charset="0"/>
-              <a:cs typeface="Courier New" panose="02070309020205020404" pitchFamily="49" charset="0"/>
-            </a:endParaRPr>
-          </a:p>
-        </p:txBody>
-      </p:sp>
-      <p:sp>
-        <p:nvSpPr>
-          <p:cNvPr id="9" name="TextBox 8"/>
-          <p:cNvSpPr txBox="1"/>
-          <p:nvPr/>
-        </p:nvSpPr>
-        <p:spPr>
-          <a:xfrm>
-            <a:off x="-4" y="1045873"/>
-            <a:ext cx="12192000" cy="1754326"/>
-          </a:xfrm>
-          <a:prstGeom prst="rect">
-            <a:avLst/>
-          </a:prstGeom>
-          <a:solidFill>
-            <a:schemeClr val="accent5">
-              <a:lumMod val="40000"/>
-              <a:lumOff val="60000"/>
-            </a:schemeClr>
-          </a:solidFill>
-        </p:spPr>
-        <p:txBody>
-          <a:bodyPr wrap="square" rtlCol="0">
-            <a:spAutoFit/>
-          </a:bodyPr>
-          <a:lstStyle/>
-          <a:p>
-            <a:r>
-              <a:rPr lang="en-GB" sz="1200" b="1" dirty="0" smtClean="0">
-                <a:latin typeface="Courier New" panose="02070309020205020404" pitchFamily="49" charset="0"/>
-                <a:cs typeface="Courier New" panose="02070309020205020404" pitchFamily="49" charset="0"/>
-              </a:rPr>
-              <a:t>CCBCCGGGGGGGGGGFDGGGGGGGGGGGGGGGGFGGGGGGGGGGGGGGGGGGGGGGGGGGGGGGG11CFEEGCGCGE&gt;GGGGGGG0FCGGGGGGG&gt;DGGGGGGGGGGGGGGGEGGGGDGGGE@C6@</a:t>
-            </a:r>
-            <a:endParaRPr lang="en-GB" sz="1200" b="1" dirty="0">
-              <a:latin typeface="Courier New" panose="02070309020205020404" pitchFamily="49" charset="0"/>
-              <a:cs typeface="Courier New" panose="02070309020205020404" pitchFamily="49" charset="0"/>
-            </a:endParaRPr>
-          </a:p>
-          <a:p>
-            <a:r>
-              <a:rPr lang="en-GB" sz="1200" b="1" dirty="0" smtClean="0">
-                <a:latin typeface="Courier New" panose="02070309020205020404" pitchFamily="49" charset="0"/>
-                <a:cs typeface="Courier New" panose="02070309020205020404" pitchFamily="49" charset="0"/>
-              </a:rPr>
-              <a:t>GGBGGGGGGGGGGGBGGGGGFGGGGGGGGGGGGGFGGGGGGGGGFGGGGGGGGGGGGGGGGGGGGGGGGGGGGGGGGGGGGGGGGGGGGGGGGGGGGGGGGGGGGGGGGGGGGGGGGGGGGCCCCC</a:t>
-            </a:r>
-          </a:p>
-          <a:p>
-            <a:r>
-              <a:rPr lang="en-GB" sz="1200" b="1" dirty="0" smtClean="0">
-                <a:latin typeface="Courier New" panose="02070309020205020404" pitchFamily="49" charset="0"/>
-                <a:cs typeface="Courier New" panose="02070309020205020404" pitchFamily="49" charset="0"/>
-              </a:rPr>
-              <a:t>BBB@BGEGGGGGGGGGGGGGCGGGGGEGGGFGGGGGGGG</a:t>
-            </a:r>
-            <a:r>
-              <a:rPr lang="en-GB" sz="1200" b="1" dirty="0">
-                <a:latin typeface="Courier New" panose="02070309020205020404" pitchFamily="49" charset="0"/>
-                <a:cs typeface="Courier New" panose="02070309020205020404" pitchFamily="49" charset="0"/>
-              </a:rPr>
-              <a:t>/&gt;FGEGGGDGG&lt;CGGGGGGGGGE&gt;DGGDGGGEGGGGEGGGFGGG@=GGGEGEG=GGGGGGGGDGGGDGGGG==6BCGGGCG=GEGG</a:t>
-            </a:r>
-            <a:r>
-              <a:rPr lang="en-GB" sz="1200" b="1" dirty="0" smtClean="0">
-                <a:latin typeface="Courier New" panose="02070309020205020404" pitchFamily="49" charset="0"/>
-                <a:cs typeface="Courier New" panose="02070309020205020404" pitchFamily="49" charset="0"/>
-              </a:rPr>
-              <a:t>#</a:t>
-            </a:r>
-            <a:endParaRPr lang="en-GB" sz="1200" b="1" dirty="0">
-              <a:latin typeface="Courier New" panose="02070309020205020404" pitchFamily="49" charset="0"/>
-              <a:cs typeface="Courier New" panose="02070309020205020404" pitchFamily="49" charset="0"/>
-            </a:endParaRPr>
-          </a:p>
-          <a:p>
-            <a:r>
-              <a:rPr lang="en-GB" sz="1200" b="1" dirty="0" smtClean="0">
-                <a:latin typeface="Courier New" panose="02070309020205020404" pitchFamily="49" charset="0"/>
-                <a:cs typeface="Courier New" panose="02070309020205020404" pitchFamily="49" charset="0"/>
-              </a:rPr>
-              <a:t>CCCCCGGGGGGGFGGGGGGGGGGFGGEGGGGGGGGGGGGGBGGGGGGGGGGGC</a:t>
-            </a:r>
-            <a:r>
-              <a:rPr lang="en-GB" sz="1200" b="1" dirty="0">
-                <a:latin typeface="Courier New" panose="02070309020205020404" pitchFamily="49" charset="0"/>
-                <a:cs typeface="Courier New" panose="02070309020205020404" pitchFamily="49" charset="0"/>
-              </a:rPr>
-              <a:t>@&gt;CB@DGEGGGGGGGG@DGGGGGG00;FFCGEGGEGEFGEFDEDGFBB@@</a:t>
-            </a:r>
-            <a:r>
-              <a:rPr lang="en-GB" sz="1200" b="1" dirty="0" smtClean="0">
-                <a:latin typeface="Courier New" panose="02070309020205020404" pitchFamily="49" charset="0"/>
-                <a:cs typeface="Courier New" panose="02070309020205020404" pitchFamily="49" charset="0"/>
-              </a:rPr>
-              <a:t>0CC0880CG&gt;0F&gt;FGGGE@D;FF</a:t>
-            </a:r>
-            <a:endParaRPr lang="en-GB" sz="1200" b="1" dirty="0">
-              <a:latin typeface="Courier New" panose="02070309020205020404" pitchFamily="49" charset="0"/>
-              <a:cs typeface="Courier New" panose="02070309020205020404" pitchFamily="49" charset="0"/>
-            </a:endParaRPr>
-          </a:p>
-          <a:p>
-            <a:r>
-              <a:rPr lang="en-GB" sz="1200" b="1" dirty="0" smtClean="0">
-                <a:latin typeface="Courier New" panose="02070309020205020404" pitchFamily="49" charset="0"/>
-                <a:cs typeface="Courier New" panose="02070309020205020404" pitchFamily="49" charset="0"/>
-              </a:rPr>
-              <a:t>####F?C&gt;FCGGGGGGGGEEGGGGGF?GGCGFGGGGGGGGGGGGGGGFGGGGGGGGGGGGGGGGGGGGGGGGGGGGGGGGGGGGGGGGGGGGGGGGGGGGGGGGGGGGGGGGGGGGGGEGGCCCCC</a:t>
-            </a:r>
-            <a:endParaRPr lang="en-GB" sz="1200" b="1" dirty="0">
-              <a:latin typeface="Courier New" panose="02070309020205020404" pitchFamily="49" charset="0"/>
-              <a:cs typeface="Courier New" panose="02070309020205020404" pitchFamily="49" charset="0"/>
-            </a:endParaRPr>
-          </a:p>
-          <a:p>
-            <a:r>
-              <a:rPr lang="en-GB" sz="1200" b="1" dirty="0" smtClean="0">
-                <a:latin typeface="Courier New" panose="02070309020205020404" pitchFamily="49" charset="0"/>
-                <a:cs typeface="Courier New" panose="02070309020205020404" pitchFamily="49" charset="0"/>
-              </a:rPr>
-              <a:t>BBBBCGGGGGGGGGGGGEGGGGGGGGGGGGGGGGGDGBGGGGGGCEGGGGGCGGEGGGGGGGGGGGGGEFGCGGGGGGGGFGGG&gt;0CCFGGD08=C0000</a:t>
-            </a:r>
-            <a:r>
-              <a:rPr lang="en-GB" sz="1200" b="1" dirty="0">
-                <a:latin typeface="Courier New" panose="02070309020205020404" pitchFamily="49" charset="0"/>
-                <a:cs typeface="Courier New" panose="02070309020205020404" pitchFamily="49" charset="0"/>
-              </a:rPr>
-              <a:t>.&lt;@CF@GGGGGGGDGGGG@@</a:t>
-            </a:r>
-            <a:r>
-              <a:rPr lang="en-GB" sz="1200" b="1" dirty="0" smtClean="0">
-                <a:latin typeface="Courier New" panose="02070309020205020404" pitchFamily="49" charset="0"/>
-                <a:cs typeface="Courier New" panose="02070309020205020404" pitchFamily="49" charset="0"/>
-              </a:rPr>
-              <a:t>CE=EBG</a:t>
-            </a:r>
-            <a:endParaRPr lang="en-GB" sz="1200" b="1" dirty="0">
-              <a:latin typeface="Courier New" panose="02070309020205020404" pitchFamily="49" charset="0"/>
-              <a:cs typeface="Courier New" panose="02070309020205020404" pitchFamily="49" charset="0"/>
-            </a:endParaRPr>
-          </a:p>
-          <a:p>
-            <a:r>
-              <a:rPr lang="en-GB" sz="1200" b="1" dirty="0" smtClean="0">
-                <a:latin typeface="Courier New" panose="02070309020205020404" pitchFamily="49" charset="0"/>
-                <a:cs typeface="Courier New" panose="02070309020205020404" pitchFamily="49" charset="0"/>
-              </a:rPr>
-              <a:t>#</a:t>
-            </a:r>
-            <a:r>
-              <a:rPr lang="en-GB" sz="1200" b="1" dirty="0">
-                <a:latin typeface="Courier New" panose="02070309020205020404" pitchFamily="49" charset="0"/>
-                <a:cs typeface="Courier New" panose="02070309020205020404" pitchFamily="49" charset="0"/>
-              </a:rPr>
-              <a:t>BBG@..@.G@?,@73,3,GGGGGC.BB=GBEE@D;GGDF=&lt;&gt;</a:t>
-            </a:r>
-            <a:r>
-              <a:rPr lang="en-GB" sz="1200" b="1" dirty="0" smtClean="0">
-                <a:latin typeface="Courier New" panose="02070309020205020404" pitchFamily="49" charset="0"/>
-                <a:cs typeface="Courier New" panose="02070309020205020404" pitchFamily="49" charset="0"/>
-              </a:rPr>
-              <a:t>GGGGGDBGGGGG&gt;GGGGFF&gt;GCGGGGGGGCCGGGGEGGGGGGGDBFGGGGGGGGGGGGGGGGAGGGGGGGGGGGBGGGCBCCB</a:t>
-            </a:r>
-            <a:endParaRPr lang="en-GB" sz="1200" b="1" dirty="0">
-              <a:latin typeface="Courier New" panose="02070309020205020404" pitchFamily="49" charset="0"/>
-              <a:cs typeface="Courier New" panose="02070309020205020404" pitchFamily="49" charset="0"/>
-            </a:endParaRPr>
-          </a:p>
-          <a:p>
-            <a:r>
-              <a:rPr lang="en-GB" sz="1200" b="1" dirty="0" smtClean="0">
-                <a:latin typeface="Courier New" panose="02070309020205020404" pitchFamily="49" charset="0"/>
-                <a:cs typeface="Courier New" panose="02070309020205020404" pitchFamily="49" charset="0"/>
-              </a:rPr>
-              <a:t>BCCC</a:t>
-            </a:r>
-            <a:r>
-              <a:rPr lang="en-GB" sz="1200" b="1" dirty="0">
-                <a:latin typeface="Courier New" panose="02070309020205020404" pitchFamily="49" charset="0"/>
-                <a:cs typeface="Courier New" panose="02070309020205020404" pitchFamily="49" charset="0"/>
-              </a:rPr>
-              <a:t>?@</a:t>
-            </a:r>
-            <a:r>
-              <a:rPr lang="en-GB" sz="1200" b="1" dirty="0" smtClean="0">
-                <a:latin typeface="Courier New" panose="02070309020205020404" pitchFamily="49" charset="0"/>
-                <a:cs typeface="Courier New" panose="02070309020205020404" pitchFamily="49" charset="0"/>
-              </a:rPr>
-              <a:t>FF&gt;FGGGGCGDG9EFEGGGGGGGGGGGGGGGGFGGGGGGGGGECFFGGGGGGG&lt;G1=GGDDGGGGGGGGG@GGGG&gt;GCGCFFGGGF08FECAGGGFGGEFFCGGGCGGGGGEGDGGBGGG</a:t>
-            </a:r>
-            <a:endParaRPr lang="en-GB" sz="1200" b="1" dirty="0">
-              <a:latin typeface="Courier New" panose="02070309020205020404" pitchFamily="49" charset="0"/>
-              <a:cs typeface="Courier New" panose="02070309020205020404" pitchFamily="49" charset="0"/>
-            </a:endParaRPr>
-          </a:p>
-          <a:p>
-            <a:r>
-              <a:rPr lang="en-GB" sz="1200" b="1" dirty="0" smtClean="0">
-                <a:latin typeface="Courier New" panose="02070309020205020404" pitchFamily="49" charset="0"/>
-                <a:cs typeface="Courier New" panose="02070309020205020404" pitchFamily="49" charset="0"/>
-              </a:rPr>
-              <a:t>#</a:t>
-            </a:r>
-            <a:r>
-              <a:rPr lang="en-GB" sz="1200" b="1" dirty="0">
-                <a:latin typeface="Courier New" panose="02070309020205020404" pitchFamily="49" charset="0"/>
-                <a:cs typeface="Courier New" panose="02070309020205020404" pitchFamily="49" charset="0"/>
-              </a:rPr>
-              <a:t>BGG?B&gt;7.3;BGGGEGGGA9=A4.,&gt;.GAGGBBGF@9&lt;90&gt;&lt;</a:t>
-            </a:r>
-            <a:r>
-              <a:rPr lang="en-GB" sz="1200" b="1" dirty="0" smtClean="0">
-                <a:latin typeface="Courier New" panose="02070309020205020404" pitchFamily="49" charset="0"/>
-                <a:cs typeface="Courier New" panose="02070309020205020404" pitchFamily="49" charset="0"/>
-              </a:rPr>
-              <a:t>0:GGGGF&gt;EGDGGGGEGFGEFGGGGGGGGGEGFCF@BBDGGGEGG&gt;GGCFDGD&gt;DGFGGGGGGGGGGEGGGGFCGGEGBBBBB</a:t>
-            </a:r>
-            <a:endParaRPr lang="en-GB" sz="1200" b="1" dirty="0">
-              <a:latin typeface="Courier New" panose="02070309020205020404" pitchFamily="49" charset="0"/>
-              <a:cs typeface="Courier New" panose="02070309020205020404" pitchFamily="49" charset="0"/>
-            </a:endParaRPr>
-          </a:p>
-        </p:txBody>
-      </p:sp>
-      <p:sp>
-        <p:nvSpPr>
-          <p:cNvPr id="10" name="TextBox 9"/>
-          <p:cNvSpPr txBox="1"/>
-          <p:nvPr/>
-        </p:nvSpPr>
-        <p:spPr>
-          <a:xfrm>
-            <a:off x="-4" y="1050698"/>
-            <a:ext cx="12192003" cy="1754326"/>
-          </a:xfrm>
-          <a:prstGeom prst="rect">
-            <a:avLst/>
-          </a:prstGeom>
-          <a:solidFill>
-            <a:schemeClr val="accent5">
-              <a:lumMod val="40000"/>
-              <a:lumOff val="60000"/>
-            </a:schemeClr>
-          </a:solidFill>
-        </p:spPr>
-        <p:txBody>
-          <a:bodyPr wrap="square" rtlCol="0">
-            <a:spAutoFit/>
-          </a:bodyPr>
-          <a:lstStyle/>
-          <a:p>
-            <a:r>
-              <a:rPr lang="en-GB" sz="1200" b="1" dirty="0" smtClean="0">
-                <a:latin typeface="Courier New" panose="02070309020205020404" pitchFamily="49" charset="0"/>
-                <a:cs typeface="Courier New" panose="02070309020205020404" pitchFamily="49" charset="0"/>
-              </a:rPr>
-              <a:t>NM:i:0     MD:Z:126                      AS:i:126       XS:i:126</a:t>
-            </a:r>
-            <a:endParaRPr lang="en-GB" sz="1200" b="1" dirty="0">
-              <a:latin typeface="Courier New" panose="02070309020205020404" pitchFamily="49" charset="0"/>
-              <a:cs typeface="Courier New" panose="02070309020205020404" pitchFamily="49" charset="0"/>
-            </a:endParaRPr>
-          </a:p>
-          <a:p>
-            <a:r>
-              <a:rPr lang="en-GB" sz="1200" b="1" dirty="0" smtClean="0">
-                <a:latin typeface="Courier New" panose="02070309020205020404" pitchFamily="49" charset="0"/>
-                <a:cs typeface="Courier New" panose="02070309020205020404" pitchFamily="49" charset="0"/>
-              </a:rPr>
-              <a:t>NM:i:0     MD:Z:126                      AS:i:126       XS:i:126</a:t>
-            </a:r>
-          </a:p>
-          <a:p>
-            <a:r>
-              <a:rPr lang="en-GB" sz="1200" b="1" dirty="0" smtClean="0">
-                <a:latin typeface="Courier New" panose="02070309020205020404" pitchFamily="49" charset="0"/>
-                <a:cs typeface="Courier New" panose="02070309020205020404" pitchFamily="49" charset="0"/>
-              </a:rPr>
-              <a:t>NM:i:1     MD:Z:59G49                    AS:i:104       XS:i:0</a:t>
-            </a:r>
-            <a:endParaRPr lang="en-GB" sz="1200" b="1" dirty="0">
-              <a:latin typeface="Courier New" panose="02070309020205020404" pitchFamily="49" charset="0"/>
-              <a:cs typeface="Courier New" panose="02070309020205020404" pitchFamily="49" charset="0"/>
-            </a:endParaRPr>
-          </a:p>
-          <a:p>
-            <a:r>
-              <a:rPr lang="en-GB" sz="1200" b="1" dirty="0" smtClean="0">
-                <a:latin typeface="Courier New" panose="02070309020205020404" pitchFamily="49" charset="0"/>
-                <a:cs typeface="Courier New" panose="02070309020205020404" pitchFamily="49" charset="0"/>
-              </a:rPr>
-              <a:t>NM:i:1     MD:Z:0A117                    AS:i:117       XS:i:0</a:t>
-            </a:r>
-            <a:endParaRPr lang="en-GB" sz="1200" b="1" dirty="0">
-              <a:latin typeface="Courier New" panose="02070309020205020404" pitchFamily="49" charset="0"/>
-              <a:cs typeface="Courier New" panose="02070309020205020404" pitchFamily="49" charset="0"/>
-            </a:endParaRPr>
-          </a:p>
-          <a:p>
-            <a:r>
-              <a:rPr lang="en-GB" sz="1200" b="1" dirty="0" smtClean="0">
-                <a:latin typeface="Courier New" panose="02070309020205020404" pitchFamily="49" charset="0"/>
-                <a:cs typeface="Courier New" panose="02070309020205020404" pitchFamily="49" charset="0"/>
-              </a:rPr>
-              <a:t>NM:i:0     MD:Z:116                      AS:i:116       XS:i:0</a:t>
-            </a:r>
-            <a:endParaRPr lang="en-GB" sz="1200" b="1" dirty="0">
-              <a:latin typeface="Courier New" panose="02070309020205020404" pitchFamily="49" charset="0"/>
-              <a:cs typeface="Courier New" panose="02070309020205020404" pitchFamily="49" charset="0"/>
-            </a:endParaRPr>
-          </a:p>
-          <a:p>
-            <a:r>
-              <a:rPr lang="en-GB" sz="1200" b="1" dirty="0" smtClean="0">
-                <a:latin typeface="Courier New" panose="02070309020205020404" pitchFamily="49" charset="0"/>
-                <a:cs typeface="Courier New" panose="02070309020205020404" pitchFamily="49" charset="0"/>
-              </a:rPr>
-              <a:t>NM:i:9</a:t>
-            </a:r>
-            <a:r>
-              <a:rPr lang="en-GB" sz="1200" b="1" dirty="0">
-                <a:latin typeface="Courier New" panose="02070309020205020404" pitchFamily="49" charset="0"/>
-                <a:cs typeface="Courier New" panose="02070309020205020404" pitchFamily="49" charset="0"/>
-              </a:rPr>
-              <a:t> </a:t>
-            </a:r>
-            <a:r>
-              <a:rPr lang="en-GB" sz="1200" b="1" dirty="0" smtClean="0">
-                <a:latin typeface="Courier New" panose="02070309020205020404" pitchFamily="49" charset="0"/>
-                <a:cs typeface="Courier New" panose="02070309020205020404" pitchFamily="49" charset="0"/>
-              </a:rPr>
-              <a:t>    MD:Z:24^CCGATC55G17A0T27      AS:i:99        XS:i:0</a:t>
-            </a:r>
-            <a:endParaRPr lang="en-GB" sz="1200" b="1" dirty="0">
-              <a:latin typeface="Courier New" panose="02070309020205020404" pitchFamily="49" charset="0"/>
-              <a:cs typeface="Courier New" panose="02070309020205020404" pitchFamily="49" charset="0"/>
-            </a:endParaRPr>
-          </a:p>
-          <a:p>
-            <a:r>
-              <a:rPr lang="en-GB" sz="1200" b="1" dirty="0" smtClean="0">
-                <a:latin typeface="Courier New" panose="02070309020205020404" pitchFamily="49" charset="0"/>
-                <a:cs typeface="Courier New" panose="02070309020205020404" pitchFamily="49" charset="0"/>
-              </a:rPr>
-              <a:t>NM:i:0</a:t>
-            </a:r>
-            <a:r>
-              <a:rPr lang="en-GB" sz="1200" b="1" dirty="0">
-                <a:latin typeface="Courier New" panose="02070309020205020404" pitchFamily="49" charset="0"/>
-                <a:cs typeface="Courier New" panose="02070309020205020404" pitchFamily="49" charset="0"/>
-              </a:rPr>
-              <a:t> </a:t>
-            </a:r>
-            <a:r>
-              <a:rPr lang="en-GB" sz="1200" b="1" dirty="0" smtClean="0">
-                <a:latin typeface="Courier New" panose="02070309020205020404" pitchFamily="49" charset="0"/>
-                <a:cs typeface="Courier New" panose="02070309020205020404" pitchFamily="49" charset="0"/>
-              </a:rPr>
-              <a:t>    MD:Z:126                      AS:i:126       XS:i:0</a:t>
-            </a:r>
-            <a:endParaRPr lang="en-GB" sz="1200" b="1" dirty="0">
-              <a:latin typeface="Courier New" panose="02070309020205020404" pitchFamily="49" charset="0"/>
-              <a:cs typeface="Courier New" panose="02070309020205020404" pitchFamily="49" charset="0"/>
-            </a:endParaRPr>
-          </a:p>
-          <a:p>
-            <a:r>
-              <a:rPr lang="en-GB" sz="1200" b="1" dirty="0" smtClean="0">
-                <a:latin typeface="Courier New" panose="02070309020205020404" pitchFamily="49" charset="0"/>
-                <a:cs typeface="Courier New" panose="02070309020205020404" pitchFamily="49" charset="0"/>
-              </a:rPr>
-              <a:t>NM:i:0</a:t>
-            </a:r>
-            <a:r>
-              <a:rPr lang="en-GB" sz="1200" b="1" dirty="0">
-                <a:latin typeface="Courier New" panose="02070309020205020404" pitchFamily="49" charset="0"/>
-                <a:cs typeface="Courier New" panose="02070309020205020404" pitchFamily="49" charset="0"/>
-              </a:rPr>
-              <a:t> </a:t>
-            </a:r>
-            <a:r>
-              <a:rPr lang="en-GB" sz="1200" b="1" dirty="0" smtClean="0">
-                <a:latin typeface="Courier New" panose="02070309020205020404" pitchFamily="49" charset="0"/>
-                <a:cs typeface="Courier New" panose="02070309020205020404" pitchFamily="49" charset="0"/>
-              </a:rPr>
-              <a:t>    MD:Z:115                      AS:i:115       XS:i:0</a:t>
-            </a:r>
-            <a:endParaRPr lang="en-GB" sz="1200" b="1" dirty="0">
-              <a:latin typeface="Courier New" panose="02070309020205020404" pitchFamily="49" charset="0"/>
-              <a:cs typeface="Courier New" panose="02070309020205020404" pitchFamily="49" charset="0"/>
-            </a:endParaRPr>
-          </a:p>
-          <a:p>
-            <a:r>
-              <a:rPr lang="en-GB" sz="1200" b="1" dirty="0" smtClean="0">
-                <a:latin typeface="Courier New" panose="02070309020205020404" pitchFamily="49" charset="0"/>
-                <a:cs typeface="Courier New" panose="02070309020205020404" pitchFamily="49" charset="0"/>
-              </a:rPr>
-              <a:t>NM:i:0</a:t>
-            </a:r>
-            <a:r>
-              <a:rPr lang="en-GB" sz="1200" b="1" dirty="0">
-                <a:latin typeface="Courier New" panose="02070309020205020404" pitchFamily="49" charset="0"/>
-                <a:cs typeface="Courier New" panose="02070309020205020404" pitchFamily="49" charset="0"/>
-              </a:rPr>
-              <a:t> </a:t>
-            </a:r>
-            <a:r>
-              <a:rPr lang="en-GB" sz="1200" b="1" dirty="0" smtClean="0">
-                <a:latin typeface="Courier New" panose="02070309020205020404" pitchFamily="49" charset="0"/>
-                <a:cs typeface="Courier New" panose="02070309020205020404" pitchFamily="49" charset="0"/>
-              </a:rPr>
-              <a:t>    MD:Z:114                      AS:i:114       XS:i:0</a:t>
-            </a:r>
-            <a:endParaRPr lang="en-GB" sz="1200" b="1" dirty="0">
-              <a:latin typeface="Courier New" panose="02070309020205020404" pitchFamily="49" charset="0"/>
-              <a:cs typeface="Courier New" panose="02070309020205020404" pitchFamily="49" charset="0"/>
-            </a:endParaRPr>
-          </a:p>
-        </p:txBody>
-      </p:sp>
-    </p:spTree>
-    <p:extLst>
-      <p:ext uri="{BB962C8B-B14F-4D97-AF65-F5344CB8AC3E}">
-        <p14:creationId xmlns:p14="http://schemas.microsoft.com/office/powerpoint/2010/main" val="3709082585"/>
       </p:ext>
     </p:extLst>
   </p:cSld>
@@ -23208,7 +23230,7 @@
   <a:extraClrSchemeLst/>
   <a:extLst>
     <a:ext uri="{05A4C25C-085E-4340-85A3-A5531E510DB2}">
-      <thm15:themeFamily xmlns="" xmlns:thm15="http://schemas.microsoft.com/office/thememl/2012/main" name="Office Theme" id="{62F939B6-93AF-4DB8-9C6B-D6C7DFDC589F}" vid="{4A3C46E8-61CC-4603-A589-7422A47A8E4A}"/>
+      <thm15:themeFamily xmlns:thm15="http://schemas.microsoft.com/office/thememl/2012/main" xmlns="" name="Office Theme" id="{62F939B6-93AF-4DB8-9C6B-D6C7DFDC589F}" vid="{4A3C46E8-61CC-4603-A589-7422A47A8E4A}"/>
     </a:ext>
   </a:extLst>
 </a:theme>

</xml_diff>